<commit_message>
Added more to the presentation powerpoint
</commit_message>
<xml_diff>
--- a/presentation materials/PresentationPowerpoint.pptx
+++ b/presentation materials/PresentationPowerpoint.pptx
@@ -5,12 +5,16 @@
     <p:sldMasterId id="2147483648" r:id="rId1"/>
   </p:sldMasterIdLst>
   <p:notesMasterIdLst>
-    <p:notesMasterId r:id="rId5"/>
+    <p:notesMasterId r:id="rId9"/>
   </p:notesMasterIdLst>
   <p:sldIdLst>
     <p:sldId id="256" r:id="rId2"/>
     <p:sldId id="257" r:id="rId3"/>
     <p:sldId id="260" r:id="rId4"/>
+    <p:sldId id="261" r:id="rId5"/>
+    <p:sldId id="262" r:id="rId6"/>
+    <p:sldId id="263" r:id="rId7"/>
+    <p:sldId id="264" r:id="rId8"/>
   </p:sldIdLst>
   <p:sldSz cx="12192000" cy="6858000"/>
   <p:notesSz cx="6858000" cy="9144000"/>
@@ -109,6 +113,11 @@
       </a:defRPr>
     </a:lvl9pPr>
   </p:defaultTextStyle>
+  <p:extLst>
+    <p:ext uri="{EFAFB233-063F-42B5-8137-9DF3F51BA10A}">
+      <p15:sldGuideLst xmlns:p15="http://schemas.microsoft.com/office/powerpoint/2012/main"/>
+    </p:ext>
+  </p:extLst>
 </p:presentation>
 </file>
 
@@ -194,7 +203,7 @@
           <a:p>
             <a:fld id="{E2737A28-5715-4514-9EDA-FF51BF978D2E}" type="datetimeFigureOut">
               <a:rPr lang="en-US" smtClean="0"/>
-              <a:t>11/19/2024</a:t>
+              <a:t>11/21/2024</a:t>
             </a:fld>
             <a:endParaRPr lang="en-US"/>
           </a:p>
@@ -505,10 +514,7 @@
           <a:bodyPr/>
           <a:lstStyle/>
           <a:p>
-            <a:r>
-              <a:rPr lang="en-US" dirty="0"/>
-              <a:t>Revise!!!!</a:t>
-            </a:r>
+            <a:endParaRPr lang="en-US" dirty="0"/>
           </a:p>
         </p:txBody>
       </p:sp>
@@ -650,6 +656,450 @@
     <p:extLst>
       <p:ext uri="{BB962C8B-B14F-4D97-AF65-F5344CB8AC3E}">
         <p14:creationId xmlns:p14="http://schemas.microsoft.com/office/powerpoint/2010/main" val="2618761111"/>
+      </p:ext>
+    </p:extLst>
+  </p:cSld>
+  <p:clrMapOvr>
+    <a:masterClrMapping/>
+  </p:clrMapOvr>
+</p:notes>
+</file>
+
+<file path=ppt/notesSlides/notesSlide3.xml><?xml version="1.0" encoding="utf-8"?>
+<p:notes xmlns:a="http://schemas.openxmlformats.org/drawingml/2006/main" xmlns:r="http://schemas.openxmlformats.org/officeDocument/2006/relationships" xmlns:p="http://schemas.openxmlformats.org/presentationml/2006/main">
+  <p:cSld>
+    <p:spTree>
+      <p:nvGrpSpPr>
+        <p:cNvPr id="1" name="">
+          <a:extLst>
+            <a:ext uri="{FF2B5EF4-FFF2-40B4-BE49-F238E27FC236}">
+              <a16:creationId xmlns:a16="http://schemas.microsoft.com/office/drawing/2014/main" id="{D0C49EEE-C805-15CF-2030-362FBF1C6205}"/>
+            </a:ext>
+          </a:extLst>
+        </p:cNvPr>
+        <p:cNvGrpSpPr/>
+        <p:nvPr/>
+      </p:nvGrpSpPr>
+      <p:grpSpPr>
+        <a:xfrm>
+          <a:off x="0" y="0"/>
+          <a:ext cx="0" cy="0"/>
+          <a:chOff x="0" y="0"/>
+          <a:chExt cx="0" cy="0"/>
+        </a:xfrm>
+      </p:grpSpPr>
+      <p:sp>
+        <p:nvSpPr>
+          <p:cNvPr id="2" name="Slide Image Placeholder 1">
+            <a:extLst>
+              <a:ext uri="{FF2B5EF4-FFF2-40B4-BE49-F238E27FC236}">
+                <a16:creationId xmlns:a16="http://schemas.microsoft.com/office/drawing/2014/main" id="{2CADBB2F-00C5-0B1A-E043-1F3CDAC87909}"/>
+              </a:ext>
+            </a:extLst>
+          </p:cNvPr>
+          <p:cNvSpPr>
+            <a:spLocks noGrp="1" noRot="1" noChangeAspect="1"/>
+          </p:cNvSpPr>
+          <p:nvPr>
+            <p:ph type="sldImg"/>
+          </p:nvPr>
+        </p:nvSpPr>
+        <p:spPr/>
+      </p:sp>
+      <p:sp>
+        <p:nvSpPr>
+          <p:cNvPr id="3" name="Notes Placeholder 2">
+            <a:extLst>
+              <a:ext uri="{FF2B5EF4-FFF2-40B4-BE49-F238E27FC236}">
+                <a16:creationId xmlns:a16="http://schemas.microsoft.com/office/drawing/2014/main" id="{B98ECB45-0FDB-D7C7-B931-C75E03B7C68C}"/>
+              </a:ext>
+            </a:extLst>
+          </p:cNvPr>
+          <p:cNvSpPr>
+            <a:spLocks noGrp="1"/>
+          </p:cNvSpPr>
+          <p:nvPr>
+            <p:ph type="body" idx="1"/>
+          </p:nvPr>
+        </p:nvSpPr>
+        <p:spPr/>
+        <p:txBody>
+          <a:bodyPr/>
+          <a:lstStyle/>
+          <a:p>
+            <a:r>
+              <a:rPr lang="en-US" dirty="0"/>
+              <a:t>Revise!!!!</a:t>
+            </a:r>
+          </a:p>
+        </p:txBody>
+      </p:sp>
+      <p:sp>
+        <p:nvSpPr>
+          <p:cNvPr id="4" name="Slide Number Placeholder 3">
+            <a:extLst>
+              <a:ext uri="{FF2B5EF4-FFF2-40B4-BE49-F238E27FC236}">
+                <a16:creationId xmlns:a16="http://schemas.microsoft.com/office/drawing/2014/main" id="{5BD40A48-CD94-0E0B-39A2-842CF29AE9C8}"/>
+              </a:ext>
+            </a:extLst>
+          </p:cNvPr>
+          <p:cNvSpPr>
+            <a:spLocks noGrp="1"/>
+          </p:cNvSpPr>
+          <p:nvPr>
+            <p:ph type="sldNum" sz="quarter" idx="5"/>
+          </p:nvPr>
+        </p:nvSpPr>
+        <p:spPr/>
+        <p:txBody>
+          <a:bodyPr/>
+          <a:lstStyle/>
+          <a:p>
+            <a:fld id="{3382154C-195E-409D-B180-B9427288A4D3}" type="slidenum">
+              <a:rPr lang="en-US" smtClean="0"/>
+              <a:t>4</a:t>
+            </a:fld>
+            <a:endParaRPr lang="en-US"/>
+          </a:p>
+        </p:txBody>
+      </p:sp>
+    </p:spTree>
+    <p:extLst>
+      <p:ext uri="{BB962C8B-B14F-4D97-AF65-F5344CB8AC3E}">
+        <p14:creationId xmlns:p14="http://schemas.microsoft.com/office/powerpoint/2010/main" val="2572047936"/>
+      </p:ext>
+    </p:extLst>
+  </p:cSld>
+  <p:clrMapOvr>
+    <a:masterClrMapping/>
+  </p:clrMapOvr>
+</p:notes>
+</file>
+
+<file path=ppt/notesSlides/notesSlide4.xml><?xml version="1.0" encoding="utf-8"?>
+<p:notes xmlns:a="http://schemas.openxmlformats.org/drawingml/2006/main" xmlns:r="http://schemas.openxmlformats.org/officeDocument/2006/relationships" xmlns:p="http://schemas.openxmlformats.org/presentationml/2006/main">
+  <p:cSld>
+    <p:spTree>
+      <p:nvGrpSpPr>
+        <p:cNvPr id="1" name="">
+          <a:extLst>
+            <a:ext uri="{FF2B5EF4-FFF2-40B4-BE49-F238E27FC236}">
+              <a16:creationId xmlns:a16="http://schemas.microsoft.com/office/drawing/2014/main" id="{D817FC2B-EFFA-5060-6AE4-B5D9B3C67BAE}"/>
+            </a:ext>
+          </a:extLst>
+        </p:cNvPr>
+        <p:cNvGrpSpPr/>
+        <p:nvPr/>
+      </p:nvGrpSpPr>
+      <p:grpSpPr>
+        <a:xfrm>
+          <a:off x="0" y="0"/>
+          <a:ext cx="0" cy="0"/>
+          <a:chOff x="0" y="0"/>
+          <a:chExt cx="0" cy="0"/>
+        </a:xfrm>
+      </p:grpSpPr>
+      <p:sp>
+        <p:nvSpPr>
+          <p:cNvPr id="2" name="Slide Image Placeholder 1">
+            <a:extLst>
+              <a:ext uri="{FF2B5EF4-FFF2-40B4-BE49-F238E27FC236}">
+                <a16:creationId xmlns:a16="http://schemas.microsoft.com/office/drawing/2014/main" id="{21620D48-4F33-0615-EFB5-62B54D74E033}"/>
+              </a:ext>
+            </a:extLst>
+          </p:cNvPr>
+          <p:cNvSpPr>
+            <a:spLocks noGrp="1" noRot="1" noChangeAspect="1"/>
+          </p:cNvSpPr>
+          <p:nvPr>
+            <p:ph type="sldImg"/>
+          </p:nvPr>
+        </p:nvSpPr>
+        <p:spPr/>
+      </p:sp>
+      <p:sp>
+        <p:nvSpPr>
+          <p:cNvPr id="3" name="Notes Placeholder 2">
+            <a:extLst>
+              <a:ext uri="{FF2B5EF4-FFF2-40B4-BE49-F238E27FC236}">
+                <a16:creationId xmlns:a16="http://schemas.microsoft.com/office/drawing/2014/main" id="{6508ED96-A501-A586-C414-F3EC0E6B0BC4}"/>
+              </a:ext>
+            </a:extLst>
+          </p:cNvPr>
+          <p:cNvSpPr>
+            <a:spLocks noGrp="1"/>
+          </p:cNvSpPr>
+          <p:nvPr>
+            <p:ph type="body" idx="1"/>
+          </p:nvPr>
+        </p:nvSpPr>
+        <p:spPr/>
+        <p:txBody>
+          <a:bodyPr/>
+          <a:lstStyle/>
+          <a:p>
+            <a:r>
+              <a:rPr lang="en-US" dirty="0"/>
+              <a:t>Revise!!!!</a:t>
+            </a:r>
+          </a:p>
+        </p:txBody>
+      </p:sp>
+      <p:sp>
+        <p:nvSpPr>
+          <p:cNvPr id="4" name="Slide Number Placeholder 3">
+            <a:extLst>
+              <a:ext uri="{FF2B5EF4-FFF2-40B4-BE49-F238E27FC236}">
+                <a16:creationId xmlns:a16="http://schemas.microsoft.com/office/drawing/2014/main" id="{C6361ABA-1FDB-53DB-B509-4666B4760AD3}"/>
+              </a:ext>
+            </a:extLst>
+          </p:cNvPr>
+          <p:cNvSpPr>
+            <a:spLocks noGrp="1"/>
+          </p:cNvSpPr>
+          <p:nvPr>
+            <p:ph type="sldNum" sz="quarter" idx="5"/>
+          </p:nvPr>
+        </p:nvSpPr>
+        <p:spPr/>
+        <p:txBody>
+          <a:bodyPr/>
+          <a:lstStyle/>
+          <a:p>
+            <a:fld id="{3382154C-195E-409D-B180-B9427288A4D3}" type="slidenum">
+              <a:rPr lang="en-US" smtClean="0"/>
+              <a:t>5</a:t>
+            </a:fld>
+            <a:endParaRPr lang="en-US"/>
+          </a:p>
+        </p:txBody>
+      </p:sp>
+    </p:spTree>
+    <p:extLst>
+      <p:ext uri="{BB962C8B-B14F-4D97-AF65-F5344CB8AC3E}">
+        <p14:creationId xmlns:p14="http://schemas.microsoft.com/office/powerpoint/2010/main" val="2290031757"/>
+      </p:ext>
+    </p:extLst>
+  </p:cSld>
+  <p:clrMapOvr>
+    <a:masterClrMapping/>
+  </p:clrMapOvr>
+</p:notes>
+</file>
+
+<file path=ppt/notesSlides/notesSlide5.xml><?xml version="1.0" encoding="utf-8"?>
+<p:notes xmlns:a="http://schemas.openxmlformats.org/drawingml/2006/main" xmlns:r="http://schemas.openxmlformats.org/officeDocument/2006/relationships" xmlns:p="http://schemas.openxmlformats.org/presentationml/2006/main">
+  <p:cSld>
+    <p:spTree>
+      <p:nvGrpSpPr>
+        <p:cNvPr id="1" name="">
+          <a:extLst>
+            <a:ext uri="{FF2B5EF4-FFF2-40B4-BE49-F238E27FC236}">
+              <a16:creationId xmlns:a16="http://schemas.microsoft.com/office/drawing/2014/main" id="{E789BF9E-694D-E1A5-845E-175D6928302B}"/>
+            </a:ext>
+          </a:extLst>
+        </p:cNvPr>
+        <p:cNvGrpSpPr/>
+        <p:nvPr/>
+      </p:nvGrpSpPr>
+      <p:grpSpPr>
+        <a:xfrm>
+          <a:off x="0" y="0"/>
+          <a:ext cx="0" cy="0"/>
+          <a:chOff x="0" y="0"/>
+          <a:chExt cx="0" cy="0"/>
+        </a:xfrm>
+      </p:grpSpPr>
+      <p:sp>
+        <p:nvSpPr>
+          <p:cNvPr id="2" name="Slide Image Placeholder 1">
+            <a:extLst>
+              <a:ext uri="{FF2B5EF4-FFF2-40B4-BE49-F238E27FC236}">
+                <a16:creationId xmlns:a16="http://schemas.microsoft.com/office/drawing/2014/main" id="{AC0E7F92-1D16-C28B-1E7A-07727ABFF9C6}"/>
+              </a:ext>
+            </a:extLst>
+          </p:cNvPr>
+          <p:cNvSpPr>
+            <a:spLocks noGrp="1" noRot="1" noChangeAspect="1"/>
+          </p:cNvSpPr>
+          <p:nvPr>
+            <p:ph type="sldImg"/>
+          </p:nvPr>
+        </p:nvSpPr>
+        <p:spPr/>
+      </p:sp>
+      <p:sp>
+        <p:nvSpPr>
+          <p:cNvPr id="3" name="Notes Placeholder 2">
+            <a:extLst>
+              <a:ext uri="{FF2B5EF4-FFF2-40B4-BE49-F238E27FC236}">
+                <a16:creationId xmlns:a16="http://schemas.microsoft.com/office/drawing/2014/main" id="{BD5F8426-9C12-6CE8-D63F-47DE476BFB40}"/>
+              </a:ext>
+            </a:extLst>
+          </p:cNvPr>
+          <p:cNvSpPr>
+            <a:spLocks noGrp="1"/>
+          </p:cNvSpPr>
+          <p:nvPr>
+            <p:ph type="body" idx="1"/>
+          </p:nvPr>
+        </p:nvSpPr>
+        <p:spPr/>
+        <p:txBody>
+          <a:bodyPr/>
+          <a:lstStyle/>
+          <a:p>
+            <a:r>
+              <a:rPr lang="en-US" dirty="0"/>
+              <a:t>Revise!!!!</a:t>
+            </a:r>
+          </a:p>
+        </p:txBody>
+      </p:sp>
+      <p:sp>
+        <p:nvSpPr>
+          <p:cNvPr id="4" name="Slide Number Placeholder 3">
+            <a:extLst>
+              <a:ext uri="{FF2B5EF4-FFF2-40B4-BE49-F238E27FC236}">
+                <a16:creationId xmlns:a16="http://schemas.microsoft.com/office/drawing/2014/main" id="{F82C311B-8234-BB69-55F2-893E91D5461E}"/>
+              </a:ext>
+            </a:extLst>
+          </p:cNvPr>
+          <p:cNvSpPr>
+            <a:spLocks noGrp="1"/>
+          </p:cNvSpPr>
+          <p:nvPr>
+            <p:ph type="sldNum" sz="quarter" idx="5"/>
+          </p:nvPr>
+        </p:nvSpPr>
+        <p:spPr/>
+        <p:txBody>
+          <a:bodyPr/>
+          <a:lstStyle/>
+          <a:p>
+            <a:fld id="{3382154C-195E-409D-B180-B9427288A4D3}" type="slidenum">
+              <a:rPr lang="en-US" smtClean="0"/>
+              <a:t>6</a:t>
+            </a:fld>
+            <a:endParaRPr lang="en-US"/>
+          </a:p>
+        </p:txBody>
+      </p:sp>
+    </p:spTree>
+    <p:extLst>
+      <p:ext uri="{BB962C8B-B14F-4D97-AF65-F5344CB8AC3E}">
+        <p14:creationId xmlns:p14="http://schemas.microsoft.com/office/powerpoint/2010/main" val="1882714873"/>
+      </p:ext>
+    </p:extLst>
+  </p:cSld>
+  <p:clrMapOvr>
+    <a:masterClrMapping/>
+  </p:clrMapOvr>
+</p:notes>
+</file>
+
+<file path=ppt/notesSlides/notesSlide6.xml><?xml version="1.0" encoding="utf-8"?>
+<p:notes xmlns:a="http://schemas.openxmlformats.org/drawingml/2006/main" xmlns:r="http://schemas.openxmlformats.org/officeDocument/2006/relationships" xmlns:p="http://schemas.openxmlformats.org/presentationml/2006/main">
+  <p:cSld>
+    <p:spTree>
+      <p:nvGrpSpPr>
+        <p:cNvPr id="1" name="">
+          <a:extLst>
+            <a:ext uri="{FF2B5EF4-FFF2-40B4-BE49-F238E27FC236}">
+              <a16:creationId xmlns:a16="http://schemas.microsoft.com/office/drawing/2014/main" id="{E0A785F8-DE9C-218E-069A-3B795F29F311}"/>
+            </a:ext>
+          </a:extLst>
+        </p:cNvPr>
+        <p:cNvGrpSpPr/>
+        <p:nvPr/>
+      </p:nvGrpSpPr>
+      <p:grpSpPr>
+        <a:xfrm>
+          <a:off x="0" y="0"/>
+          <a:ext cx="0" cy="0"/>
+          <a:chOff x="0" y="0"/>
+          <a:chExt cx="0" cy="0"/>
+        </a:xfrm>
+      </p:grpSpPr>
+      <p:sp>
+        <p:nvSpPr>
+          <p:cNvPr id="2" name="Slide Image Placeholder 1">
+            <a:extLst>
+              <a:ext uri="{FF2B5EF4-FFF2-40B4-BE49-F238E27FC236}">
+                <a16:creationId xmlns:a16="http://schemas.microsoft.com/office/drawing/2014/main" id="{A5FCCC5F-F80D-AEFF-1807-C46E9010048D}"/>
+              </a:ext>
+            </a:extLst>
+          </p:cNvPr>
+          <p:cNvSpPr>
+            <a:spLocks noGrp="1" noRot="1" noChangeAspect="1"/>
+          </p:cNvSpPr>
+          <p:nvPr>
+            <p:ph type="sldImg"/>
+          </p:nvPr>
+        </p:nvSpPr>
+        <p:spPr/>
+      </p:sp>
+      <p:sp>
+        <p:nvSpPr>
+          <p:cNvPr id="3" name="Notes Placeholder 2">
+            <a:extLst>
+              <a:ext uri="{FF2B5EF4-FFF2-40B4-BE49-F238E27FC236}">
+                <a16:creationId xmlns:a16="http://schemas.microsoft.com/office/drawing/2014/main" id="{79E1FB5E-2CBF-4EEA-883E-7871FE03C0B3}"/>
+              </a:ext>
+            </a:extLst>
+          </p:cNvPr>
+          <p:cNvSpPr>
+            <a:spLocks noGrp="1"/>
+          </p:cNvSpPr>
+          <p:nvPr>
+            <p:ph type="body" idx="1"/>
+          </p:nvPr>
+        </p:nvSpPr>
+        <p:spPr/>
+        <p:txBody>
+          <a:bodyPr/>
+          <a:lstStyle/>
+          <a:p>
+            <a:r>
+              <a:rPr lang="en-US" dirty="0"/>
+              <a:t>After 11 minutes</a:t>
+            </a:r>
+          </a:p>
+        </p:txBody>
+      </p:sp>
+      <p:sp>
+        <p:nvSpPr>
+          <p:cNvPr id="4" name="Slide Number Placeholder 3">
+            <a:extLst>
+              <a:ext uri="{FF2B5EF4-FFF2-40B4-BE49-F238E27FC236}">
+                <a16:creationId xmlns:a16="http://schemas.microsoft.com/office/drawing/2014/main" id="{3F289393-5440-595A-4732-13B9EF2E9E17}"/>
+              </a:ext>
+            </a:extLst>
+          </p:cNvPr>
+          <p:cNvSpPr>
+            <a:spLocks noGrp="1"/>
+          </p:cNvSpPr>
+          <p:nvPr>
+            <p:ph type="sldNum" sz="quarter" idx="5"/>
+          </p:nvPr>
+        </p:nvSpPr>
+        <p:spPr/>
+        <p:txBody>
+          <a:bodyPr/>
+          <a:lstStyle/>
+          <a:p>
+            <a:fld id="{3382154C-195E-409D-B180-B9427288A4D3}" type="slidenum">
+              <a:rPr lang="en-US" smtClean="0"/>
+              <a:t>7</a:t>
+            </a:fld>
+            <a:endParaRPr lang="en-US"/>
+          </a:p>
+        </p:txBody>
+      </p:sp>
+    </p:spTree>
+    <p:extLst>
+      <p:ext uri="{BB962C8B-B14F-4D97-AF65-F5344CB8AC3E}">
+        <p14:creationId xmlns:p14="http://schemas.microsoft.com/office/powerpoint/2010/main" val="997580991"/>
       </p:ext>
     </p:extLst>
   </p:cSld>
@@ -806,7 +1256,7 @@
           <a:p>
             <a:fld id="{7BD183E0-3EA4-4155-BA05-F484E6DA90A9}" type="datetimeFigureOut">
               <a:rPr lang="en-US" smtClean="0"/>
-              <a:t>11/19/2024</a:t>
+              <a:t>11/21/2024</a:t>
             </a:fld>
             <a:endParaRPr lang="en-US"/>
           </a:p>
@@ -1004,7 +1454,7 @@
           <a:p>
             <a:fld id="{7BD183E0-3EA4-4155-BA05-F484E6DA90A9}" type="datetimeFigureOut">
               <a:rPr lang="en-US" smtClean="0"/>
-              <a:t>11/19/2024</a:t>
+              <a:t>11/21/2024</a:t>
             </a:fld>
             <a:endParaRPr lang="en-US"/>
           </a:p>
@@ -1212,7 +1662,7 @@
           <a:p>
             <a:fld id="{7BD183E0-3EA4-4155-BA05-F484E6DA90A9}" type="datetimeFigureOut">
               <a:rPr lang="en-US" smtClean="0"/>
-              <a:t>11/19/2024</a:t>
+              <a:t>11/21/2024</a:t>
             </a:fld>
             <a:endParaRPr lang="en-US"/>
           </a:p>
@@ -1410,7 +1860,7 @@
           <a:p>
             <a:fld id="{7BD183E0-3EA4-4155-BA05-F484E6DA90A9}" type="datetimeFigureOut">
               <a:rPr lang="en-US" smtClean="0"/>
-              <a:t>11/19/2024</a:t>
+              <a:t>11/21/2024</a:t>
             </a:fld>
             <a:endParaRPr lang="en-US"/>
           </a:p>
@@ -1685,7 +2135,7 @@
           <a:p>
             <a:fld id="{7BD183E0-3EA4-4155-BA05-F484E6DA90A9}" type="datetimeFigureOut">
               <a:rPr lang="en-US" smtClean="0"/>
-              <a:t>11/19/2024</a:t>
+              <a:t>11/21/2024</a:t>
             </a:fld>
             <a:endParaRPr lang="en-US"/>
           </a:p>
@@ -1950,7 +2400,7 @@
           <a:p>
             <a:fld id="{7BD183E0-3EA4-4155-BA05-F484E6DA90A9}" type="datetimeFigureOut">
               <a:rPr lang="en-US" smtClean="0"/>
-              <a:t>11/19/2024</a:t>
+              <a:t>11/21/2024</a:t>
             </a:fld>
             <a:endParaRPr lang="en-US"/>
           </a:p>
@@ -2362,7 +2812,7 @@
           <a:p>
             <a:fld id="{7BD183E0-3EA4-4155-BA05-F484E6DA90A9}" type="datetimeFigureOut">
               <a:rPr lang="en-US" smtClean="0"/>
-              <a:t>11/19/2024</a:t>
+              <a:t>11/21/2024</a:t>
             </a:fld>
             <a:endParaRPr lang="en-US"/>
           </a:p>
@@ -2503,7 +2953,7 @@
           <a:p>
             <a:fld id="{7BD183E0-3EA4-4155-BA05-F484E6DA90A9}" type="datetimeFigureOut">
               <a:rPr lang="en-US" smtClean="0"/>
-              <a:t>11/19/2024</a:t>
+              <a:t>11/21/2024</a:t>
             </a:fld>
             <a:endParaRPr lang="en-US"/>
           </a:p>
@@ -2616,7 +3066,7 @@
           <a:p>
             <a:fld id="{7BD183E0-3EA4-4155-BA05-F484E6DA90A9}" type="datetimeFigureOut">
               <a:rPr lang="en-US" smtClean="0"/>
-              <a:t>11/19/2024</a:t>
+              <a:t>11/21/2024</a:t>
             </a:fld>
             <a:endParaRPr lang="en-US"/>
           </a:p>
@@ -2927,7 +3377,7 @@
           <a:p>
             <a:fld id="{7BD183E0-3EA4-4155-BA05-F484E6DA90A9}" type="datetimeFigureOut">
               <a:rPr lang="en-US" smtClean="0"/>
-              <a:t>11/19/2024</a:t>
+              <a:t>11/21/2024</a:t>
             </a:fld>
             <a:endParaRPr lang="en-US"/>
           </a:p>
@@ -3215,7 +3665,7 @@
           <a:p>
             <a:fld id="{7BD183E0-3EA4-4155-BA05-F484E6DA90A9}" type="datetimeFigureOut">
               <a:rPr lang="en-US" smtClean="0"/>
-              <a:t>11/19/2024</a:t>
+              <a:t>11/21/2024</a:t>
             </a:fld>
             <a:endParaRPr lang="en-US"/>
           </a:p>
@@ -3456,7 +3906,7 @@
           <a:p>
             <a:fld id="{7BD183E0-3EA4-4155-BA05-F484E6DA90A9}" type="datetimeFigureOut">
               <a:rPr lang="en-US" smtClean="0"/>
-              <a:t>11/19/2024</a:t>
+              <a:t>11/21/2024</a:t>
             </a:fld>
             <a:endParaRPr lang="en-US"/>
           </a:p>
@@ -4702,7 +5152,7 @@
           <a:lstStyle/>
           <a:p>
             <a:r>
-              <a:rPr lang="en-US" kern="1200">
+              <a:rPr lang="en-US" kern="1200" dirty="0">
                 <a:solidFill>
                   <a:schemeClr val="tx1"/>
                 </a:solidFill>
@@ -4710,8 +5160,31 @@
                 <a:ea typeface="+mj-ea"/>
                 <a:cs typeface="+mj-cs"/>
               </a:rPr>
-              <a:t>Team NoGrads</a:t>
-            </a:r>
+              <a:t>Team </a:t>
+            </a:r>
+            <a:r>
+              <a:rPr lang="en-US" kern="1200" dirty="0" err="1">
+                <a:solidFill>
+                  <a:schemeClr val="tx1"/>
+                </a:solidFill>
+                <a:latin typeface="+mj-lt"/>
+                <a:ea typeface="+mj-ea"/>
+                <a:cs typeface="+mj-cs"/>
+              </a:rPr>
+              <a:t>NoGrads</a:t>
+            </a:r>
+            <a:r>
+              <a:rPr lang="en-US" dirty="0"/>
+              <a:t> // Godot Game Project</a:t>
+            </a:r>
+            <a:endParaRPr lang="en-US" kern="1200" dirty="0">
+              <a:solidFill>
+                <a:schemeClr val="tx1"/>
+              </a:solidFill>
+              <a:latin typeface="+mj-lt"/>
+              <a:ea typeface="+mj-ea"/>
+              <a:cs typeface="+mj-cs"/>
+            </a:endParaRPr>
           </a:p>
         </p:txBody>
       </p:sp>
@@ -4774,7 +5247,7 @@
               <a:rPr lang="en-US" sz="2000" b="0" i="0" dirty="0">
                 <a:effectLst/>
               </a:rPr>
-              <a:t>Team Role: Game Engine Designer</a:t>
+              <a:t>Team Role: Gameplay and Mechanics Developer</a:t>
             </a:r>
           </a:p>
           <a:p>
@@ -4800,7 +5273,7 @@
               <a:rPr lang="en-US" sz="2000" b="0" i="0" dirty="0">
                 <a:effectLst/>
               </a:rPr>
-              <a:t>Team Role: Art and Level Designer</a:t>
+              <a:t>Team Role: Systems and Gameplay UI Developer</a:t>
             </a:r>
           </a:p>
           <a:p>
@@ -4820,7 +5293,7 @@
             <a:pPr lvl="1"/>
             <a:r>
               <a:rPr lang="en-US" sz="2000" dirty="0"/>
-              <a:t>Team Role: Story Writer, Sound Designer and Balance Tester</a:t>
+              <a:t>Team Role: Narrative and Music Developer</a:t>
             </a:r>
           </a:p>
           <a:p>
@@ -4845,12 +5318,8 @@
             <a:pPr lvl="1"/>
             <a:r>
               <a:rPr lang="en-US" sz="2000" dirty="0"/>
-              <a:t>Team Role: UI Designer</a:t>
-            </a:r>
-          </a:p>
-          <a:p>
-            <a:pPr lvl="1"/>
-            <a:endParaRPr lang="en-US" sz="2000" dirty="0"/>
+              <a:t>Team Role: Level and Menu UI Developer</a:t>
+            </a:r>
           </a:p>
         </p:txBody>
       </p:sp>
@@ -5216,7 +5685,7 @@
                 <a:ea typeface="+mj-ea"/>
                 <a:cs typeface="+mj-cs"/>
               </a:rPr>
-              <a:t>Our Project</a:t>
+              <a:t>Our Pitch</a:t>
             </a:r>
           </a:p>
         </p:txBody>
@@ -5319,6 +5788,1684 @@
     <p:extLst>
       <p:ext uri="{BB962C8B-B14F-4D97-AF65-F5344CB8AC3E}">
         <p14:creationId xmlns:p14="http://schemas.microsoft.com/office/powerpoint/2010/main" val="4157634952"/>
+      </p:ext>
+    </p:extLst>
+  </p:cSld>
+  <p:clrMapOvr>
+    <a:overrideClrMapping bg1="dk1" tx1="lt1" bg2="dk2" tx2="lt2" accent1="accent1" accent2="accent2" accent3="accent3" accent4="accent4" accent5="accent5" accent6="accent6" hlink="hlink" folHlink="folHlink"/>
+  </p:clrMapOvr>
+</p:sld>
+</file>
+
+<file path=ppt/slides/slide4.xml><?xml version="1.0" encoding="utf-8"?>
+<p:sld xmlns:a="http://schemas.openxmlformats.org/drawingml/2006/main" xmlns:r="http://schemas.openxmlformats.org/officeDocument/2006/relationships" xmlns:p="http://schemas.openxmlformats.org/presentationml/2006/main">
+  <p:cSld>
+    <p:bg>
+      <p:bgPr>
+        <a:solidFill>
+          <a:srgbClr val="404040"/>
+        </a:solidFill>
+        <a:effectLst/>
+      </p:bgPr>
+    </p:bg>
+    <p:spTree>
+      <p:nvGrpSpPr>
+        <p:cNvPr id="1" name="">
+          <a:extLst>
+            <a:ext uri="{FF2B5EF4-FFF2-40B4-BE49-F238E27FC236}">
+              <a16:creationId xmlns:a16="http://schemas.microsoft.com/office/drawing/2014/main" id="{08A73C29-862A-2EC5-748F-4F7AB8892323}"/>
+            </a:ext>
+          </a:extLst>
+        </p:cNvPr>
+        <p:cNvGrpSpPr/>
+        <p:nvPr/>
+      </p:nvGrpSpPr>
+      <p:grpSpPr>
+        <a:xfrm>
+          <a:off x="0" y="0"/>
+          <a:ext cx="0" cy="0"/>
+          <a:chOff x="0" y="0"/>
+          <a:chExt cx="0" cy="0"/>
+        </a:xfrm>
+      </p:grpSpPr>
+      <p:sp>
+        <p:nvSpPr>
+          <p:cNvPr id="23" name="Rectangle 22">
+            <a:extLst>
+              <a:ext uri="{FF2B5EF4-FFF2-40B4-BE49-F238E27FC236}">
+                <a16:creationId xmlns:a16="http://schemas.microsoft.com/office/drawing/2014/main" id="{B6342A37-7FAB-098C-BB51-DBEFC3BCB01B}"/>
+              </a:ext>
+              <a:ext uri="{C183D7F6-B498-43B3-948B-1728B52AA6E4}">
+                <adec:decorative xmlns:adec="http://schemas.microsoft.com/office/drawing/2017/decorative" val="1"/>
+              </a:ext>
+            </a:extLst>
+          </p:cNvPr>
+          <p:cNvSpPr>
+            <a:spLocks noGrp="1" noRot="1" noChangeAspect="1" noMove="1" noResize="1" noEditPoints="1" noAdjustHandles="1" noChangeArrowheads="1" noChangeShapeType="1" noTextEdit="1"/>
+          </p:cNvSpPr>
+          <p:nvPr>
+            <p:extLst>
+              <p:ext uri="{386F3935-93C4-4BCD-93E2-E3B085C9AB24}">
+                <p16:designElem xmlns:p16="http://schemas.microsoft.com/office/powerpoint/2015/main" val="1"/>
+              </p:ext>
+            </p:extLst>
+          </p:nvPr>
+        </p:nvSpPr>
+        <p:spPr>
+          <a:xfrm>
+            <a:off x="0" y="-3324"/>
+            <a:ext cx="12192000" cy="6861324"/>
+          </a:xfrm>
+          <a:prstGeom prst="rect">
+            <a:avLst/>
+          </a:prstGeom>
+          <a:solidFill>
+            <a:srgbClr val="404040"/>
+          </a:solidFill>
+          <a:ln>
+            <a:noFill/>
+          </a:ln>
+        </p:spPr>
+        <p:style>
+          <a:lnRef idx="2">
+            <a:schemeClr val="accent1">
+              <a:shade val="50000"/>
+            </a:schemeClr>
+          </a:lnRef>
+          <a:fillRef idx="1">
+            <a:schemeClr val="accent1"/>
+          </a:fillRef>
+          <a:effectRef idx="0">
+            <a:schemeClr val="accent1"/>
+          </a:effectRef>
+          <a:fontRef idx="minor">
+            <a:schemeClr val="lt1"/>
+          </a:fontRef>
+        </p:style>
+        <p:txBody>
+          <a:bodyPr rtlCol="0" anchor="ctr"/>
+          <a:lstStyle/>
+          <a:p>
+            <a:pPr algn="ctr"/>
+            <a:endParaRPr lang="en-US"/>
+          </a:p>
+        </p:txBody>
+      </p:sp>
+      <p:sp>
+        <p:nvSpPr>
+          <p:cNvPr id="25" name="Freeform 13">
+            <a:extLst>
+              <a:ext uri="{FF2B5EF4-FFF2-40B4-BE49-F238E27FC236}">
+                <a16:creationId xmlns:a16="http://schemas.microsoft.com/office/drawing/2014/main" id="{283B7E47-F7B2-EEF7-9CD5-658254C83C22}"/>
+              </a:ext>
+              <a:ext uri="{C183D7F6-B498-43B3-948B-1728B52AA6E4}">
+                <adec:decorative xmlns:adec="http://schemas.microsoft.com/office/drawing/2017/decorative" val="1"/>
+              </a:ext>
+            </a:extLst>
+          </p:cNvPr>
+          <p:cNvSpPr>
+            <a:spLocks noGrp="1" noRot="1" noChangeAspect="1" noMove="1" noResize="1" noEditPoints="1" noAdjustHandles="1" noChangeArrowheads="1" noChangeShapeType="1" noTextEdit="1"/>
+          </p:cNvSpPr>
+          <p:nvPr>
+            <p:extLst>
+              <p:ext uri="{386F3935-93C4-4BCD-93E2-E3B085C9AB24}">
+                <p16:designElem xmlns:p16="http://schemas.microsoft.com/office/powerpoint/2015/main" val="1"/>
+              </p:ext>
+            </p:extLst>
+          </p:nvPr>
+        </p:nvSpPr>
+        <p:spPr>
+          <a:xfrm>
+            <a:off x="0" y="0"/>
+            <a:ext cx="11786754" cy="6858000"/>
+          </a:xfrm>
+          <a:custGeom>
+            <a:avLst/>
+            <a:gdLst>
+              <a:gd name="connsiteX0" fmla="*/ 0 w 11786754"/>
+              <a:gd name="connsiteY0" fmla="*/ 0 h 6858000"/>
+              <a:gd name="connsiteX1" fmla="*/ 8610600 w 11786754"/>
+              <a:gd name="connsiteY1" fmla="*/ 0 h 6858000"/>
+              <a:gd name="connsiteX2" fmla="*/ 11786754 w 11786754"/>
+              <a:gd name="connsiteY2" fmla="*/ 6858000 h 6858000"/>
+              <a:gd name="connsiteX3" fmla="*/ 0 w 11786754"/>
+              <a:gd name="connsiteY3" fmla="*/ 6858000 h 6858000"/>
+            </a:gdLst>
+            <a:ahLst/>
+            <a:cxnLst>
+              <a:cxn ang="0">
+                <a:pos x="connsiteX0" y="connsiteY0"/>
+              </a:cxn>
+              <a:cxn ang="0">
+                <a:pos x="connsiteX1" y="connsiteY1"/>
+              </a:cxn>
+              <a:cxn ang="0">
+                <a:pos x="connsiteX2" y="connsiteY2"/>
+              </a:cxn>
+              <a:cxn ang="0">
+                <a:pos x="connsiteX3" y="connsiteY3"/>
+              </a:cxn>
+            </a:cxnLst>
+            <a:rect l="l" t="t" r="r" b="b"/>
+            <a:pathLst>
+              <a:path w="11786754" h="6858000">
+                <a:moveTo>
+                  <a:pt x="0" y="0"/>
+                </a:moveTo>
+                <a:lnTo>
+                  <a:pt x="8610600" y="0"/>
+                </a:lnTo>
+                <a:lnTo>
+                  <a:pt x="11786754" y="6858000"/>
+                </a:lnTo>
+                <a:lnTo>
+                  <a:pt x="0" y="6858000"/>
+                </a:lnTo>
+                <a:close/>
+              </a:path>
+            </a:pathLst>
+          </a:custGeom>
+          <a:solidFill>
+            <a:schemeClr val="bg1">
+              <a:alpha val="30000"/>
+            </a:schemeClr>
+          </a:solidFill>
+          <a:ln>
+            <a:noFill/>
+          </a:ln>
+        </p:spPr>
+        <p:style>
+          <a:lnRef idx="2">
+            <a:schemeClr val="accent1">
+              <a:shade val="50000"/>
+            </a:schemeClr>
+          </a:lnRef>
+          <a:fillRef idx="1">
+            <a:schemeClr val="accent1"/>
+          </a:fillRef>
+          <a:effectRef idx="0">
+            <a:schemeClr val="accent1"/>
+          </a:effectRef>
+          <a:fontRef idx="minor">
+            <a:schemeClr val="lt1"/>
+          </a:fontRef>
+        </p:style>
+        <p:txBody>
+          <a:bodyPr rtlCol="0" anchor="ctr"/>
+          <a:lstStyle/>
+          <a:p>
+            <a:pPr algn="ctr"/>
+            <a:endParaRPr lang="en-US"/>
+          </a:p>
+        </p:txBody>
+      </p:sp>
+      <p:sp>
+        <p:nvSpPr>
+          <p:cNvPr id="27" name="Freeform 11">
+            <a:extLst>
+              <a:ext uri="{FF2B5EF4-FFF2-40B4-BE49-F238E27FC236}">
+                <a16:creationId xmlns:a16="http://schemas.microsoft.com/office/drawing/2014/main" id="{AE5AD181-B4EB-9BF7-4CF0-8AEF3E7D73F6}"/>
+              </a:ext>
+              <a:ext uri="{C183D7F6-B498-43B3-948B-1728B52AA6E4}">
+                <adec:decorative xmlns:adec="http://schemas.microsoft.com/office/drawing/2017/decorative" val="1"/>
+              </a:ext>
+            </a:extLst>
+          </p:cNvPr>
+          <p:cNvSpPr>
+            <a:spLocks noGrp="1" noRot="1" noChangeAspect="1" noMove="1" noResize="1" noEditPoints="1" noAdjustHandles="1" noChangeArrowheads="1" noChangeShapeType="1" noTextEdit="1"/>
+          </p:cNvSpPr>
+          <p:nvPr>
+            <p:extLst>
+              <p:ext uri="{386F3935-93C4-4BCD-93E2-E3B085C9AB24}">
+                <p16:designElem xmlns:p16="http://schemas.microsoft.com/office/powerpoint/2015/main" val="1"/>
+              </p:ext>
+            </p:extLst>
+          </p:nvPr>
+        </p:nvSpPr>
+        <p:spPr>
+          <a:xfrm>
+            <a:off x="0" y="0"/>
+            <a:ext cx="3581400" cy="6858000"/>
+          </a:xfrm>
+          <a:custGeom>
+            <a:avLst/>
+            <a:gdLst>
+              <a:gd name="connsiteX0" fmla="*/ 0 w 3581400"/>
+              <a:gd name="connsiteY0" fmla="*/ 0 h 6858000"/>
+              <a:gd name="connsiteX1" fmla="*/ 405246 w 3581400"/>
+              <a:gd name="connsiteY1" fmla="*/ 0 h 6858000"/>
+              <a:gd name="connsiteX2" fmla="*/ 3581400 w 3581400"/>
+              <a:gd name="connsiteY2" fmla="*/ 6858000 h 6858000"/>
+              <a:gd name="connsiteX3" fmla="*/ 0 w 3581400"/>
+              <a:gd name="connsiteY3" fmla="*/ 6858000 h 6858000"/>
+            </a:gdLst>
+            <a:ahLst/>
+            <a:cxnLst>
+              <a:cxn ang="0">
+                <a:pos x="connsiteX0" y="connsiteY0"/>
+              </a:cxn>
+              <a:cxn ang="0">
+                <a:pos x="connsiteX1" y="connsiteY1"/>
+              </a:cxn>
+              <a:cxn ang="0">
+                <a:pos x="connsiteX2" y="connsiteY2"/>
+              </a:cxn>
+              <a:cxn ang="0">
+                <a:pos x="connsiteX3" y="connsiteY3"/>
+              </a:cxn>
+            </a:cxnLst>
+            <a:rect l="l" t="t" r="r" b="b"/>
+            <a:pathLst>
+              <a:path w="3581400" h="6858000">
+                <a:moveTo>
+                  <a:pt x="0" y="0"/>
+                </a:moveTo>
+                <a:lnTo>
+                  <a:pt x="405246" y="0"/>
+                </a:lnTo>
+                <a:lnTo>
+                  <a:pt x="3581400" y="6858000"/>
+                </a:lnTo>
+                <a:lnTo>
+                  <a:pt x="0" y="6858000"/>
+                </a:lnTo>
+                <a:close/>
+              </a:path>
+            </a:pathLst>
+          </a:custGeom>
+          <a:solidFill>
+            <a:schemeClr val="bg1">
+              <a:alpha val="30000"/>
+            </a:schemeClr>
+          </a:solidFill>
+          <a:ln>
+            <a:noFill/>
+          </a:ln>
+        </p:spPr>
+        <p:style>
+          <a:lnRef idx="2">
+            <a:schemeClr val="accent1">
+              <a:shade val="50000"/>
+            </a:schemeClr>
+          </a:lnRef>
+          <a:fillRef idx="1">
+            <a:schemeClr val="accent1"/>
+          </a:fillRef>
+          <a:effectRef idx="0">
+            <a:schemeClr val="accent1"/>
+          </a:effectRef>
+          <a:fontRef idx="minor">
+            <a:schemeClr val="lt1"/>
+          </a:fontRef>
+        </p:style>
+        <p:txBody>
+          <a:bodyPr wrap="square" rtlCol="0" anchor="ctr">
+            <a:noAutofit/>
+          </a:bodyPr>
+          <a:lstStyle/>
+          <a:p>
+            <a:pPr algn="ctr"/>
+            <a:endParaRPr lang="en-US"/>
+          </a:p>
+        </p:txBody>
+      </p:sp>
+      <p:sp>
+        <p:nvSpPr>
+          <p:cNvPr id="6" name="Title 5">
+            <a:extLst>
+              <a:ext uri="{FF2B5EF4-FFF2-40B4-BE49-F238E27FC236}">
+                <a16:creationId xmlns:a16="http://schemas.microsoft.com/office/drawing/2014/main" id="{C875C783-8615-2D19-C8C6-229FF12C6953}"/>
+              </a:ext>
+            </a:extLst>
+          </p:cNvPr>
+          <p:cNvSpPr>
+            <a:spLocks noGrp="1"/>
+          </p:cNvSpPr>
+          <p:nvPr>
+            <p:ph type="title"/>
+          </p:nvPr>
+        </p:nvSpPr>
+        <p:spPr>
+          <a:xfrm>
+            <a:off x="838200" y="365125"/>
+            <a:ext cx="10515600" cy="1325563"/>
+          </a:xfrm>
+        </p:spPr>
+        <p:txBody>
+          <a:bodyPr vert="horz" lIns="91440" tIns="45720" rIns="91440" bIns="45720" rtlCol="0" anchor="ctr">
+            <a:normAutofit/>
+          </a:bodyPr>
+          <a:lstStyle/>
+          <a:p>
+            <a:r>
+              <a:rPr lang="en-US" kern="1200" dirty="0">
+                <a:solidFill>
+                  <a:schemeClr val="tx1"/>
+                </a:solidFill>
+                <a:latin typeface="+mj-lt"/>
+                <a:ea typeface="+mj-ea"/>
+                <a:cs typeface="+mj-cs"/>
+              </a:rPr>
+              <a:t>Overview</a:t>
+            </a:r>
+          </a:p>
+        </p:txBody>
+      </p:sp>
+      <p:sp>
+        <p:nvSpPr>
+          <p:cNvPr id="3" name="Content Placeholder 2">
+            <a:extLst>
+              <a:ext uri="{FF2B5EF4-FFF2-40B4-BE49-F238E27FC236}">
+                <a16:creationId xmlns:a16="http://schemas.microsoft.com/office/drawing/2014/main" id="{FD435138-5F43-5D04-088C-3015C2794A12}"/>
+              </a:ext>
+            </a:extLst>
+          </p:cNvPr>
+          <p:cNvSpPr>
+            <a:spLocks noGrp="1"/>
+          </p:cNvSpPr>
+          <p:nvPr>
+            <p:ph idx="1"/>
+          </p:nvPr>
+        </p:nvSpPr>
+        <p:spPr>
+          <a:xfrm>
+            <a:off x="838200" y="2010833"/>
+            <a:ext cx="10515600" cy="4166130"/>
+          </a:xfrm>
+        </p:spPr>
+        <p:txBody>
+          <a:bodyPr vert="horz" lIns="91440" tIns="45720" rIns="91440" bIns="45720" rtlCol="0">
+            <a:normAutofit/>
+          </a:bodyPr>
+          <a:lstStyle/>
+          <a:p>
+            <a:r>
+              <a:rPr lang="en-US" sz="2000" dirty="0">
+                <a:latin typeface="-apple-system"/>
+              </a:rPr>
+              <a:t>Outline of presentation</a:t>
+            </a:r>
+          </a:p>
+          <a:p>
+            <a:r>
+              <a:rPr lang="en-US" sz="2000" dirty="0">
+                <a:latin typeface="-apple-system"/>
+              </a:rPr>
+              <a:t>Architecture overview figure </a:t>
+            </a:r>
+            <a:endParaRPr lang="en-US" sz="2000" dirty="0"/>
+          </a:p>
+        </p:txBody>
+      </p:sp>
+    </p:spTree>
+    <p:extLst>
+      <p:ext uri="{BB962C8B-B14F-4D97-AF65-F5344CB8AC3E}">
+        <p14:creationId xmlns:p14="http://schemas.microsoft.com/office/powerpoint/2010/main" val="561784491"/>
+      </p:ext>
+    </p:extLst>
+  </p:cSld>
+  <p:clrMapOvr>
+    <a:overrideClrMapping bg1="dk1" tx1="lt1" bg2="dk2" tx2="lt2" accent1="accent1" accent2="accent2" accent3="accent3" accent4="accent4" accent5="accent5" accent6="accent6" hlink="hlink" folHlink="folHlink"/>
+  </p:clrMapOvr>
+</p:sld>
+</file>
+
+<file path=ppt/slides/slide5.xml><?xml version="1.0" encoding="utf-8"?>
+<p:sld xmlns:a="http://schemas.openxmlformats.org/drawingml/2006/main" xmlns:r="http://schemas.openxmlformats.org/officeDocument/2006/relationships" xmlns:p="http://schemas.openxmlformats.org/presentationml/2006/main">
+  <p:cSld>
+    <p:bg>
+      <p:bgPr>
+        <a:solidFill>
+          <a:srgbClr val="404040"/>
+        </a:solidFill>
+        <a:effectLst/>
+      </p:bgPr>
+    </p:bg>
+    <p:spTree>
+      <p:nvGrpSpPr>
+        <p:cNvPr id="1" name="">
+          <a:extLst>
+            <a:ext uri="{FF2B5EF4-FFF2-40B4-BE49-F238E27FC236}">
+              <a16:creationId xmlns:a16="http://schemas.microsoft.com/office/drawing/2014/main" id="{C21CB6DF-5250-5059-E5CF-B1B545E207F8}"/>
+            </a:ext>
+          </a:extLst>
+        </p:cNvPr>
+        <p:cNvGrpSpPr/>
+        <p:nvPr/>
+      </p:nvGrpSpPr>
+      <p:grpSpPr>
+        <a:xfrm>
+          <a:off x="0" y="0"/>
+          <a:ext cx="0" cy="0"/>
+          <a:chOff x="0" y="0"/>
+          <a:chExt cx="0" cy="0"/>
+        </a:xfrm>
+      </p:grpSpPr>
+      <p:sp>
+        <p:nvSpPr>
+          <p:cNvPr id="23" name="Rectangle 22">
+            <a:extLst>
+              <a:ext uri="{FF2B5EF4-FFF2-40B4-BE49-F238E27FC236}">
+                <a16:creationId xmlns:a16="http://schemas.microsoft.com/office/drawing/2014/main" id="{2CEF39E9-3B16-96BC-8C99-2CB0C7FA02DC}"/>
+              </a:ext>
+              <a:ext uri="{C183D7F6-B498-43B3-948B-1728B52AA6E4}">
+                <adec:decorative xmlns:adec="http://schemas.microsoft.com/office/drawing/2017/decorative" val="1"/>
+              </a:ext>
+            </a:extLst>
+          </p:cNvPr>
+          <p:cNvSpPr>
+            <a:spLocks noGrp="1" noRot="1" noChangeAspect="1" noMove="1" noResize="1" noEditPoints="1" noAdjustHandles="1" noChangeArrowheads="1" noChangeShapeType="1" noTextEdit="1"/>
+          </p:cNvSpPr>
+          <p:nvPr>
+            <p:extLst>
+              <p:ext uri="{386F3935-93C4-4BCD-93E2-E3B085C9AB24}">
+                <p16:designElem xmlns:p16="http://schemas.microsoft.com/office/powerpoint/2015/main" val="1"/>
+              </p:ext>
+            </p:extLst>
+          </p:nvPr>
+        </p:nvSpPr>
+        <p:spPr>
+          <a:xfrm>
+            <a:off x="0" y="-3324"/>
+            <a:ext cx="12192000" cy="6861324"/>
+          </a:xfrm>
+          <a:prstGeom prst="rect">
+            <a:avLst/>
+          </a:prstGeom>
+          <a:solidFill>
+            <a:srgbClr val="404040"/>
+          </a:solidFill>
+          <a:ln>
+            <a:noFill/>
+          </a:ln>
+        </p:spPr>
+        <p:style>
+          <a:lnRef idx="2">
+            <a:schemeClr val="accent1">
+              <a:shade val="50000"/>
+            </a:schemeClr>
+          </a:lnRef>
+          <a:fillRef idx="1">
+            <a:schemeClr val="accent1"/>
+          </a:fillRef>
+          <a:effectRef idx="0">
+            <a:schemeClr val="accent1"/>
+          </a:effectRef>
+          <a:fontRef idx="minor">
+            <a:schemeClr val="lt1"/>
+          </a:fontRef>
+        </p:style>
+        <p:txBody>
+          <a:bodyPr rtlCol="0" anchor="ctr"/>
+          <a:lstStyle/>
+          <a:p>
+            <a:pPr algn="ctr"/>
+            <a:endParaRPr lang="en-US"/>
+          </a:p>
+        </p:txBody>
+      </p:sp>
+      <p:sp>
+        <p:nvSpPr>
+          <p:cNvPr id="25" name="Freeform 13">
+            <a:extLst>
+              <a:ext uri="{FF2B5EF4-FFF2-40B4-BE49-F238E27FC236}">
+                <a16:creationId xmlns:a16="http://schemas.microsoft.com/office/drawing/2014/main" id="{28FACFF9-8453-083B-9058-8F0FA176B3F6}"/>
+              </a:ext>
+              <a:ext uri="{C183D7F6-B498-43B3-948B-1728B52AA6E4}">
+                <adec:decorative xmlns:adec="http://schemas.microsoft.com/office/drawing/2017/decorative" val="1"/>
+              </a:ext>
+            </a:extLst>
+          </p:cNvPr>
+          <p:cNvSpPr>
+            <a:spLocks noGrp="1" noRot="1" noChangeAspect="1" noMove="1" noResize="1" noEditPoints="1" noAdjustHandles="1" noChangeArrowheads="1" noChangeShapeType="1" noTextEdit="1"/>
+          </p:cNvSpPr>
+          <p:nvPr>
+            <p:extLst>
+              <p:ext uri="{386F3935-93C4-4BCD-93E2-E3B085C9AB24}">
+                <p16:designElem xmlns:p16="http://schemas.microsoft.com/office/powerpoint/2015/main" val="1"/>
+              </p:ext>
+            </p:extLst>
+          </p:nvPr>
+        </p:nvSpPr>
+        <p:spPr>
+          <a:xfrm>
+            <a:off x="0" y="0"/>
+            <a:ext cx="11786754" cy="6858000"/>
+          </a:xfrm>
+          <a:custGeom>
+            <a:avLst/>
+            <a:gdLst>
+              <a:gd name="connsiteX0" fmla="*/ 0 w 11786754"/>
+              <a:gd name="connsiteY0" fmla="*/ 0 h 6858000"/>
+              <a:gd name="connsiteX1" fmla="*/ 8610600 w 11786754"/>
+              <a:gd name="connsiteY1" fmla="*/ 0 h 6858000"/>
+              <a:gd name="connsiteX2" fmla="*/ 11786754 w 11786754"/>
+              <a:gd name="connsiteY2" fmla="*/ 6858000 h 6858000"/>
+              <a:gd name="connsiteX3" fmla="*/ 0 w 11786754"/>
+              <a:gd name="connsiteY3" fmla="*/ 6858000 h 6858000"/>
+            </a:gdLst>
+            <a:ahLst/>
+            <a:cxnLst>
+              <a:cxn ang="0">
+                <a:pos x="connsiteX0" y="connsiteY0"/>
+              </a:cxn>
+              <a:cxn ang="0">
+                <a:pos x="connsiteX1" y="connsiteY1"/>
+              </a:cxn>
+              <a:cxn ang="0">
+                <a:pos x="connsiteX2" y="connsiteY2"/>
+              </a:cxn>
+              <a:cxn ang="0">
+                <a:pos x="connsiteX3" y="connsiteY3"/>
+              </a:cxn>
+            </a:cxnLst>
+            <a:rect l="l" t="t" r="r" b="b"/>
+            <a:pathLst>
+              <a:path w="11786754" h="6858000">
+                <a:moveTo>
+                  <a:pt x="0" y="0"/>
+                </a:moveTo>
+                <a:lnTo>
+                  <a:pt x="8610600" y="0"/>
+                </a:lnTo>
+                <a:lnTo>
+                  <a:pt x="11786754" y="6858000"/>
+                </a:lnTo>
+                <a:lnTo>
+                  <a:pt x="0" y="6858000"/>
+                </a:lnTo>
+                <a:close/>
+              </a:path>
+            </a:pathLst>
+          </a:custGeom>
+          <a:solidFill>
+            <a:schemeClr val="bg1">
+              <a:alpha val="30000"/>
+            </a:schemeClr>
+          </a:solidFill>
+          <a:ln>
+            <a:noFill/>
+          </a:ln>
+        </p:spPr>
+        <p:style>
+          <a:lnRef idx="2">
+            <a:schemeClr val="accent1">
+              <a:shade val="50000"/>
+            </a:schemeClr>
+          </a:lnRef>
+          <a:fillRef idx="1">
+            <a:schemeClr val="accent1"/>
+          </a:fillRef>
+          <a:effectRef idx="0">
+            <a:schemeClr val="accent1"/>
+          </a:effectRef>
+          <a:fontRef idx="minor">
+            <a:schemeClr val="lt1"/>
+          </a:fontRef>
+        </p:style>
+        <p:txBody>
+          <a:bodyPr rtlCol="0" anchor="ctr"/>
+          <a:lstStyle/>
+          <a:p>
+            <a:pPr algn="ctr"/>
+            <a:endParaRPr lang="en-US"/>
+          </a:p>
+        </p:txBody>
+      </p:sp>
+      <p:sp>
+        <p:nvSpPr>
+          <p:cNvPr id="27" name="Freeform 11">
+            <a:extLst>
+              <a:ext uri="{FF2B5EF4-FFF2-40B4-BE49-F238E27FC236}">
+                <a16:creationId xmlns:a16="http://schemas.microsoft.com/office/drawing/2014/main" id="{734FA923-F646-8361-F2C0-845BD0DF35B1}"/>
+              </a:ext>
+              <a:ext uri="{C183D7F6-B498-43B3-948B-1728B52AA6E4}">
+                <adec:decorative xmlns:adec="http://schemas.microsoft.com/office/drawing/2017/decorative" val="1"/>
+              </a:ext>
+            </a:extLst>
+          </p:cNvPr>
+          <p:cNvSpPr>
+            <a:spLocks noGrp="1" noRot="1" noChangeAspect="1" noMove="1" noResize="1" noEditPoints="1" noAdjustHandles="1" noChangeArrowheads="1" noChangeShapeType="1" noTextEdit="1"/>
+          </p:cNvSpPr>
+          <p:nvPr>
+            <p:extLst>
+              <p:ext uri="{386F3935-93C4-4BCD-93E2-E3B085C9AB24}">
+                <p16:designElem xmlns:p16="http://schemas.microsoft.com/office/powerpoint/2015/main" val="1"/>
+              </p:ext>
+            </p:extLst>
+          </p:nvPr>
+        </p:nvSpPr>
+        <p:spPr>
+          <a:xfrm>
+            <a:off x="0" y="0"/>
+            <a:ext cx="3581400" cy="6858000"/>
+          </a:xfrm>
+          <a:custGeom>
+            <a:avLst/>
+            <a:gdLst>
+              <a:gd name="connsiteX0" fmla="*/ 0 w 3581400"/>
+              <a:gd name="connsiteY0" fmla="*/ 0 h 6858000"/>
+              <a:gd name="connsiteX1" fmla="*/ 405246 w 3581400"/>
+              <a:gd name="connsiteY1" fmla="*/ 0 h 6858000"/>
+              <a:gd name="connsiteX2" fmla="*/ 3581400 w 3581400"/>
+              <a:gd name="connsiteY2" fmla="*/ 6858000 h 6858000"/>
+              <a:gd name="connsiteX3" fmla="*/ 0 w 3581400"/>
+              <a:gd name="connsiteY3" fmla="*/ 6858000 h 6858000"/>
+            </a:gdLst>
+            <a:ahLst/>
+            <a:cxnLst>
+              <a:cxn ang="0">
+                <a:pos x="connsiteX0" y="connsiteY0"/>
+              </a:cxn>
+              <a:cxn ang="0">
+                <a:pos x="connsiteX1" y="connsiteY1"/>
+              </a:cxn>
+              <a:cxn ang="0">
+                <a:pos x="connsiteX2" y="connsiteY2"/>
+              </a:cxn>
+              <a:cxn ang="0">
+                <a:pos x="connsiteX3" y="connsiteY3"/>
+              </a:cxn>
+            </a:cxnLst>
+            <a:rect l="l" t="t" r="r" b="b"/>
+            <a:pathLst>
+              <a:path w="3581400" h="6858000">
+                <a:moveTo>
+                  <a:pt x="0" y="0"/>
+                </a:moveTo>
+                <a:lnTo>
+                  <a:pt x="405246" y="0"/>
+                </a:lnTo>
+                <a:lnTo>
+                  <a:pt x="3581400" y="6858000"/>
+                </a:lnTo>
+                <a:lnTo>
+                  <a:pt x="0" y="6858000"/>
+                </a:lnTo>
+                <a:close/>
+              </a:path>
+            </a:pathLst>
+          </a:custGeom>
+          <a:solidFill>
+            <a:schemeClr val="bg1">
+              <a:alpha val="30000"/>
+            </a:schemeClr>
+          </a:solidFill>
+          <a:ln>
+            <a:noFill/>
+          </a:ln>
+        </p:spPr>
+        <p:style>
+          <a:lnRef idx="2">
+            <a:schemeClr val="accent1">
+              <a:shade val="50000"/>
+            </a:schemeClr>
+          </a:lnRef>
+          <a:fillRef idx="1">
+            <a:schemeClr val="accent1"/>
+          </a:fillRef>
+          <a:effectRef idx="0">
+            <a:schemeClr val="accent1"/>
+          </a:effectRef>
+          <a:fontRef idx="minor">
+            <a:schemeClr val="lt1"/>
+          </a:fontRef>
+        </p:style>
+        <p:txBody>
+          <a:bodyPr wrap="square" rtlCol="0" anchor="ctr">
+            <a:noAutofit/>
+          </a:bodyPr>
+          <a:lstStyle/>
+          <a:p>
+            <a:pPr algn="ctr"/>
+            <a:endParaRPr lang="en-US"/>
+          </a:p>
+        </p:txBody>
+      </p:sp>
+      <p:sp>
+        <p:nvSpPr>
+          <p:cNvPr id="6" name="Title 5">
+            <a:extLst>
+              <a:ext uri="{FF2B5EF4-FFF2-40B4-BE49-F238E27FC236}">
+                <a16:creationId xmlns:a16="http://schemas.microsoft.com/office/drawing/2014/main" id="{1B3CA0E3-7EA6-C8EC-16A1-B1E0ADDA591A}"/>
+              </a:ext>
+            </a:extLst>
+          </p:cNvPr>
+          <p:cNvSpPr>
+            <a:spLocks noGrp="1"/>
+          </p:cNvSpPr>
+          <p:nvPr>
+            <p:ph type="title"/>
+          </p:nvPr>
+        </p:nvSpPr>
+        <p:spPr>
+          <a:xfrm>
+            <a:off x="838200" y="365125"/>
+            <a:ext cx="10515600" cy="1325563"/>
+          </a:xfrm>
+        </p:spPr>
+        <p:txBody>
+          <a:bodyPr vert="horz" lIns="91440" tIns="45720" rIns="91440" bIns="45720" rtlCol="0" anchor="ctr">
+            <a:normAutofit/>
+          </a:bodyPr>
+          <a:lstStyle/>
+          <a:p>
+            <a:r>
+              <a:rPr lang="en-US" kern="1200" dirty="0">
+                <a:solidFill>
+                  <a:schemeClr val="tx1"/>
+                </a:solidFill>
+                <a:latin typeface="+mj-lt"/>
+                <a:ea typeface="+mj-ea"/>
+                <a:cs typeface="+mj-cs"/>
+              </a:rPr>
+              <a:t>Piece of Complexity (Dupe this)</a:t>
+            </a:r>
+          </a:p>
+        </p:txBody>
+      </p:sp>
+      <p:sp>
+        <p:nvSpPr>
+          <p:cNvPr id="3" name="Content Placeholder 2">
+            <a:extLst>
+              <a:ext uri="{FF2B5EF4-FFF2-40B4-BE49-F238E27FC236}">
+                <a16:creationId xmlns:a16="http://schemas.microsoft.com/office/drawing/2014/main" id="{D0110786-541E-AA68-47C0-B4F585DADDB4}"/>
+              </a:ext>
+            </a:extLst>
+          </p:cNvPr>
+          <p:cNvSpPr>
+            <a:spLocks noGrp="1"/>
+          </p:cNvSpPr>
+          <p:nvPr>
+            <p:ph idx="1"/>
+          </p:nvPr>
+        </p:nvSpPr>
+        <p:spPr>
+          <a:xfrm>
+            <a:off x="838200" y="2010833"/>
+            <a:ext cx="10515600" cy="4166130"/>
+          </a:xfrm>
+        </p:spPr>
+        <p:txBody>
+          <a:bodyPr vert="horz" lIns="91440" tIns="45720" rIns="91440" bIns="45720" rtlCol="0">
+            <a:normAutofit/>
+          </a:bodyPr>
+          <a:lstStyle/>
+          <a:p>
+            <a:r>
+              <a:rPr lang="en-US" sz="2000" dirty="0">
+                <a:latin typeface="-apple-system"/>
+              </a:rPr>
+              <a:t>pieces of complexity from SDP</a:t>
+            </a:r>
+          </a:p>
+          <a:p>
+            <a:r>
+              <a:rPr lang="en-US" sz="2000" dirty="0">
+                <a:latin typeface="-apple-system"/>
+              </a:rPr>
+              <a:t>for each piece:</a:t>
+            </a:r>
+          </a:p>
+          <a:p>
+            <a:r>
+              <a:rPr lang="en-US" sz="2000" dirty="0">
+                <a:latin typeface="-apple-system"/>
+              </a:rPr>
+              <a:t>intro at least one user store</a:t>
+            </a:r>
+          </a:p>
+          <a:p>
+            <a:r>
+              <a:rPr lang="en-US" sz="2000" dirty="0">
+                <a:latin typeface="-apple-system"/>
+              </a:rPr>
+              <a:t>one requirement</a:t>
+            </a:r>
+          </a:p>
+          <a:p>
+            <a:r>
+              <a:rPr lang="en-US" sz="2000" dirty="0">
+                <a:latin typeface="-apple-system"/>
+              </a:rPr>
+              <a:t>one design</a:t>
+            </a:r>
+          </a:p>
+          <a:p>
+            <a:r>
+              <a:rPr lang="en-US" sz="2000" dirty="0">
+                <a:latin typeface="-apple-system"/>
+              </a:rPr>
+              <a:t>implementation gif or figure</a:t>
+            </a:r>
+          </a:p>
+          <a:p>
+            <a:r>
+              <a:rPr lang="en-US" sz="2000" dirty="0">
+                <a:latin typeface="-apple-system"/>
+              </a:rPr>
+              <a:t>brief conclusion</a:t>
+            </a:r>
+          </a:p>
+          <a:p>
+            <a:r>
+              <a:rPr lang="en-US" sz="2000" dirty="0">
+                <a:latin typeface="-apple-system"/>
+              </a:rPr>
+              <a:t>each person should contribute to the presentation</a:t>
+            </a:r>
+            <a:endParaRPr lang="en-US" sz="2000" dirty="0"/>
+          </a:p>
+        </p:txBody>
+      </p:sp>
+    </p:spTree>
+    <p:extLst>
+      <p:ext uri="{BB962C8B-B14F-4D97-AF65-F5344CB8AC3E}">
+        <p14:creationId xmlns:p14="http://schemas.microsoft.com/office/powerpoint/2010/main" val="3506432024"/>
+      </p:ext>
+    </p:extLst>
+  </p:cSld>
+  <p:clrMapOvr>
+    <a:overrideClrMapping bg1="dk1" tx1="lt1" bg2="dk2" tx2="lt2" accent1="accent1" accent2="accent2" accent3="accent3" accent4="accent4" accent5="accent5" accent6="accent6" hlink="hlink" folHlink="folHlink"/>
+  </p:clrMapOvr>
+</p:sld>
+</file>
+
+<file path=ppt/slides/slide6.xml><?xml version="1.0" encoding="utf-8"?>
+<p:sld xmlns:a="http://schemas.openxmlformats.org/drawingml/2006/main" xmlns:r="http://schemas.openxmlformats.org/officeDocument/2006/relationships" xmlns:p="http://schemas.openxmlformats.org/presentationml/2006/main">
+  <p:cSld>
+    <p:bg>
+      <p:bgPr>
+        <a:solidFill>
+          <a:srgbClr val="404040"/>
+        </a:solidFill>
+        <a:effectLst/>
+      </p:bgPr>
+    </p:bg>
+    <p:spTree>
+      <p:nvGrpSpPr>
+        <p:cNvPr id="1" name="">
+          <a:extLst>
+            <a:ext uri="{FF2B5EF4-FFF2-40B4-BE49-F238E27FC236}">
+              <a16:creationId xmlns:a16="http://schemas.microsoft.com/office/drawing/2014/main" id="{BCCA39DA-69AD-1AFD-9262-06791C76125B}"/>
+            </a:ext>
+          </a:extLst>
+        </p:cNvPr>
+        <p:cNvGrpSpPr/>
+        <p:nvPr/>
+      </p:nvGrpSpPr>
+      <p:grpSpPr>
+        <a:xfrm>
+          <a:off x="0" y="0"/>
+          <a:ext cx="0" cy="0"/>
+          <a:chOff x="0" y="0"/>
+          <a:chExt cx="0" cy="0"/>
+        </a:xfrm>
+      </p:grpSpPr>
+      <p:sp>
+        <p:nvSpPr>
+          <p:cNvPr id="23" name="Rectangle 22">
+            <a:extLst>
+              <a:ext uri="{FF2B5EF4-FFF2-40B4-BE49-F238E27FC236}">
+                <a16:creationId xmlns:a16="http://schemas.microsoft.com/office/drawing/2014/main" id="{B2117CC0-99A4-E26F-6F2F-6E85016C47CD}"/>
+              </a:ext>
+              <a:ext uri="{C183D7F6-B498-43B3-948B-1728B52AA6E4}">
+                <adec:decorative xmlns:adec="http://schemas.microsoft.com/office/drawing/2017/decorative" val="1"/>
+              </a:ext>
+            </a:extLst>
+          </p:cNvPr>
+          <p:cNvSpPr>
+            <a:spLocks noGrp="1" noRot="1" noChangeAspect="1" noMove="1" noResize="1" noEditPoints="1" noAdjustHandles="1" noChangeArrowheads="1" noChangeShapeType="1" noTextEdit="1"/>
+          </p:cNvSpPr>
+          <p:nvPr>
+            <p:extLst>
+              <p:ext uri="{386F3935-93C4-4BCD-93E2-E3B085C9AB24}">
+                <p16:designElem xmlns:p16="http://schemas.microsoft.com/office/powerpoint/2015/main" val="1"/>
+              </p:ext>
+            </p:extLst>
+          </p:nvPr>
+        </p:nvSpPr>
+        <p:spPr>
+          <a:xfrm>
+            <a:off x="0" y="-3324"/>
+            <a:ext cx="12192000" cy="6861324"/>
+          </a:xfrm>
+          <a:prstGeom prst="rect">
+            <a:avLst/>
+          </a:prstGeom>
+          <a:solidFill>
+            <a:srgbClr val="404040"/>
+          </a:solidFill>
+          <a:ln>
+            <a:noFill/>
+          </a:ln>
+        </p:spPr>
+        <p:style>
+          <a:lnRef idx="2">
+            <a:schemeClr val="accent1">
+              <a:shade val="50000"/>
+            </a:schemeClr>
+          </a:lnRef>
+          <a:fillRef idx="1">
+            <a:schemeClr val="accent1"/>
+          </a:fillRef>
+          <a:effectRef idx="0">
+            <a:schemeClr val="accent1"/>
+          </a:effectRef>
+          <a:fontRef idx="minor">
+            <a:schemeClr val="lt1"/>
+          </a:fontRef>
+        </p:style>
+        <p:txBody>
+          <a:bodyPr rtlCol="0" anchor="ctr"/>
+          <a:lstStyle/>
+          <a:p>
+            <a:pPr algn="ctr"/>
+            <a:endParaRPr lang="en-US"/>
+          </a:p>
+        </p:txBody>
+      </p:sp>
+      <p:sp>
+        <p:nvSpPr>
+          <p:cNvPr id="25" name="Freeform 13">
+            <a:extLst>
+              <a:ext uri="{FF2B5EF4-FFF2-40B4-BE49-F238E27FC236}">
+                <a16:creationId xmlns:a16="http://schemas.microsoft.com/office/drawing/2014/main" id="{83F124B6-AC93-1F33-6E8B-FC3C341A2564}"/>
+              </a:ext>
+              <a:ext uri="{C183D7F6-B498-43B3-948B-1728B52AA6E4}">
+                <adec:decorative xmlns:adec="http://schemas.microsoft.com/office/drawing/2017/decorative" val="1"/>
+              </a:ext>
+            </a:extLst>
+          </p:cNvPr>
+          <p:cNvSpPr>
+            <a:spLocks noGrp="1" noRot="1" noChangeAspect="1" noMove="1" noResize="1" noEditPoints="1" noAdjustHandles="1" noChangeArrowheads="1" noChangeShapeType="1" noTextEdit="1"/>
+          </p:cNvSpPr>
+          <p:nvPr>
+            <p:extLst>
+              <p:ext uri="{386F3935-93C4-4BCD-93E2-E3B085C9AB24}">
+                <p16:designElem xmlns:p16="http://schemas.microsoft.com/office/powerpoint/2015/main" val="1"/>
+              </p:ext>
+            </p:extLst>
+          </p:nvPr>
+        </p:nvSpPr>
+        <p:spPr>
+          <a:xfrm>
+            <a:off x="0" y="0"/>
+            <a:ext cx="11786754" cy="6858000"/>
+          </a:xfrm>
+          <a:custGeom>
+            <a:avLst/>
+            <a:gdLst>
+              <a:gd name="connsiteX0" fmla="*/ 0 w 11786754"/>
+              <a:gd name="connsiteY0" fmla="*/ 0 h 6858000"/>
+              <a:gd name="connsiteX1" fmla="*/ 8610600 w 11786754"/>
+              <a:gd name="connsiteY1" fmla="*/ 0 h 6858000"/>
+              <a:gd name="connsiteX2" fmla="*/ 11786754 w 11786754"/>
+              <a:gd name="connsiteY2" fmla="*/ 6858000 h 6858000"/>
+              <a:gd name="connsiteX3" fmla="*/ 0 w 11786754"/>
+              <a:gd name="connsiteY3" fmla="*/ 6858000 h 6858000"/>
+            </a:gdLst>
+            <a:ahLst/>
+            <a:cxnLst>
+              <a:cxn ang="0">
+                <a:pos x="connsiteX0" y="connsiteY0"/>
+              </a:cxn>
+              <a:cxn ang="0">
+                <a:pos x="connsiteX1" y="connsiteY1"/>
+              </a:cxn>
+              <a:cxn ang="0">
+                <a:pos x="connsiteX2" y="connsiteY2"/>
+              </a:cxn>
+              <a:cxn ang="0">
+                <a:pos x="connsiteX3" y="connsiteY3"/>
+              </a:cxn>
+            </a:cxnLst>
+            <a:rect l="l" t="t" r="r" b="b"/>
+            <a:pathLst>
+              <a:path w="11786754" h="6858000">
+                <a:moveTo>
+                  <a:pt x="0" y="0"/>
+                </a:moveTo>
+                <a:lnTo>
+                  <a:pt x="8610600" y="0"/>
+                </a:lnTo>
+                <a:lnTo>
+                  <a:pt x="11786754" y="6858000"/>
+                </a:lnTo>
+                <a:lnTo>
+                  <a:pt x="0" y="6858000"/>
+                </a:lnTo>
+                <a:close/>
+              </a:path>
+            </a:pathLst>
+          </a:custGeom>
+          <a:solidFill>
+            <a:schemeClr val="bg1">
+              <a:alpha val="30000"/>
+            </a:schemeClr>
+          </a:solidFill>
+          <a:ln>
+            <a:noFill/>
+          </a:ln>
+        </p:spPr>
+        <p:style>
+          <a:lnRef idx="2">
+            <a:schemeClr val="accent1">
+              <a:shade val="50000"/>
+            </a:schemeClr>
+          </a:lnRef>
+          <a:fillRef idx="1">
+            <a:schemeClr val="accent1"/>
+          </a:fillRef>
+          <a:effectRef idx="0">
+            <a:schemeClr val="accent1"/>
+          </a:effectRef>
+          <a:fontRef idx="minor">
+            <a:schemeClr val="lt1"/>
+          </a:fontRef>
+        </p:style>
+        <p:txBody>
+          <a:bodyPr rtlCol="0" anchor="ctr"/>
+          <a:lstStyle/>
+          <a:p>
+            <a:pPr algn="ctr"/>
+            <a:endParaRPr lang="en-US"/>
+          </a:p>
+        </p:txBody>
+      </p:sp>
+      <p:sp>
+        <p:nvSpPr>
+          <p:cNvPr id="27" name="Freeform 11">
+            <a:extLst>
+              <a:ext uri="{FF2B5EF4-FFF2-40B4-BE49-F238E27FC236}">
+                <a16:creationId xmlns:a16="http://schemas.microsoft.com/office/drawing/2014/main" id="{392E3A14-FD5C-1F58-164F-D09083BAA988}"/>
+              </a:ext>
+              <a:ext uri="{C183D7F6-B498-43B3-948B-1728B52AA6E4}">
+                <adec:decorative xmlns:adec="http://schemas.microsoft.com/office/drawing/2017/decorative" val="1"/>
+              </a:ext>
+            </a:extLst>
+          </p:cNvPr>
+          <p:cNvSpPr>
+            <a:spLocks noGrp="1" noRot="1" noChangeAspect="1" noMove="1" noResize="1" noEditPoints="1" noAdjustHandles="1" noChangeArrowheads="1" noChangeShapeType="1" noTextEdit="1"/>
+          </p:cNvSpPr>
+          <p:nvPr>
+            <p:extLst>
+              <p:ext uri="{386F3935-93C4-4BCD-93E2-E3B085C9AB24}">
+                <p16:designElem xmlns:p16="http://schemas.microsoft.com/office/powerpoint/2015/main" val="1"/>
+              </p:ext>
+            </p:extLst>
+          </p:nvPr>
+        </p:nvSpPr>
+        <p:spPr>
+          <a:xfrm>
+            <a:off x="0" y="0"/>
+            <a:ext cx="3581400" cy="6858000"/>
+          </a:xfrm>
+          <a:custGeom>
+            <a:avLst/>
+            <a:gdLst>
+              <a:gd name="connsiteX0" fmla="*/ 0 w 3581400"/>
+              <a:gd name="connsiteY0" fmla="*/ 0 h 6858000"/>
+              <a:gd name="connsiteX1" fmla="*/ 405246 w 3581400"/>
+              <a:gd name="connsiteY1" fmla="*/ 0 h 6858000"/>
+              <a:gd name="connsiteX2" fmla="*/ 3581400 w 3581400"/>
+              <a:gd name="connsiteY2" fmla="*/ 6858000 h 6858000"/>
+              <a:gd name="connsiteX3" fmla="*/ 0 w 3581400"/>
+              <a:gd name="connsiteY3" fmla="*/ 6858000 h 6858000"/>
+            </a:gdLst>
+            <a:ahLst/>
+            <a:cxnLst>
+              <a:cxn ang="0">
+                <a:pos x="connsiteX0" y="connsiteY0"/>
+              </a:cxn>
+              <a:cxn ang="0">
+                <a:pos x="connsiteX1" y="connsiteY1"/>
+              </a:cxn>
+              <a:cxn ang="0">
+                <a:pos x="connsiteX2" y="connsiteY2"/>
+              </a:cxn>
+              <a:cxn ang="0">
+                <a:pos x="connsiteX3" y="connsiteY3"/>
+              </a:cxn>
+            </a:cxnLst>
+            <a:rect l="l" t="t" r="r" b="b"/>
+            <a:pathLst>
+              <a:path w="3581400" h="6858000">
+                <a:moveTo>
+                  <a:pt x="0" y="0"/>
+                </a:moveTo>
+                <a:lnTo>
+                  <a:pt x="405246" y="0"/>
+                </a:lnTo>
+                <a:lnTo>
+                  <a:pt x="3581400" y="6858000"/>
+                </a:lnTo>
+                <a:lnTo>
+                  <a:pt x="0" y="6858000"/>
+                </a:lnTo>
+                <a:close/>
+              </a:path>
+            </a:pathLst>
+          </a:custGeom>
+          <a:solidFill>
+            <a:schemeClr val="bg1">
+              <a:alpha val="30000"/>
+            </a:schemeClr>
+          </a:solidFill>
+          <a:ln>
+            <a:noFill/>
+          </a:ln>
+        </p:spPr>
+        <p:style>
+          <a:lnRef idx="2">
+            <a:schemeClr val="accent1">
+              <a:shade val="50000"/>
+            </a:schemeClr>
+          </a:lnRef>
+          <a:fillRef idx="1">
+            <a:schemeClr val="accent1"/>
+          </a:fillRef>
+          <a:effectRef idx="0">
+            <a:schemeClr val="accent1"/>
+          </a:effectRef>
+          <a:fontRef idx="minor">
+            <a:schemeClr val="lt1"/>
+          </a:fontRef>
+        </p:style>
+        <p:txBody>
+          <a:bodyPr wrap="square" rtlCol="0" anchor="ctr">
+            <a:noAutofit/>
+          </a:bodyPr>
+          <a:lstStyle/>
+          <a:p>
+            <a:pPr algn="ctr"/>
+            <a:endParaRPr lang="en-US"/>
+          </a:p>
+        </p:txBody>
+      </p:sp>
+      <p:sp>
+        <p:nvSpPr>
+          <p:cNvPr id="6" name="Title 5">
+            <a:extLst>
+              <a:ext uri="{FF2B5EF4-FFF2-40B4-BE49-F238E27FC236}">
+                <a16:creationId xmlns:a16="http://schemas.microsoft.com/office/drawing/2014/main" id="{5F695E5B-814C-5BAD-5CA6-609F4EAA2295}"/>
+              </a:ext>
+            </a:extLst>
+          </p:cNvPr>
+          <p:cNvSpPr>
+            <a:spLocks noGrp="1"/>
+          </p:cNvSpPr>
+          <p:nvPr>
+            <p:ph type="title"/>
+          </p:nvPr>
+        </p:nvSpPr>
+        <p:spPr>
+          <a:xfrm>
+            <a:off x="838200" y="365125"/>
+            <a:ext cx="10515600" cy="1325563"/>
+          </a:xfrm>
+        </p:spPr>
+        <p:txBody>
+          <a:bodyPr vert="horz" lIns="91440" tIns="45720" rIns="91440" bIns="45720" rtlCol="0" anchor="ctr">
+            <a:normAutofit/>
+          </a:bodyPr>
+          <a:lstStyle/>
+          <a:p>
+            <a:r>
+              <a:rPr lang="en-US" kern="1200" dirty="0">
+                <a:solidFill>
+                  <a:schemeClr val="tx1"/>
+                </a:solidFill>
+                <a:latin typeface="+mj-lt"/>
+                <a:ea typeface="+mj-ea"/>
+                <a:cs typeface="+mj-cs"/>
+              </a:rPr>
+              <a:t>Conclusion</a:t>
+            </a:r>
+          </a:p>
+        </p:txBody>
+      </p:sp>
+      <p:sp>
+        <p:nvSpPr>
+          <p:cNvPr id="3" name="Content Placeholder 2">
+            <a:extLst>
+              <a:ext uri="{FF2B5EF4-FFF2-40B4-BE49-F238E27FC236}">
+                <a16:creationId xmlns:a16="http://schemas.microsoft.com/office/drawing/2014/main" id="{D33EEBC7-B44E-43EF-EF0D-1639C8DA2B94}"/>
+              </a:ext>
+            </a:extLst>
+          </p:cNvPr>
+          <p:cNvSpPr>
+            <a:spLocks noGrp="1"/>
+          </p:cNvSpPr>
+          <p:nvPr>
+            <p:ph idx="1"/>
+          </p:nvPr>
+        </p:nvSpPr>
+        <p:spPr>
+          <a:xfrm>
+            <a:off x="838200" y="2010833"/>
+            <a:ext cx="10515600" cy="4166130"/>
+          </a:xfrm>
+        </p:spPr>
+        <p:txBody>
+          <a:bodyPr vert="horz" lIns="91440" tIns="45720" rIns="91440" bIns="45720" rtlCol="0">
+            <a:normAutofit/>
+          </a:bodyPr>
+          <a:lstStyle/>
+          <a:p>
+            <a:r>
+              <a:rPr lang="en-US" sz="2000" dirty="0">
+                <a:latin typeface="-apple-system"/>
+              </a:rPr>
+              <a:t>conclusion slide for how we thought the class as a whole (not group) went</a:t>
+            </a:r>
+            <a:endParaRPr lang="en-US" sz="2000" dirty="0"/>
+          </a:p>
+        </p:txBody>
+      </p:sp>
+    </p:spTree>
+    <p:extLst>
+      <p:ext uri="{BB962C8B-B14F-4D97-AF65-F5344CB8AC3E}">
+        <p14:creationId xmlns:p14="http://schemas.microsoft.com/office/powerpoint/2010/main" val="4093256627"/>
+      </p:ext>
+    </p:extLst>
+  </p:cSld>
+  <p:clrMapOvr>
+    <a:overrideClrMapping bg1="dk1" tx1="lt1" bg2="dk2" tx2="lt2" accent1="accent1" accent2="accent2" accent3="accent3" accent4="accent4" accent5="accent5" accent6="accent6" hlink="hlink" folHlink="folHlink"/>
+  </p:clrMapOvr>
+</p:sld>
+</file>
+
+<file path=ppt/slides/slide7.xml><?xml version="1.0" encoding="utf-8"?>
+<p:sld xmlns:a="http://schemas.openxmlformats.org/drawingml/2006/main" xmlns:r="http://schemas.openxmlformats.org/officeDocument/2006/relationships" xmlns:p="http://schemas.openxmlformats.org/presentationml/2006/main">
+  <p:cSld>
+    <p:bg>
+      <p:bgPr>
+        <a:solidFill>
+          <a:srgbClr val="404040"/>
+        </a:solidFill>
+        <a:effectLst/>
+      </p:bgPr>
+    </p:bg>
+    <p:spTree>
+      <p:nvGrpSpPr>
+        <p:cNvPr id="1" name="">
+          <a:extLst>
+            <a:ext uri="{FF2B5EF4-FFF2-40B4-BE49-F238E27FC236}">
+              <a16:creationId xmlns:a16="http://schemas.microsoft.com/office/drawing/2014/main" id="{379185B5-787B-BA41-30C4-789441207D2D}"/>
+            </a:ext>
+          </a:extLst>
+        </p:cNvPr>
+        <p:cNvGrpSpPr/>
+        <p:nvPr/>
+      </p:nvGrpSpPr>
+      <p:grpSpPr>
+        <a:xfrm>
+          <a:off x="0" y="0"/>
+          <a:ext cx="0" cy="0"/>
+          <a:chOff x="0" y="0"/>
+          <a:chExt cx="0" cy="0"/>
+        </a:xfrm>
+      </p:grpSpPr>
+      <p:sp>
+        <p:nvSpPr>
+          <p:cNvPr id="23" name="Rectangle 22">
+            <a:extLst>
+              <a:ext uri="{FF2B5EF4-FFF2-40B4-BE49-F238E27FC236}">
+                <a16:creationId xmlns:a16="http://schemas.microsoft.com/office/drawing/2014/main" id="{6EAC89B1-32D8-83B8-3860-54AC96953C86}"/>
+              </a:ext>
+              <a:ext uri="{C183D7F6-B498-43B3-948B-1728B52AA6E4}">
+                <adec:decorative xmlns:adec="http://schemas.microsoft.com/office/drawing/2017/decorative" val="1"/>
+              </a:ext>
+            </a:extLst>
+          </p:cNvPr>
+          <p:cNvSpPr>
+            <a:spLocks noGrp="1" noRot="1" noChangeAspect="1" noMove="1" noResize="1" noEditPoints="1" noAdjustHandles="1" noChangeArrowheads="1" noChangeShapeType="1" noTextEdit="1"/>
+          </p:cNvSpPr>
+          <p:nvPr>
+            <p:extLst>
+              <p:ext uri="{386F3935-93C4-4BCD-93E2-E3B085C9AB24}">
+                <p16:designElem xmlns:p16="http://schemas.microsoft.com/office/powerpoint/2015/main" val="1"/>
+              </p:ext>
+            </p:extLst>
+          </p:nvPr>
+        </p:nvSpPr>
+        <p:spPr>
+          <a:xfrm>
+            <a:off x="0" y="-3324"/>
+            <a:ext cx="12192000" cy="6861324"/>
+          </a:xfrm>
+          <a:prstGeom prst="rect">
+            <a:avLst/>
+          </a:prstGeom>
+          <a:solidFill>
+            <a:srgbClr val="404040"/>
+          </a:solidFill>
+          <a:ln>
+            <a:noFill/>
+          </a:ln>
+        </p:spPr>
+        <p:style>
+          <a:lnRef idx="2">
+            <a:schemeClr val="accent1">
+              <a:shade val="50000"/>
+            </a:schemeClr>
+          </a:lnRef>
+          <a:fillRef idx="1">
+            <a:schemeClr val="accent1"/>
+          </a:fillRef>
+          <a:effectRef idx="0">
+            <a:schemeClr val="accent1"/>
+          </a:effectRef>
+          <a:fontRef idx="minor">
+            <a:schemeClr val="lt1"/>
+          </a:fontRef>
+        </p:style>
+        <p:txBody>
+          <a:bodyPr rtlCol="0" anchor="ctr"/>
+          <a:lstStyle/>
+          <a:p>
+            <a:pPr algn="ctr"/>
+            <a:endParaRPr lang="en-US"/>
+          </a:p>
+        </p:txBody>
+      </p:sp>
+      <p:sp>
+        <p:nvSpPr>
+          <p:cNvPr id="25" name="Freeform 13">
+            <a:extLst>
+              <a:ext uri="{FF2B5EF4-FFF2-40B4-BE49-F238E27FC236}">
+                <a16:creationId xmlns:a16="http://schemas.microsoft.com/office/drawing/2014/main" id="{AB8B7B51-DAA2-AB5C-C75C-5FC543FC0C35}"/>
+              </a:ext>
+              <a:ext uri="{C183D7F6-B498-43B3-948B-1728B52AA6E4}">
+                <adec:decorative xmlns:adec="http://schemas.microsoft.com/office/drawing/2017/decorative" val="1"/>
+              </a:ext>
+            </a:extLst>
+          </p:cNvPr>
+          <p:cNvSpPr>
+            <a:spLocks noGrp="1" noRot="1" noChangeAspect="1" noMove="1" noResize="1" noEditPoints="1" noAdjustHandles="1" noChangeArrowheads="1" noChangeShapeType="1" noTextEdit="1"/>
+          </p:cNvSpPr>
+          <p:nvPr>
+            <p:extLst>
+              <p:ext uri="{386F3935-93C4-4BCD-93E2-E3B085C9AB24}">
+                <p16:designElem xmlns:p16="http://schemas.microsoft.com/office/powerpoint/2015/main" val="1"/>
+              </p:ext>
+            </p:extLst>
+          </p:nvPr>
+        </p:nvSpPr>
+        <p:spPr>
+          <a:xfrm>
+            <a:off x="0" y="0"/>
+            <a:ext cx="11786754" cy="6858000"/>
+          </a:xfrm>
+          <a:custGeom>
+            <a:avLst/>
+            <a:gdLst>
+              <a:gd name="connsiteX0" fmla="*/ 0 w 11786754"/>
+              <a:gd name="connsiteY0" fmla="*/ 0 h 6858000"/>
+              <a:gd name="connsiteX1" fmla="*/ 8610600 w 11786754"/>
+              <a:gd name="connsiteY1" fmla="*/ 0 h 6858000"/>
+              <a:gd name="connsiteX2" fmla="*/ 11786754 w 11786754"/>
+              <a:gd name="connsiteY2" fmla="*/ 6858000 h 6858000"/>
+              <a:gd name="connsiteX3" fmla="*/ 0 w 11786754"/>
+              <a:gd name="connsiteY3" fmla="*/ 6858000 h 6858000"/>
+            </a:gdLst>
+            <a:ahLst/>
+            <a:cxnLst>
+              <a:cxn ang="0">
+                <a:pos x="connsiteX0" y="connsiteY0"/>
+              </a:cxn>
+              <a:cxn ang="0">
+                <a:pos x="connsiteX1" y="connsiteY1"/>
+              </a:cxn>
+              <a:cxn ang="0">
+                <a:pos x="connsiteX2" y="connsiteY2"/>
+              </a:cxn>
+              <a:cxn ang="0">
+                <a:pos x="connsiteX3" y="connsiteY3"/>
+              </a:cxn>
+            </a:cxnLst>
+            <a:rect l="l" t="t" r="r" b="b"/>
+            <a:pathLst>
+              <a:path w="11786754" h="6858000">
+                <a:moveTo>
+                  <a:pt x="0" y="0"/>
+                </a:moveTo>
+                <a:lnTo>
+                  <a:pt x="8610600" y="0"/>
+                </a:lnTo>
+                <a:lnTo>
+                  <a:pt x="11786754" y="6858000"/>
+                </a:lnTo>
+                <a:lnTo>
+                  <a:pt x="0" y="6858000"/>
+                </a:lnTo>
+                <a:close/>
+              </a:path>
+            </a:pathLst>
+          </a:custGeom>
+          <a:solidFill>
+            <a:schemeClr val="bg1">
+              <a:alpha val="30000"/>
+            </a:schemeClr>
+          </a:solidFill>
+          <a:ln>
+            <a:noFill/>
+          </a:ln>
+        </p:spPr>
+        <p:style>
+          <a:lnRef idx="2">
+            <a:schemeClr val="accent1">
+              <a:shade val="50000"/>
+            </a:schemeClr>
+          </a:lnRef>
+          <a:fillRef idx="1">
+            <a:schemeClr val="accent1"/>
+          </a:fillRef>
+          <a:effectRef idx="0">
+            <a:schemeClr val="accent1"/>
+          </a:effectRef>
+          <a:fontRef idx="minor">
+            <a:schemeClr val="lt1"/>
+          </a:fontRef>
+        </p:style>
+        <p:txBody>
+          <a:bodyPr rtlCol="0" anchor="ctr"/>
+          <a:lstStyle/>
+          <a:p>
+            <a:pPr algn="ctr"/>
+            <a:endParaRPr lang="en-US"/>
+          </a:p>
+        </p:txBody>
+      </p:sp>
+      <p:sp>
+        <p:nvSpPr>
+          <p:cNvPr id="27" name="Freeform 11">
+            <a:extLst>
+              <a:ext uri="{FF2B5EF4-FFF2-40B4-BE49-F238E27FC236}">
+                <a16:creationId xmlns:a16="http://schemas.microsoft.com/office/drawing/2014/main" id="{706DFD6B-186D-4ADB-7C79-725A5D0EA9D2}"/>
+              </a:ext>
+              <a:ext uri="{C183D7F6-B498-43B3-948B-1728B52AA6E4}">
+                <adec:decorative xmlns:adec="http://schemas.microsoft.com/office/drawing/2017/decorative" val="1"/>
+              </a:ext>
+            </a:extLst>
+          </p:cNvPr>
+          <p:cNvSpPr>
+            <a:spLocks noGrp="1" noRot="1" noChangeAspect="1" noMove="1" noResize="1" noEditPoints="1" noAdjustHandles="1" noChangeArrowheads="1" noChangeShapeType="1" noTextEdit="1"/>
+          </p:cNvSpPr>
+          <p:nvPr>
+            <p:extLst>
+              <p:ext uri="{386F3935-93C4-4BCD-93E2-E3B085C9AB24}">
+                <p16:designElem xmlns:p16="http://schemas.microsoft.com/office/powerpoint/2015/main" val="1"/>
+              </p:ext>
+            </p:extLst>
+          </p:nvPr>
+        </p:nvSpPr>
+        <p:spPr>
+          <a:xfrm>
+            <a:off x="0" y="0"/>
+            <a:ext cx="3581400" cy="6858000"/>
+          </a:xfrm>
+          <a:custGeom>
+            <a:avLst/>
+            <a:gdLst>
+              <a:gd name="connsiteX0" fmla="*/ 0 w 3581400"/>
+              <a:gd name="connsiteY0" fmla="*/ 0 h 6858000"/>
+              <a:gd name="connsiteX1" fmla="*/ 405246 w 3581400"/>
+              <a:gd name="connsiteY1" fmla="*/ 0 h 6858000"/>
+              <a:gd name="connsiteX2" fmla="*/ 3581400 w 3581400"/>
+              <a:gd name="connsiteY2" fmla="*/ 6858000 h 6858000"/>
+              <a:gd name="connsiteX3" fmla="*/ 0 w 3581400"/>
+              <a:gd name="connsiteY3" fmla="*/ 6858000 h 6858000"/>
+            </a:gdLst>
+            <a:ahLst/>
+            <a:cxnLst>
+              <a:cxn ang="0">
+                <a:pos x="connsiteX0" y="connsiteY0"/>
+              </a:cxn>
+              <a:cxn ang="0">
+                <a:pos x="connsiteX1" y="connsiteY1"/>
+              </a:cxn>
+              <a:cxn ang="0">
+                <a:pos x="connsiteX2" y="connsiteY2"/>
+              </a:cxn>
+              <a:cxn ang="0">
+                <a:pos x="connsiteX3" y="connsiteY3"/>
+              </a:cxn>
+            </a:cxnLst>
+            <a:rect l="l" t="t" r="r" b="b"/>
+            <a:pathLst>
+              <a:path w="3581400" h="6858000">
+                <a:moveTo>
+                  <a:pt x="0" y="0"/>
+                </a:moveTo>
+                <a:lnTo>
+                  <a:pt x="405246" y="0"/>
+                </a:lnTo>
+                <a:lnTo>
+                  <a:pt x="3581400" y="6858000"/>
+                </a:lnTo>
+                <a:lnTo>
+                  <a:pt x="0" y="6858000"/>
+                </a:lnTo>
+                <a:close/>
+              </a:path>
+            </a:pathLst>
+          </a:custGeom>
+          <a:solidFill>
+            <a:schemeClr val="bg1">
+              <a:alpha val="30000"/>
+            </a:schemeClr>
+          </a:solidFill>
+          <a:ln>
+            <a:noFill/>
+          </a:ln>
+        </p:spPr>
+        <p:style>
+          <a:lnRef idx="2">
+            <a:schemeClr val="accent1">
+              <a:shade val="50000"/>
+            </a:schemeClr>
+          </a:lnRef>
+          <a:fillRef idx="1">
+            <a:schemeClr val="accent1"/>
+          </a:fillRef>
+          <a:effectRef idx="0">
+            <a:schemeClr val="accent1"/>
+          </a:effectRef>
+          <a:fontRef idx="minor">
+            <a:schemeClr val="lt1"/>
+          </a:fontRef>
+        </p:style>
+        <p:txBody>
+          <a:bodyPr wrap="square" rtlCol="0" anchor="ctr">
+            <a:noAutofit/>
+          </a:bodyPr>
+          <a:lstStyle/>
+          <a:p>
+            <a:pPr algn="ctr"/>
+            <a:endParaRPr lang="en-US"/>
+          </a:p>
+        </p:txBody>
+      </p:sp>
+      <p:sp>
+        <p:nvSpPr>
+          <p:cNvPr id="6" name="Title 5">
+            <a:extLst>
+              <a:ext uri="{FF2B5EF4-FFF2-40B4-BE49-F238E27FC236}">
+                <a16:creationId xmlns:a16="http://schemas.microsoft.com/office/drawing/2014/main" id="{DBCE6311-72B6-1F49-ABF5-B21F66F6D2D0}"/>
+              </a:ext>
+            </a:extLst>
+          </p:cNvPr>
+          <p:cNvSpPr>
+            <a:spLocks noGrp="1"/>
+          </p:cNvSpPr>
+          <p:nvPr>
+            <p:ph type="title"/>
+          </p:nvPr>
+        </p:nvSpPr>
+        <p:spPr>
+          <a:xfrm>
+            <a:off x="838200" y="365125"/>
+            <a:ext cx="10515600" cy="1325563"/>
+          </a:xfrm>
+        </p:spPr>
+        <p:txBody>
+          <a:bodyPr vert="horz" lIns="91440" tIns="45720" rIns="91440" bIns="45720" rtlCol="0" anchor="ctr">
+            <a:normAutofit/>
+          </a:bodyPr>
+          <a:lstStyle/>
+          <a:p>
+            <a:r>
+              <a:rPr lang="en-US" kern="1200" dirty="0">
+                <a:solidFill>
+                  <a:schemeClr val="tx1"/>
+                </a:solidFill>
+                <a:latin typeface="+mj-lt"/>
+                <a:ea typeface="+mj-ea"/>
+                <a:cs typeface="+mj-cs"/>
+              </a:rPr>
+              <a:t>Questions?</a:t>
+            </a:r>
+          </a:p>
+        </p:txBody>
+      </p:sp>
+      <p:sp>
+        <p:nvSpPr>
+          <p:cNvPr id="3" name="Content Placeholder 2">
+            <a:extLst>
+              <a:ext uri="{FF2B5EF4-FFF2-40B4-BE49-F238E27FC236}">
+                <a16:creationId xmlns:a16="http://schemas.microsoft.com/office/drawing/2014/main" id="{54D69CF9-08FE-85A5-8AA1-63F06749C141}"/>
+              </a:ext>
+            </a:extLst>
+          </p:cNvPr>
+          <p:cNvSpPr>
+            <a:spLocks noGrp="1"/>
+          </p:cNvSpPr>
+          <p:nvPr>
+            <p:ph idx="1"/>
+          </p:nvPr>
+        </p:nvSpPr>
+        <p:spPr>
+          <a:xfrm>
+            <a:off x="838200" y="2010833"/>
+            <a:ext cx="10515600" cy="4166130"/>
+          </a:xfrm>
+        </p:spPr>
+        <p:txBody>
+          <a:bodyPr vert="horz" lIns="91440" tIns="45720" rIns="91440" bIns="45720" rtlCol="0">
+            <a:normAutofit/>
+          </a:bodyPr>
+          <a:lstStyle/>
+          <a:p>
+            <a:endParaRPr lang="en-US" sz="2000" dirty="0"/>
+          </a:p>
+        </p:txBody>
+      </p:sp>
+    </p:spTree>
+    <p:extLst>
+      <p:ext uri="{BB962C8B-B14F-4D97-AF65-F5344CB8AC3E}">
+        <p14:creationId xmlns:p14="http://schemas.microsoft.com/office/powerpoint/2010/main" val="3870322832"/>
       </p:ext>
     </p:extLst>
   </p:cSld>

</xml_diff>

<commit_message>
updated combat clip in slides
</commit_message>
<xml_diff>
--- a/presentation materials/PresentationPowerpoint.pptx
+++ b/presentation materials/PresentationPowerpoint.pptx
@@ -358,7 +358,7 @@
             <a:pPr indent="0" algn="r">
               <a:buNone/>
             </a:pPr>
-            <a:fld id="{F635596D-0B04-417D-A508-AA4FA4B40376}" type="slidenum">
+            <a:fld id="{0A0CB7D8-B564-4CFE-8337-78AC9CF22AD0}" type="slidenum">
               <a:rPr b="0" lang="en-US" sz="1400" spc="-1" strike="noStrike">
                 <a:solidFill>
                   <a:srgbClr val="000000"/>
@@ -531,7 +531,7 @@
                 <a:tab algn="l" pos="0"/>
               </a:tabLst>
             </a:pPr>
-            <a:fld id="{E72FC7CF-13FB-4487-B813-D15671997823}" type="slidenum">
+            <a:fld id="{4BF79849-DFAB-4997-8FAC-261CF35FC0B8}" type="slidenum">
               <a:rPr b="0" lang="en-US" sz="1200" spc="-1" strike="noStrike">
                 <a:solidFill>
                   <a:srgbClr val="000000"/>
@@ -688,7 +688,7 @@
                 <a:tab algn="l" pos="0"/>
               </a:tabLst>
             </a:pPr>
-            <a:fld id="{6691E713-F5A7-4890-B11E-CCC8D39159EF}" type="slidenum">
+            <a:fld id="{6A4C59A6-4D0A-44BB-B6B1-DE7B42192B02}" type="slidenum">
               <a:rPr b="0" lang="en-US" sz="1200" spc="-1" strike="noStrike">
                 <a:solidFill>
                   <a:srgbClr val="000000"/>
@@ -860,7 +860,7 @@
                 <a:tab algn="l" pos="0"/>
               </a:tabLst>
             </a:pPr>
-            <a:fld id="{92C10A6E-3220-4F63-ADEC-FCD2144EF7CE}" type="slidenum">
+            <a:fld id="{27A2DA0C-801A-42CD-8E7F-2AF2F727D6D4}" type="slidenum">
               <a:rPr b="0" lang="en-US" sz="1200" spc="-1" strike="noStrike">
                 <a:solidFill>
                   <a:srgbClr val="000000"/>
@@ -1032,7 +1032,7 @@
                 <a:tab algn="l" pos="0"/>
               </a:tabLst>
             </a:pPr>
-            <a:fld id="{5E6152CE-EA1B-4485-898E-C0D8D2E6EA50}" type="slidenum">
+            <a:fld id="{308E202E-A233-4C99-86A8-AA33359E396D}" type="slidenum">
               <a:rPr b="0" lang="en-US" sz="1200" spc="-1" strike="noStrike">
                 <a:solidFill>
                   <a:srgbClr val="000000"/>
@@ -1204,7 +1204,7 @@
                 <a:tab algn="l" pos="0"/>
               </a:tabLst>
             </a:pPr>
-            <a:fld id="{E2F420EF-A724-4F21-8DA8-1DF359975C12}" type="slidenum">
+            <a:fld id="{43D950C1-1B30-4840-BB26-FDDDB27949BC}" type="slidenum">
               <a:rPr b="0" lang="en-US" sz="1200" spc="-1" strike="noStrike">
                 <a:solidFill>
                   <a:srgbClr val="000000"/>
@@ -1376,7 +1376,7 @@
                 <a:tab algn="l" pos="0"/>
               </a:tabLst>
             </a:pPr>
-            <a:fld id="{C2F2A5A3-4D53-4AE5-9A1E-816913C494EA}" type="slidenum">
+            <a:fld id="{7898F6D0-8A9D-4401-B08B-A795D21CAE4D}" type="slidenum">
               <a:rPr b="0" lang="en-US" sz="1200" spc="-1" strike="noStrike">
                 <a:solidFill>
                   <a:srgbClr val="000000"/>
@@ -1548,7 +1548,7 @@
                 <a:tab algn="l" pos="0"/>
               </a:tabLst>
             </a:pPr>
-            <a:fld id="{7967F331-7201-4298-9D41-B55A650CE8BD}" type="slidenum">
+            <a:fld id="{3855D289-B33D-463E-8496-5702B8153922}" type="slidenum">
               <a:rPr b="0" lang="en-US" sz="1200" spc="-1" strike="noStrike">
                 <a:solidFill>
                   <a:srgbClr val="000000"/>
@@ -1720,7 +1720,7 @@
                 <a:tab algn="l" pos="0"/>
               </a:tabLst>
             </a:pPr>
-            <a:fld id="{2E926C02-7379-4E34-9FB7-D929EC0E10B1}" type="slidenum">
+            <a:fld id="{95BA2681-AA4B-435B-843C-588AFDB25C8F}" type="slidenum">
               <a:rPr b="0" lang="en-US" sz="1200" spc="-1" strike="noStrike">
                 <a:solidFill>
                   <a:srgbClr val="000000"/>
@@ -1892,7 +1892,7 @@
                 <a:tab algn="l" pos="0"/>
               </a:tabLst>
             </a:pPr>
-            <a:fld id="{70A7D878-7B32-47D9-BDE5-86ABD260177C}" type="slidenum">
+            <a:fld id="{EE868C33-2F6B-4033-ADA2-E8F3B0ACD9C2}" type="slidenum">
               <a:rPr b="0" lang="en-US" sz="1200" spc="-1" strike="noStrike">
                 <a:solidFill>
                   <a:srgbClr val="000000"/>
@@ -2046,7 +2046,7 @@
         <p:txBody>
           <a:bodyPr/>
           <a:p>
-            <a:fld id="{9F991D52-9B48-41B3-A139-4C937D37FF03}" type="slidenum">
+            <a:fld id="{0F6A2EA9-2157-4D85-B232-FF22345F6C90}" type="slidenum">
               <a:t>&lt;#&gt;</a:t>
             </a:fld>
           </a:p>
@@ -2129,7 +2129,7 @@
         <p:txBody>
           <a:bodyPr/>
           <a:p>
-            <a:fld id="{BB6648B5-A0FF-41EE-84D5-188796199DE1}" type="slidenum">
+            <a:fld id="{0254CB18-0532-4C72-8658-B16DA1BE1572}" type="slidenum">
               <a:t>&lt;#&gt;</a:t>
             </a:fld>
           </a:p>
@@ -2212,7 +2212,7 @@
         <p:txBody>
           <a:bodyPr/>
           <a:p>
-            <a:fld id="{E7691172-A93B-4F74-8C18-740A7BA98EDA}" type="slidenum">
+            <a:fld id="{083A611A-9526-4FC2-AB88-DF236856FEA4}" type="slidenum">
               <a:t>&lt;#&gt;</a:t>
             </a:fld>
           </a:p>
@@ -2295,7 +2295,7 @@
         <p:txBody>
           <a:bodyPr/>
           <a:p>
-            <a:fld id="{A96E2F22-AB11-4840-8733-49909E3D3F76}" type="slidenum">
+            <a:fld id="{BEB94523-BE19-433F-A9EA-339C77DE64C3}" type="slidenum">
               <a:t>&lt;#&gt;</a:t>
             </a:fld>
           </a:p>
@@ -2378,7 +2378,7 @@
         <p:txBody>
           <a:bodyPr/>
           <a:p>
-            <a:fld id="{12CC1A2C-5E47-43CE-9AFB-D4F47A80D9A8}" type="slidenum">
+            <a:fld id="{039CF617-E4D9-415B-8B1F-6A424BC5C308}" type="slidenum">
               <a:t>&lt;#&gt;</a:t>
             </a:fld>
           </a:p>
@@ -2544,7 +2544,7 @@
         <p:txBody>
           <a:bodyPr/>
           <a:p>
-            <a:fld id="{611E96A1-1D5D-47B7-96A0-F8EEC3B61D05}" type="slidenum">
+            <a:fld id="{19C86002-9478-41E0-9508-98B1FF55B521}" type="slidenum">
               <a:t>&lt;#&gt;</a:t>
             </a:fld>
           </a:p>
@@ -2627,7 +2627,7 @@
         <p:txBody>
           <a:bodyPr/>
           <a:p>
-            <a:fld id="{CA96D07E-8AD6-461F-8F69-1B83041FE559}" type="slidenum">
+            <a:fld id="{3857233A-43FB-4286-861C-94C13D4E77BC}" type="slidenum">
               <a:t>&lt;#&gt;</a:t>
             </a:fld>
           </a:p>
@@ -2836,7 +2836,7 @@
         <p:txBody>
           <a:bodyPr/>
           <a:p>
-            <a:fld id="{DD8ED8FD-DBF6-4A3D-A7B0-1C5F12C64F89}" type="slidenum">
+            <a:fld id="{1060ED61-A6CB-4B99-9506-A88A41DEB80B}" type="slidenum">
               <a:t>&lt;#&gt;</a:t>
             </a:fld>
           </a:p>
@@ -2919,7 +2919,7 @@
         <p:txBody>
           <a:bodyPr/>
           <a:p>
-            <a:fld id="{274B8538-7F8D-4841-A0AD-A99EFD7F83FE}" type="slidenum">
+            <a:fld id="{E2C556FF-0B0D-4B17-B95D-B3462B5EF5EE}" type="slidenum">
               <a:t>&lt;#&gt;</a:t>
             </a:fld>
           </a:p>
@@ -3042,7 +3042,7 @@
         <p:txBody>
           <a:bodyPr/>
           <a:p>
-            <a:fld id="{7BD74C98-E24D-478F-983F-EAC2ED92378E}" type="slidenum">
+            <a:fld id="{F22C9C3F-6780-454A-9494-3727D6BD2E7D}" type="slidenum">
               <a:t>&lt;#&gt;</a:t>
             </a:fld>
           </a:p>
@@ -3125,7 +3125,7 @@
         <p:txBody>
           <a:bodyPr/>
           <a:p>
-            <a:fld id="{8B201733-35C0-401A-A8C2-57B57F805A81}" type="slidenum">
+            <a:fld id="{654FC232-EF6B-4151-A3AA-E0EED20E6F65}" type="slidenum">
               <a:t>&lt;#&gt;</a:t>
             </a:fld>
           </a:p>
@@ -3291,7 +3291,7 @@
                 </a:solidFill>
                 <a:latin typeface="Times New Roman"/>
               </a:rPr>
-              <a:t> </a:t>
+              <a:t>&lt;footer&gt;</a:t>
             </a:r>
             <a:endParaRPr b="0" lang="en-US" sz="1400" spc="-1" strike="noStrike">
               <a:solidFill>
@@ -3358,7 +3358,7 @@
                 <a:tab algn="l" pos="0"/>
               </a:tabLst>
             </a:pPr>
-            <a:fld id="{E8BC22A7-F208-4971-AC3B-B782F94D9F3C}" type="slidenum">
+            <a:fld id="{1BA65285-7863-442E-A057-45C1B587BEE5}" type="slidenum">
               <a:rPr b="0" lang="en-US" sz="1200" spc="-1" strike="noStrike">
                 <a:solidFill>
                   <a:schemeClr val="dk1">
@@ -3367,7 +3367,7 @@
                 </a:solidFill>
                 <a:latin typeface="Aptos"/>
               </a:rPr>
-              <a:t>9</a:t>
+              <a:t>&lt;number&gt;</a:t>
             </a:fld>
             <a:endParaRPr b="0" lang="en-US" sz="1200" spc="-1" strike="noStrike">
               <a:solidFill>
@@ -3427,7 +3427,7 @@
                 </a:solidFill>
                 <a:latin typeface="Times New Roman"/>
               </a:rPr>
-              <a:t> </a:t>
+              <a:t>&lt;date/time&gt;</a:t>
             </a:r>
             <a:endParaRPr b="0" lang="en-US" sz="1400" spc="-1" strike="noStrike">
               <a:solidFill>
@@ -3824,7 +3824,7 @@
                 <a:tab algn="l" pos="0"/>
               </a:tabLst>
             </a:pPr>
-            <a:fld id="{B6F3404C-5230-4514-B5D7-4E6908486323}" type="slidenum">
+            <a:fld id="{CEB88E63-3285-4EF5-AEA1-182A1B705D81}" type="slidenum">
               <a:rPr b="0" lang="en-US" sz="1200" spc="-1" strike="noStrike">
                 <a:solidFill>
                   <a:schemeClr val="dk1">
@@ -4065,7 +4065,7 @@
                 <a:tab algn="l" pos="0"/>
               </a:tabLst>
             </a:pPr>
-            <a:fld id="{6C284896-48AA-494E-AA9E-8F19F96E1F7F}" type="slidenum">
+            <a:fld id="{EBF6EC9B-8CD1-4FCC-95A2-14049FF27979}" type="slidenum">
               <a:rPr b="0" lang="en-US" sz="1200" spc="-1" strike="noStrike">
                 <a:solidFill>
                   <a:schemeClr val="dk1">
@@ -4306,7 +4306,7 @@
                 <a:tab algn="l" pos="0"/>
               </a:tabLst>
             </a:pPr>
-            <a:fld id="{948D50DB-C5F7-4787-B4E4-1DC7EDAD4464}" type="slidenum">
+            <a:fld id="{A0BA918E-81BA-4995-8412-231AF7E99290}" type="slidenum">
               <a:rPr b="0" lang="en-US" sz="1200" spc="-1" strike="noStrike">
                 <a:solidFill>
                   <a:schemeClr val="dk1">
@@ -4547,7 +4547,7 @@
                 <a:tab algn="l" pos="0"/>
               </a:tabLst>
             </a:pPr>
-            <a:fld id="{4AE4D19B-EA2B-4E9B-A042-64998AAA5CF9}" type="slidenum">
+            <a:fld id="{9094B65E-5F42-4E07-8B48-1CFB406C5C20}" type="slidenum">
               <a:rPr b="0" lang="en-US" sz="1200" spc="-1" strike="noStrike">
                 <a:solidFill>
                   <a:schemeClr val="dk1">
@@ -5062,7 +5062,7 @@
                 <a:tab algn="l" pos="0"/>
               </a:tabLst>
             </a:pPr>
-            <a:fld id="{236D567E-4741-447A-A685-0C2CCC679842}" type="slidenum">
+            <a:fld id="{7B7B2018-4F89-4EF5-9634-A65679331408}" type="slidenum">
               <a:rPr b="0" lang="en-US" sz="1200" spc="-1" strike="noStrike">
                 <a:solidFill>
                   <a:schemeClr val="dk1">
@@ -5303,7 +5303,7 @@
                 <a:tab algn="l" pos="0"/>
               </a:tabLst>
             </a:pPr>
-            <a:fld id="{8D12F9DC-4335-4C90-9D52-53F0FD9233B4}" type="slidenum">
+            <a:fld id="{C2C382F3-EBCA-4CB9-AC7C-19B3E66B6078}" type="slidenum">
               <a:rPr b="0" lang="en-US" sz="1200" spc="-1" strike="noStrike">
                 <a:solidFill>
                   <a:schemeClr val="dk1">
@@ -6043,7 +6043,7 @@
                 <a:tab algn="l" pos="0"/>
               </a:tabLst>
             </a:pPr>
-            <a:fld id="{13867B67-C5D1-46F1-8A0D-D1CA82BB1B41}" type="slidenum">
+            <a:fld id="{DA0EAA45-8FC5-437D-AED3-4D67E6B222EE}" type="slidenum">
               <a:rPr b="0" lang="en-US" sz="1200" spc="-1" strike="noStrike">
                 <a:solidFill>
                   <a:schemeClr val="dk1">
@@ -6284,7 +6284,7 @@
                 <a:tab algn="l" pos="0"/>
               </a:tabLst>
             </a:pPr>
-            <a:fld id="{1CE26AB6-E374-4275-8FA0-A819FDF8D9F1}" type="slidenum">
+            <a:fld id="{35BC5641-130E-47CB-8C6F-EB8B400BBC35}" type="slidenum">
               <a:rPr b="0" lang="en-US" sz="1200" spc="-1" strike="noStrike">
                 <a:solidFill>
                   <a:schemeClr val="dk1">
@@ -6574,7 +6574,7 @@
                 <a:tab algn="l" pos="0"/>
               </a:tabLst>
             </a:pPr>
-            <a:fld id="{D1B7D6F9-05A4-40B5-8FDC-E197134CC32D}" type="slidenum">
+            <a:fld id="{CEC3FCFF-538A-4E1A-93BF-835D78A733C9}" type="slidenum">
               <a:rPr b="0" lang="en-US" sz="1200" spc="-1" strike="noStrike">
                 <a:solidFill>
                   <a:schemeClr val="dk1">
@@ -6815,7 +6815,7 @@
                 <a:tab algn="l" pos="0"/>
               </a:tabLst>
             </a:pPr>
-            <a:fld id="{FDC522DA-D722-4C16-AD8F-536867D706EE}" type="slidenum">
+            <a:fld id="{274D1A93-B62A-422F-9208-808F6FA6433C}" type="slidenum">
               <a:rPr b="0" lang="en-US" sz="1200" spc="-1" strike="noStrike">
                 <a:solidFill>
                   <a:schemeClr val="dk1">
@@ -8867,7 +8867,16 @@
                 </a:solidFill>
                 <a:latin typeface="-apple-system"/>
               </a:rPr>
-              <a:t>Godot programmed videogame named Matthew's Journey </a:t>
+              <a:t>Godot programmed videogame named </a:t>
+            </a:r>
+            <a:r>
+              <a:rPr b="0" lang="en-US" sz="2800" spc="-1" strike="noStrike">
+                <a:solidFill>
+                  <a:schemeClr val="dk1"/>
+                </a:solidFill>
+                <a:latin typeface="-apple-system"/>
+              </a:rPr>
+              <a:t>Matthew's Journey </a:t>
             </a:r>
             <a:endParaRPr b="0" lang="en-US" sz="2800" spc="-1" strike="noStrike">
               <a:solidFill>
@@ -8957,7 +8966,16 @@
                 </a:solidFill>
                 <a:latin typeface="-apple-system"/>
               </a:rPr>
-              <a:t>2D pixel art, sound, &amp; music will be outsourced</a:t>
+              <a:t>2D pixel art, sound, &amp; music will be </a:t>
+            </a:r>
+            <a:r>
+              <a:rPr b="0" lang="en-US" sz="2800" spc="-1" strike="noStrike">
+                <a:solidFill>
+                  <a:schemeClr val="dk1"/>
+                </a:solidFill>
+                <a:latin typeface="-apple-system"/>
+              </a:rPr>
+              <a:t>outsourced</a:t>
             </a:r>
             <a:endParaRPr b="0" lang="en-US" sz="2800" spc="-1" strike="noStrike">
               <a:solidFill>
@@ -8987,7 +9005,16 @@
                 </a:solidFill>
                 <a:latin typeface="-apple-system"/>
               </a:rPr>
-              <a:t>None of the team has made a game of this scope before</a:t>
+              <a:t>None of the team has made a game of </a:t>
+            </a:r>
+            <a:r>
+              <a:rPr b="0" lang="en-US" sz="2800" spc="-1" strike="noStrike">
+                <a:solidFill>
+                  <a:schemeClr val="dk1"/>
+                </a:solidFill>
+                <a:latin typeface="-apple-system"/>
+              </a:rPr>
+              <a:t>this scope before</a:t>
             </a:r>
             <a:endParaRPr b="0" lang="en-US" sz="2800" spc="-1" strike="noStrike">
               <a:solidFill>
@@ -9986,29 +10013,18 @@
       </p:sp>
       <p:pic>
         <p:nvPicPr>
-          <p:cNvPr id="81" name="" descr="">
-            <a:hlinkClick r:id="" action="ppaction://media"/>
-          </p:cNvPr>
+          <p:cNvPr id="81" name="" descr=""/>
           <p:cNvPicPr/>
-          <p:nvPr>
-            <a:videoFile r:link="rId1"/>
-            <p:extLst>
-              <p:ext uri="{DAA4B4D4-6D71-4841-9C94-3DE7FCFB9230}">
-                <p14:media r:link="rId2"/>
-              </p:ext>
-            </p:extLst>
-          </p:nvPr>
+          <p:nvPr/>
         </p:nvPicPr>
         <p:blipFill>
-          <a:blip r:embed="rId3"/>
-          <a:stretch>
-            <a:fillRect/>
-          </a:stretch>
+          <a:blip r:embed="rId1"/>
+          <a:stretch/>
         </p:blipFill>
         <p:spPr>
           <a:xfrm>
-            <a:off x="5486760" y="365040"/>
-            <a:ext cx="6259680" cy="3520800"/>
+            <a:off x="6058440" y="3712320"/>
+            <a:ext cx="5142960" cy="2746800"/>
           </a:xfrm>
           <a:prstGeom prst="rect">
             <a:avLst/>
@@ -10020,18 +10036,29 @@
       </p:pic>
       <p:pic>
         <p:nvPicPr>
-          <p:cNvPr id="82" name="" descr=""/>
+          <p:cNvPr id="82" name="" descr="Combat Clip">
+            <a:hlinkClick r:id="" action="ppaction://media"/>
+          </p:cNvPr>
           <p:cNvPicPr/>
-          <p:nvPr/>
+          <p:nvPr>
+            <a:videoFile r:link="rId2"/>
+            <p:extLst>
+              <p:ext uri="{DAA4B4D4-6D71-4841-9C94-3DE7FCFB9230}">
+                <p14:media r:link="rId3"/>
+              </p:ext>
+            </p:extLst>
+          </p:nvPr>
         </p:nvPicPr>
         <p:blipFill>
           <a:blip r:embed="rId4"/>
-          <a:stretch/>
+          <a:stretch>
+            <a:fillRect/>
+          </a:stretch>
         </p:blipFill>
         <p:spPr>
           <a:xfrm>
-            <a:off x="6058440" y="3712320"/>
-            <a:ext cx="5142960" cy="2746800"/>
+            <a:off x="5715000" y="365040"/>
+            <a:ext cx="5715000" cy="3214440"/>
           </a:xfrm>
           <a:prstGeom prst="rect">
             <a:avLst/>

</xml_diff>

<commit_message>
updated presentation for items component
</commit_message>
<xml_diff>
--- a/presentation materials/PresentationPowerpoint.pptx
+++ b/presentation materials/PresentationPowerpoint.pptx
@@ -358,7 +358,7 @@
             <a:pPr indent="0" algn="r">
               <a:buNone/>
             </a:pPr>
-            <a:fld id="{0A0CB7D8-B564-4CFE-8337-78AC9CF22AD0}" type="slidenum">
+            <a:fld id="{321C0F93-A7E4-498C-8869-B325C71C0389}" type="slidenum">
               <a:rPr b="0" lang="en-US" sz="1400" spc="-1" strike="noStrike">
                 <a:solidFill>
                   <a:srgbClr val="000000"/>
@@ -401,7 +401,7 @@
       </p:grpSpPr>
       <p:sp>
         <p:nvSpPr>
-          <p:cNvPr id="132" name="PlaceHolder 1"/>
+          <p:cNvPr id="133" name="PlaceHolder 1"/>
           <p:cNvSpPr>
             <a:spLocks noGrp="1"/>
           </p:cNvSpPr>
@@ -424,7 +424,7 @@
       </p:sp>
       <p:sp>
         <p:nvSpPr>
-          <p:cNvPr id="133" name="PlaceHolder 2"/>
+          <p:cNvPr id="134" name="PlaceHolder 2"/>
           <p:cNvSpPr>
             <a:spLocks noGrp="1"/>
           </p:cNvSpPr>
@@ -479,7 +479,7 @@
       </p:sp>
       <p:sp>
         <p:nvSpPr>
-          <p:cNvPr id="134" name="PlaceHolder 3"/>
+          <p:cNvPr id="135" name="PlaceHolder 3"/>
           <p:cNvSpPr>
             <a:spLocks noGrp="1"/>
           </p:cNvSpPr>
@@ -531,7 +531,7 @@
                 <a:tab algn="l" pos="0"/>
               </a:tabLst>
             </a:pPr>
-            <a:fld id="{4BF79849-DFAB-4997-8FAC-261CF35FC0B8}" type="slidenum">
+            <a:fld id="{4867627D-C412-4223-BEA6-C1E474019C7E}" type="slidenum">
               <a:rPr b="0" lang="en-US" sz="1200" spc="-1" strike="noStrike">
                 <a:solidFill>
                   <a:srgbClr val="000000"/>
@@ -573,7 +573,7 @@
       </p:grpSpPr>
       <p:sp>
         <p:nvSpPr>
-          <p:cNvPr id="108" name="PlaceHolder 1"/>
+          <p:cNvPr id="109" name="PlaceHolder 1"/>
           <p:cNvSpPr>
             <a:spLocks noGrp="1"/>
           </p:cNvSpPr>
@@ -596,7 +596,7 @@
       </p:sp>
       <p:sp>
         <p:nvSpPr>
-          <p:cNvPr id="109" name="PlaceHolder 2"/>
+          <p:cNvPr id="110" name="PlaceHolder 2"/>
           <p:cNvSpPr>
             <a:spLocks noGrp="1"/>
           </p:cNvSpPr>
@@ -636,7 +636,7 @@
       </p:sp>
       <p:sp>
         <p:nvSpPr>
-          <p:cNvPr id="110" name="PlaceHolder 3"/>
+          <p:cNvPr id="111" name="PlaceHolder 3"/>
           <p:cNvSpPr>
             <a:spLocks noGrp="1"/>
           </p:cNvSpPr>
@@ -688,7 +688,7 @@
                 <a:tab algn="l" pos="0"/>
               </a:tabLst>
             </a:pPr>
-            <a:fld id="{6A4C59A6-4D0A-44BB-B6B1-DE7B42192B02}" type="slidenum">
+            <a:fld id="{E9345B9C-9545-4E15-8799-C7111B3CFA38}" type="slidenum">
               <a:rPr b="0" lang="en-US" sz="1200" spc="-1" strike="noStrike">
                 <a:solidFill>
                   <a:srgbClr val="000000"/>
@@ -730,7 +730,7 @@
       </p:grpSpPr>
       <p:sp>
         <p:nvSpPr>
-          <p:cNvPr id="111" name="PlaceHolder 1"/>
+          <p:cNvPr id="112" name="PlaceHolder 1"/>
           <p:cNvSpPr>
             <a:spLocks noGrp="1"/>
           </p:cNvSpPr>
@@ -753,7 +753,7 @@
       </p:sp>
       <p:sp>
         <p:nvSpPr>
-          <p:cNvPr id="112" name="PlaceHolder 2"/>
+          <p:cNvPr id="113" name="PlaceHolder 2"/>
           <p:cNvSpPr>
             <a:spLocks noGrp="1"/>
           </p:cNvSpPr>
@@ -808,7 +808,7 @@
       </p:sp>
       <p:sp>
         <p:nvSpPr>
-          <p:cNvPr id="113" name="PlaceHolder 3"/>
+          <p:cNvPr id="114" name="PlaceHolder 3"/>
           <p:cNvSpPr>
             <a:spLocks noGrp="1"/>
           </p:cNvSpPr>
@@ -860,7 +860,7 @@
                 <a:tab algn="l" pos="0"/>
               </a:tabLst>
             </a:pPr>
-            <a:fld id="{27A2DA0C-801A-42CD-8E7F-2AF2F727D6D4}" type="slidenum">
+            <a:fld id="{71FD9D5A-8668-431C-93A5-743C5AF54F54}" type="slidenum">
               <a:rPr b="0" lang="en-US" sz="1200" spc="-1" strike="noStrike">
                 <a:solidFill>
                   <a:srgbClr val="000000"/>
@@ -902,7 +902,7 @@
       </p:grpSpPr>
       <p:sp>
         <p:nvSpPr>
-          <p:cNvPr id="114" name="PlaceHolder 1"/>
+          <p:cNvPr id="115" name="PlaceHolder 1"/>
           <p:cNvSpPr>
             <a:spLocks noGrp="1"/>
           </p:cNvSpPr>
@@ -925,7 +925,7 @@
       </p:sp>
       <p:sp>
         <p:nvSpPr>
-          <p:cNvPr id="115" name="PlaceHolder 2"/>
+          <p:cNvPr id="116" name="PlaceHolder 2"/>
           <p:cNvSpPr>
             <a:spLocks noGrp="1"/>
           </p:cNvSpPr>
@@ -980,7 +980,7 @@
       </p:sp>
       <p:sp>
         <p:nvSpPr>
-          <p:cNvPr id="116" name="PlaceHolder 3"/>
+          <p:cNvPr id="117" name="PlaceHolder 3"/>
           <p:cNvSpPr>
             <a:spLocks noGrp="1"/>
           </p:cNvSpPr>
@@ -1032,7 +1032,7 @@
                 <a:tab algn="l" pos="0"/>
               </a:tabLst>
             </a:pPr>
-            <a:fld id="{308E202E-A233-4C99-86A8-AA33359E396D}" type="slidenum">
+            <a:fld id="{86C0AD9D-0289-4AA0-8F9A-ED23EB9FCFF8}" type="slidenum">
               <a:rPr b="0" lang="en-US" sz="1200" spc="-1" strike="noStrike">
                 <a:solidFill>
                   <a:srgbClr val="000000"/>
@@ -1074,7 +1074,7 @@
       </p:grpSpPr>
       <p:sp>
         <p:nvSpPr>
-          <p:cNvPr id="117" name="PlaceHolder 1"/>
+          <p:cNvPr id="118" name="PlaceHolder 1"/>
           <p:cNvSpPr>
             <a:spLocks noGrp="1"/>
           </p:cNvSpPr>
@@ -1097,7 +1097,7 @@
       </p:sp>
       <p:sp>
         <p:nvSpPr>
-          <p:cNvPr id="118" name="PlaceHolder 2"/>
+          <p:cNvPr id="119" name="PlaceHolder 2"/>
           <p:cNvSpPr>
             <a:spLocks noGrp="1"/>
           </p:cNvSpPr>
@@ -1152,7 +1152,7 @@
       </p:sp>
       <p:sp>
         <p:nvSpPr>
-          <p:cNvPr id="119" name="PlaceHolder 3"/>
+          <p:cNvPr id="120" name="PlaceHolder 3"/>
           <p:cNvSpPr>
             <a:spLocks noGrp="1"/>
           </p:cNvSpPr>
@@ -1204,7 +1204,7 @@
                 <a:tab algn="l" pos="0"/>
               </a:tabLst>
             </a:pPr>
-            <a:fld id="{43D950C1-1B30-4840-BB26-FDDDB27949BC}" type="slidenum">
+            <a:fld id="{3C103B45-83B4-4A7E-B2F7-D757C763FA88}" type="slidenum">
               <a:rPr b="0" lang="en-US" sz="1200" spc="-1" strike="noStrike">
                 <a:solidFill>
                   <a:srgbClr val="000000"/>
@@ -1246,7 +1246,7 @@
       </p:grpSpPr>
       <p:sp>
         <p:nvSpPr>
-          <p:cNvPr id="120" name="PlaceHolder 1"/>
+          <p:cNvPr id="121" name="PlaceHolder 1"/>
           <p:cNvSpPr>
             <a:spLocks noGrp="1"/>
           </p:cNvSpPr>
@@ -1269,7 +1269,7 @@
       </p:sp>
       <p:sp>
         <p:nvSpPr>
-          <p:cNvPr id="121" name="PlaceHolder 2"/>
+          <p:cNvPr id="122" name="PlaceHolder 2"/>
           <p:cNvSpPr>
             <a:spLocks noGrp="1"/>
           </p:cNvSpPr>
@@ -1324,7 +1324,7 @@
       </p:sp>
       <p:sp>
         <p:nvSpPr>
-          <p:cNvPr id="122" name="PlaceHolder 3"/>
+          <p:cNvPr id="123" name="PlaceHolder 3"/>
           <p:cNvSpPr>
             <a:spLocks noGrp="1"/>
           </p:cNvSpPr>
@@ -1376,7 +1376,7 @@
                 <a:tab algn="l" pos="0"/>
               </a:tabLst>
             </a:pPr>
-            <a:fld id="{7898F6D0-8A9D-4401-B08B-A795D21CAE4D}" type="slidenum">
+            <a:fld id="{85D83534-B517-47BB-9DAF-CF5E55A21B01}" type="slidenum">
               <a:rPr b="0" lang="en-US" sz="1200" spc="-1" strike="noStrike">
                 <a:solidFill>
                   <a:srgbClr val="000000"/>
@@ -1418,7 +1418,7 @@
       </p:grpSpPr>
       <p:sp>
         <p:nvSpPr>
-          <p:cNvPr id="123" name="PlaceHolder 1"/>
+          <p:cNvPr id="124" name="PlaceHolder 1"/>
           <p:cNvSpPr>
             <a:spLocks noGrp="1"/>
           </p:cNvSpPr>
@@ -1441,7 +1441,7 @@
       </p:sp>
       <p:sp>
         <p:nvSpPr>
-          <p:cNvPr id="124" name="PlaceHolder 2"/>
+          <p:cNvPr id="125" name="PlaceHolder 2"/>
           <p:cNvSpPr>
             <a:spLocks noGrp="1"/>
           </p:cNvSpPr>
@@ -1496,7 +1496,7 @@
       </p:sp>
       <p:sp>
         <p:nvSpPr>
-          <p:cNvPr id="125" name="PlaceHolder 3"/>
+          <p:cNvPr id="126" name="PlaceHolder 3"/>
           <p:cNvSpPr>
             <a:spLocks noGrp="1"/>
           </p:cNvSpPr>
@@ -1548,7 +1548,7 @@
                 <a:tab algn="l" pos="0"/>
               </a:tabLst>
             </a:pPr>
-            <a:fld id="{3855D289-B33D-463E-8496-5702B8153922}" type="slidenum">
+            <a:fld id="{81723A4F-400B-436C-95C9-958946DBE473}" type="slidenum">
               <a:rPr b="0" lang="en-US" sz="1200" spc="-1" strike="noStrike">
                 <a:solidFill>
                   <a:srgbClr val="000000"/>
@@ -1590,7 +1590,7 @@
       </p:grpSpPr>
       <p:sp>
         <p:nvSpPr>
-          <p:cNvPr id="126" name="PlaceHolder 1"/>
+          <p:cNvPr id="127" name="PlaceHolder 1"/>
           <p:cNvSpPr>
             <a:spLocks noGrp="1"/>
           </p:cNvSpPr>
@@ -1613,7 +1613,7 @@
       </p:sp>
       <p:sp>
         <p:nvSpPr>
-          <p:cNvPr id="127" name="PlaceHolder 2"/>
+          <p:cNvPr id="128" name="PlaceHolder 2"/>
           <p:cNvSpPr>
             <a:spLocks noGrp="1"/>
           </p:cNvSpPr>
@@ -1668,7 +1668,7 @@
       </p:sp>
       <p:sp>
         <p:nvSpPr>
-          <p:cNvPr id="128" name="PlaceHolder 3"/>
+          <p:cNvPr id="129" name="PlaceHolder 3"/>
           <p:cNvSpPr>
             <a:spLocks noGrp="1"/>
           </p:cNvSpPr>
@@ -1720,7 +1720,7 @@
                 <a:tab algn="l" pos="0"/>
               </a:tabLst>
             </a:pPr>
-            <a:fld id="{95BA2681-AA4B-435B-843C-588AFDB25C8F}" type="slidenum">
+            <a:fld id="{E1FBA53C-3401-48B8-8D01-7AD3DF855C04}" type="slidenum">
               <a:rPr b="0" lang="en-US" sz="1200" spc="-1" strike="noStrike">
                 <a:solidFill>
                   <a:srgbClr val="000000"/>
@@ -1762,7 +1762,7 @@
       </p:grpSpPr>
       <p:sp>
         <p:nvSpPr>
-          <p:cNvPr id="129" name="PlaceHolder 1"/>
+          <p:cNvPr id="130" name="PlaceHolder 1"/>
           <p:cNvSpPr>
             <a:spLocks noGrp="1"/>
           </p:cNvSpPr>
@@ -1785,7 +1785,7 @@
       </p:sp>
       <p:sp>
         <p:nvSpPr>
-          <p:cNvPr id="130" name="PlaceHolder 2"/>
+          <p:cNvPr id="131" name="PlaceHolder 2"/>
           <p:cNvSpPr>
             <a:spLocks noGrp="1"/>
           </p:cNvSpPr>
@@ -1840,7 +1840,7 @@
       </p:sp>
       <p:sp>
         <p:nvSpPr>
-          <p:cNvPr id="131" name="PlaceHolder 3"/>
+          <p:cNvPr id="132" name="PlaceHolder 3"/>
           <p:cNvSpPr>
             <a:spLocks noGrp="1"/>
           </p:cNvSpPr>
@@ -1892,7 +1892,7 @@
                 <a:tab algn="l" pos="0"/>
               </a:tabLst>
             </a:pPr>
-            <a:fld id="{EE868C33-2F6B-4033-ADA2-E8F3B0ACD9C2}" type="slidenum">
+            <a:fld id="{680BC11F-6B86-422E-8D48-0E819796F649}" type="slidenum">
               <a:rPr b="0" lang="en-US" sz="1200" spc="-1" strike="noStrike">
                 <a:solidFill>
                   <a:srgbClr val="000000"/>
@@ -2046,7 +2046,7 @@
         <p:txBody>
           <a:bodyPr/>
           <a:p>
-            <a:fld id="{0F6A2EA9-2157-4D85-B232-FF22345F6C90}" type="slidenum">
+            <a:fld id="{10E999CA-206B-47E4-A31C-9CDE78946E44}" type="slidenum">
               <a:t>&lt;#&gt;</a:t>
             </a:fld>
           </a:p>
@@ -2129,7 +2129,7 @@
         <p:txBody>
           <a:bodyPr/>
           <a:p>
-            <a:fld id="{0254CB18-0532-4C72-8658-B16DA1BE1572}" type="slidenum">
+            <a:fld id="{B70F110F-4D60-43D5-8642-17EB1550BBF4}" type="slidenum">
               <a:t>&lt;#&gt;</a:t>
             </a:fld>
           </a:p>
@@ -2212,7 +2212,7 @@
         <p:txBody>
           <a:bodyPr/>
           <a:p>
-            <a:fld id="{083A611A-9526-4FC2-AB88-DF236856FEA4}" type="slidenum">
+            <a:fld id="{D9B78E15-967D-46E2-BA73-771748358E67}" type="slidenum">
               <a:t>&lt;#&gt;</a:t>
             </a:fld>
           </a:p>
@@ -2295,7 +2295,7 @@
         <p:txBody>
           <a:bodyPr/>
           <a:p>
-            <a:fld id="{BEB94523-BE19-433F-A9EA-339C77DE64C3}" type="slidenum">
+            <a:fld id="{08CE682D-71E2-4ABC-8ADD-8994E7A888CE}" type="slidenum">
               <a:t>&lt;#&gt;</a:t>
             </a:fld>
           </a:p>
@@ -2378,7 +2378,7 @@
         <p:txBody>
           <a:bodyPr/>
           <a:p>
-            <a:fld id="{039CF617-E4D9-415B-8B1F-6A424BC5C308}" type="slidenum">
+            <a:fld id="{6E027402-9821-4BA1-A02D-5806630CB395}" type="slidenum">
               <a:t>&lt;#&gt;</a:t>
             </a:fld>
           </a:p>
@@ -2544,7 +2544,7 @@
         <p:txBody>
           <a:bodyPr/>
           <a:p>
-            <a:fld id="{19C86002-9478-41E0-9508-98B1FF55B521}" type="slidenum">
+            <a:fld id="{1E71F6FC-45E5-4CB3-B685-C1D533F1DC42}" type="slidenum">
               <a:t>&lt;#&gt;</a:t>
             </a:fld>
           </a:p>
@@ -2627,7 +2627,7 @@
         <p:txBody>
           <a:bodyPr/>
           <a:p>
-            <a:fld id="{3857233A-43FB-4286-861C-94C13D4E77BC}" type="slidenum">
+            <a:fld id="{7DA89B3B-9660-40B8-9DC5-AF20AF1DF9F9}" type="slidenum">
               <a:t>&lt;#&gt;</a:t>
             </a:fld>
           </a:p>
@@ -2836,7 +2836,7 @@
         <p:txBody>
           <a:bodyPr/>
           <a:p>
-            <a:fld id="{1060ED61-A6CB-4B99-9506-A88A41DEB80B}" type="slidenum">
+            <a:fld id="{8C411D97-37CF-4CC4-9117-1FE59BA9DCD3}" type="slidenum">
               <a:t>&lt;#&gt;</a:t>
             </a:fld>
           </a:p>
@@ -2919,7 +2919,7 @@
         <p:txBody>
           <a:bodyPr/>
           <a:p>
-            <a:fld id="{E2C556FF-0B0D-4B17-B95D-B3462B5EF5EE}" type="slidenum">
+            <a:fld id="{435D2CFC-E20D-45FB-A2A5-E29FA78788E3}" type="slidenum">
               <a:t>&lt;#&gt;</a:t>
             </a:fld>
           </a:p>
@@ -3042,7 +3042,7 @@
         <p:txBody>
           <a:bodyPr/>
           <a:p>
-            <a:fld id="{F22C9C3F-6780-454A-9494-3727D6BD2E7D}" type="slidenum">
+            <a:fld id="{B0280A16-0FB8-4D58-A37D-949AA7F97305}" type="slidenum">
               <a:t>&lt;#&gt;</a:t>
             </a:fld>
           </a:p>
@@ -3125,7 +3125,7 @@
         <p:txBody>
           <a:bodyPr/>
           <a:p>
-            <a:fld id="{654FC232-EF6B-4151-A3AA-E0EED20E6F65}" type="slidenum">
+            <a:fld id="{73E4E5BD-3708-4EEA-AB7E-FBFB0DCA596A}" type="slidenum">
               <a:t>&lt;#&gt;</a:t>
             </a:fld>
           </a:p>
@@ -3291,7 +3291,7 @@
                 </a:solidFill>
                 <a:latin typeface="Times New Roman"/>
               </a:rPr>
-              <a:t>&lt;footer&gt;</a:t>
+              <a:t> </a:t>
             </a:r>
             <a:endParaRPr b="0" lang="en-US" sz="1400" spc="-1" strike="noStrike">
               <a:solidFill>
@@ -3358,7 +3358,7 @@
                 <a:tab algn="l" pos="0"/>
               </a:tabLst>
             </a:pPr>
-            <a:fld id="{1BA65285-7863-442E-A057-45C1B587BEE5}" type="slidenum">
+            <a:fld id="{3FF15C4B-DF35-4660-B07B-57C88165F3E7}" type="slidenum">
               <a:rPr b="0" lang="en-US" sz="1200" spc="-1" strike="noStrike">
                 <a:solidFill>
                   <a:schemeClr val="dk1">
@@ -3367,7 +3367,7 @@
                 </a:solidFill>
                 <a:latin typeface="Aptos"/>
               </a:rPr>
-              <a:t>&lt;number&gt;</a:t>
+              <a:t>6</a:t>
             </a:fld>
             <a:endParaRPr b="0" lang="en-US" sz="1200" spc="-1" strike="noStrike">
               <a:solidFill>
@@ -3427,7 +3427,7 @@
                 </a:solidFill>
                 <a:latin typeface="Times New Roman"/>
               </a:rPr>
-              <a:t>&lt;date/time&gt;</a:t>
+              <a:t> </a:t>
             </a:r>
             <a:endParaRPr b="0" lang="en-US" sz="1400" spc="-1" strike="noStrike">
               <a:solidFill>
@@ -3484,7 +3484,16 @@
                 </a:solidFill>
                 <a:latin typeface="Arial"/>
               </a:rPr>
-              <a:t>Click to edit the outline text format</a:t>
+              <a:t>Click to edit the outline text </a:t>
+            </a:r>
+            <a:r>
+              <a:rPr b="0" lang="en-US" sz="3200" spc="-1" strike="noStrike">
+                <a:solidFill>
+                  <a:srgbClr val="000000"/>
+                </a:solidFill>
+                <a:latin typeface="Arial"/>
+              </a:rPr>
+              <a:t>format</a:t>
             </a:r>
             <a:endParaRPr b="0" lang="en-US" sz="3200" spc="-1" strike="noStrike">
               <a:solidFill>
@@ -3652,7 +3661,16 @@
                 </a:solidFill>
                 <a:latin typeface="Arial"/>
               </a:rPr>
-              <a:t>Seventh Outline Level</a:t>
+              <a:t>Seventh Outline </a:t>
+            </a:r>
+            <a:r>
+              <a:rPr b="0" lang="en-US" sz="2000" spc="-1" strike="noStrike">
+                <a:solidFill>
+                  <a:srgbClr val="000000"/>
+                </a:solidFill>
+                <a:latin typeface="Arial"/>
+              </a:rPr>
+              <a:t>Level</a:t>
             </a:r>
             <a:endParaRPr b="0" lang="en-US" sz="2000" spc="-1" strike="noStrike">
               <a:solidFill>
@@ -3824,7 +3842,7 @@
                 <a:tab algn="l" pos="0"/>
               </a:tabLst>
             </a:pPr>
-            <a:fld id="{CEB88E63-3285-4EF5-AEA1-182A1B705D81}" type="slidenum">
+            <a:fld id="{EDE4F171-CF65-4415-946D-DDA918E1D81C}" type="slidenum">
               <a:rPr b="0" lang="en-US" sz="1200" spc="-1" strike="noStrike">
                 <a:solidFill>
                   <a:schemeClr val="dk1">
@@ -4065,7 +4083,7 @@
                 <a:tab algn="l" pos="0"/>
               </a:tabLst>
             </a:pPr>
-            <a:fld id="{EBF6EC9B-8CD1-4FCC-95A2-14049FF27979}" type="slidenum">
+            <a:fld id="{99035B64-1F69-41A6-ADB7-A68C807F211C}" type="slidenum">
               <a:rPr b="0" lang="en-US" sz="1200" spc="-1" strike="noStrike">
                 <a:solidFill>
                   <a:schemeClr val="dk1">
@@ -4306,7 +4324,7 @@
                 <a:tab algn="l" pos="0"/>
               </a:tabLst>
             </a:pPr>
-            <a:fld id="{A0BA918E-81BA-4995-8412-231AF7E99290}" type="slidenum">
+            <a:fld id="{A02A3B1A-2E76-4297-9C70-7979D3970E65}" type="slidenum">
               <a:rPr b="0" lang="en-US" sz="1200" spc="-1" strike="noStrike">
                 <a:solidFill>
                   <a:schemeClr val="dk1">
@@ -4547,7 +4565,7 @@
                 <a:tab algn="l" pos="0"/>
               </a:tabLst>
             </a:pPr>
-            <a:fld id="{9094B65E-5F42-4E07-8B48-1CFB406C5C20}" type="slidenum">
+            <a:fld id="{C9837534-D993-418C-B998-2643E28E7BB7}" type="slidenum">
               <a:rPr b="0" lang="en-US" sz="1200" spc="-1" strike="noStrike">
                 <a:solidFill>
                   <a:schemeClr val="dk1">
@@ -5062,7 +5080,7 @@
                 <a:tab algn="l" pos="0"/>
               </a:tabLst>
             </a:pPr>
-            <a:fld id="{7B7B2018-4F89-4EF5-9634-A65679331408}" type="slidenum">
+            <a:fld id="{CF9BFF80-48F1-453D-8395-3B949A98AECC}" type="slidenum">
               <a:rPr b="0" lang="en-US" sz="1200" spc="-1" strike="noStrike">
                 <a:solidFill>
                   <a:schemeClr val="dk1">
@@ -5303,7 +5321,7 @@
                 <a:tab algn="l" pos="0"/>
               </a:tabLst>
             </a:pPr>
-            <a:fld id="{C2C382F3-EBCA-4CB9-AC7C-19B3E66B6078}" type="slidenum">
+            <a:fld id="{91FDE19E-2F0A-48EB-A670-DFDC8EB84093}" type="slidenum">
               <a:rPr b="0" lang="en-US" sz="1200" spc="-1" strike="noStrike">
                 <a:solidFill>
                   <a:schemeClr val="dk1">
@@ -6043,7 +6061,7 @@
                 <a:tab algn="l" pos="0"/>
               </a:tabLst>
             </a:pPr>
-            <a:fld id="{DA0EAA45-8FC5-437D-AED3-4D67E6B222EE}" type="slidenum">
+            <a:fld id="{A51E50AB-04FD-4F0E-9A55-4CDA6F0AD649}" type="slidenum">
               <a:rPr b="0" lang="en-US" sz="1200" spc="-1" strike="noStrike">
                 <a:solidFill>
                   <a:schemeClr val="dk1">
@@ -6284,7 +6302,7 @@
                 <a:tab algn="l" pos="0"/>
               </a:tabLst>
             </a:pPr>
-            <a:fld id="{35BC5641-130E-47CB-8C6F-EB8B400BBC35}" type="slidenum">
+            <a:fld id="{BC00BAE2-D931-488F-B695-6FBD2852F53D}" type="slidenum">
               <a:rPr b="0" lang="en-US" sz="1200" spc="-1" strike="noStrike">
                 <a:solidFill>
                   <a:schemeClr val="dk1">
@@ -6574,7 +6592,7 @@
                 <a:tab algn="l" pos="0"/>
               </a:tabLst>
             </a:pPr>
-            <a:fld id="{CEC3FCFF-538A-4E1A-93BF-835D78A733C9}" type="slidenum">
+            <a:fld id="{AAB9BA93-3482-4CBE-9535-F8A9AD512CD5}" type="slidenum">
               <a:rPr b="0" lang="en-US" sz="1200" spc="-1" strike="noStrike">
                 <a:solidFill>
                   <a:schemeClr val="dk1">
@@ -6815,7 +6833,7 @@
                 <a:tab algn="l" pos="0"/>
               </a:tabLst>
             </a:pPr>
-            <a:fld id="{274D1A93-B62A-422F-9208-808F6FA6433C}" type="slidenum">
+            <a:fld id="{530881B0-2890-4F76-B6AE-D2AF47C43F87}" type="slidenum">
               <a:rPr b="0" lang="en-US" sz="1200" spc="-1" strike="noStrike">
                 <a:solidFill>
                   <a:schemeClr val="dk1">
@@ -7448,7 +7466,7 @@
       </p:grpSpPr>
       <p:sp>
         <p:nvSpPr>
-          <p:cNvPr id="103" name="Rectangle 22">
+          <p:cNvPr id="104" name="Rectangle 22">
             <a:extLst>
               <a:ext uri="{C183D7F6-B498-43B3-948B-1728B52AA6E4}">
                 <adec:decorative xmlns:adec="http://schemas.microsoft.com/office/drawing/2017/decorative" val="1"/>
@@ -7508,7 +7526,7 @@
       </p:sp>
       <p:sp>
         <p:nvSpPr>
-          <p:cNvPr id="104" name="Freeform 13">
+          <p:cNvPr id="105" name="Freeform 13">
             <a:extLst>
               <a:ext uri="{C183D7F6-B498-43B3-948B-1728B52AA6E4}">
                 <adec:decorative xmlns:adec="http://schemas.microsoft.com/office/drawing/2017/decorative" val="1"/>
@@ -7595,7 +7613,7 @@
       </p:sp>
       <p:sp>
         <p:nvSpPr>
-          <p:cNvPr id="105" name="Freeform 11">
+          <p:cNvPr id="106" name="Freeform 11">
             <a:extLst>
               <a:ext uri="{C183D7F6-B498-43B3-948B-1728B52AA6E4}">
                 <adec:decorative xmlns:adec="http://schemas.microsoft.com/office/drawing/2017/decorative" val="1"/>
@@ -7682,7 +7700,7 @@
       </p:sp>
       <p:sp>
         <p:nvSpPr>
-          <p:cNvPr id="106" name="PlaceHolder 1"/>
+          <p:cNvPr id="107" name="PlaceHolder 1"/>
           <p:cNvSpPr>
             <a:spLocks noGrp="1"/>
           </p:cNvSpPr>
@@ -7737,7 +7755,7 @@
       </p:sp>
       <p:sp>
         <p:nvSpPr>
-          <p:cNvPr id="107" name="PlaceHolder 2"/>
+          <p:cNvPr id="108" name="PlaceHolder 2"/>
           <p:cNvSpPr>
             <a:spLocks noGrp="1"/>
           </p:cNvSpPr>
@@ -8867,16 +8885,7 @@
                 </a:solidFill>
                 <a:latin typeface="-apple-system"/>
               </a:rPr>
-              <a:t>Godot programmed videogame named </a:t>
-            </a:r>
-            <a:r>
-              <a:rPr b="0" lang="en-US" sz="2800" spc="-1" strike="noStrike">
-                <a:solidFill>
-                  <a:schemeClr val="dk1"/>
-                </a:solidFill>
-                <a:latin typeface="-apple-system"/>
-              </a:rPr>
-              <a:t>Matthew's Journey </a:t>
+              <a:t>Godot programmed videogame named Matthew's Journey </a:t>
             </a:r>
             <a:endParaRPr b="0" lang="en-US" sz="2800" spc="-1" strike="noStrike">
               <a:solidFill>
@@ -8966,16 +8975,7 @@
                 </a:solidFill>
                 <a:latin typeface="-apple-system"/>
               </a:rPr>
-              <a:t>2D pixel art, sound, &amp; music will be </a:t>
-            </a:r>
-            <a:r>
-              <a:rPr b="0" lang="en-US" sz="2800" spc="-1" strike="noStrike">
-                <a:solidFill>
-                  <a:schemeClr val="dk1"/>
-                </a:solidFill>
-                <a:latin typeface="-apple-system"/>
-              </a:rPr>
-              <a:t>outsourced</a:t>
+              <a:t>2D pixel art, sound, &amp; music will be outsourced</a:t>
             </a:r>
             <a:endParaRPr b="0" lang="en-US" sz="2800" spc="-1" strike="noStrike">
               <a:solidFill>
@@ -9005,16 +9005,7 @@
                 </a:solidFill>
                 <a:latin typeface="-apple-system"/>
               </a:rPr>
-              <a:t>None of the team has made a game of </a:t>
-            </a:r>
-            <a:r>
-              <a:rPr b="0" lang="en-US" sz="2800" spc="-1" strike="noStrike">
-                <a:solidFill>
-                  <a:schemeClr val="dk1"/>
-                </a:solidFill>
-                <a:latin typeface="-apple-system"/>
-              </a:rPr>
-              <a:t>this scope before</a:t>
+              <a:t>None of the team has made a game of this scope before</a:t>
             </a:r>
             <a:endParaRPr b="0" lang="en-US" sz="2800" spc="-1" strike="noStrike">
               <a:solidFill>
@@ -10406,8 +10397,8 @@
         </p:nvSpPr>
         <p:spPr>
           <a:xfrm>
-            <a:off x="838080" y="2010960"/>
-            <a:ext cx="5334120" cy="4165560"/>
+            <a:off x="508680" y="1143000"/>
+            <a:ext cx="5334120" cy="5257800"/>
           </a:xfrm>
           <a:prstGeom prst="rect">
             <a:avLst/>
@@ -10419,7 +10410,7 @@
         </p:spPr>
         <p:txBody>
           <a:bodyPr lIns="91440" rIns="91440" tIns="45720" bIns="45720" anchor="t">
-            <a:normAutofit/>
+            <a:normAutofit fontScale="93333"/>
           </a:bodyPr>
           <a:p>
             <a:pPr marL="228600" indent="0" defTabSz="914400">
@@ -10444,8 +10435,11 @@
                 <a:spcPct val="90000"/>
               </a:lnSpc>
               <a:spcBef>
-                <a:spcPts val="1001"/>
+                <a:spcPts val="1191"/>
               </a:spcBef>
+              <a:spcAft>
+                <a:spcPts val="992"/>
+              </a:spcAft>
               <a:buClr>
                 <a:srgbClr val="ffffff"/>
               </a:buClr>
@@ -10459,7 +10453,34 @@
                 </a:solidFill>
                 <a:latin typeface="-apple-system"/>
               </a:rPr>
-              <a:t>intro at least one user store</a:t>
+              <a:t>User Story: As a player developer, </a:t>
+            </a:r>
+            <a:r>
+              <a:rPr b="0" lang="en-US" sz="2000" spc="-1" strike="noStrike">
+                <a:solidFill>
+                  <a:schemeClr val="dk1"/>
+                </a:solidFill>
+                <a:latin typeface="-apple-system"/>
+              </a:rPr>
+              <a:t>I want elements in the </a:t>
+            </a:r>
+            <a:r>
+              <a:rPr b="0" lang="en-US" sz="2000" spc="-1" strike="noStrike">
+                <a:solidFill>
+                  <a:schemeClr val="dk1"/>
+                </a:solidFill>
+                <a:latin typeface="-apple-system"/>
+              </a:rPr>
+              <a:t>environment for the player to </a:t>
+            </a:r>
+            <a:r>
+              <a:rPr b="0" lang="en-US" sz="2000" spc="-1" strike="noStrike">
+                <a:solidFill>
+                  <a:schemeClr val="dk1"/>
+                </a:solidFill>
+                <a:latin typeface="-apple-system"/>
+              </a:rPr>
+              <a:t>interact with.</a:t>
             </a:r>
             <a:endParaRPr b="0" lang="en-US" sz="2000" spc="-1" strike="noStrike">
               <a:solidFill>
@@ -10474,8 +10495,11 @@
                 <a:spcPct val="90000"/>
               </a:lnSpc>
               <a:spcBef>
-                <a:spcPts val="1001"/>
+                <a:spcPts val="1191"/>
               </a:spcBef>
+              <a:spcAft>
+                <a:spcPts val="992"/>
+              </a:spcAft>
               <a:buClr>
                 <a:srgbClr val="ffffff"/>
               </a:buClr>
@@ -10489,7 +10513,25 @@
                 </a:solidFill>
                 <a:latin typeface="-apple-system"/>
               </a:rPr>
-              <a:t>one requirement</a:t>
+              <a:t>Requirement: There shall be </a:t>
+            </a:r>
+            <a:r>
+              <a:rPr b="0" lang="en-US" sz="2000" spc="-1" strike="noStrike">
+                <a:solidFill>
+                  <a:schemeClr val="dk1"/>
+                </a:solidFill>
+                <a:latin typeface="-apple-system"/>
+              </a:rPr>
+              <a:t>items in the environment for the </a:t>
+            </a:r>
+            <a:r>
+              <a:rPr b="0" lang="en-US" sz="2000" spc="-1" strike="noStrike">
+                <a:solidFill>
+                  <a:schemeClr val="dk1"/>
+                </a:solidFill>
+                <a:latin typeface="-apple-system"/>
+              </a:rPr>
+              <a:t>player to pickup</a:t>
             </a:r>
             <a:endParaRPr b="0" lang="en-US" sz="2000" spc="-1" strike="noStrike">
               <a:solidFill>
@@ -10499,18 +10541,19 @@
             </a:endParaRPr>
           </a:p>
           <a:p>
-            <a:pPr marL="228600" indent="-228600" defTabSz="914400">
+            <a:pPr lvl="1" marL="864000" indent="-324000" defTabSz="914400">
               <a:lnSpc>
                 <a:spcPct val="90000"/>
               </a:lnSpc>
               <a:spcBef>
-                <a:spcPts val="1001"/>
+                <a:spcPts val="1134"/>
               </a:spcBef>
               <a:buClr>
                 <a:srgbClr val="ffffff"/>
               </a:buClr>
-              <a:buFont typeface="Arial"/>
-              <a:buChar char="•"/>
+              <a:buSzPct val="75000"/>
+              <a:buFont typeface="Symbol" charset="2"/>
+              <a:buChar char=""/>
             </a:pPr>
             <a:r>
               <a:rPr b="0" lang="en-US" sz="2000" spc="-1" strike="noStrike">
@@ -10519,7 +10562,25 @@
                 </a:solidFill>
                 <a:latin typeface="-apple-system"/>
               </a:rPr>
-              <a:t>one design</a:t>
+              <a:t>There shall be health </a:t>
+            </a:r>
+            <a:r>
+              <a:rPr b="0" lang="en-US" sz="2000" spc="-1" strike="noStrike">
+                <a:solidFill>
+                  <a:schemeClr val="dk1"/>
+                </a:solidFill>
+                <a:latin typeface="-apple-system"/>
+              </a:rPr>
+              <a:t>pickups that will heal the </a:t>
+            </a:r>
+            <a:r>
+              <a:rPr b="0" lang="en-US" sz="2000" spc="-1" strike="noStrike">
+                <a:solidFill>
+                  <a:schemeClr val="dk1"/>
+                </a:solidFill>
+                <a:latin typeface="-apple-system"/>
+              </a:rPr>
+              <a:t>players health</a:t>
             </a:r>
             <a:endParaRPr b="0" lang="en-US" sz="2000" spc="-1" strike="noStrike">
               <a:solidFill>
@@ -10529,18 +10590,19 @@
             </a:endParaRPr>
           </a:p>
           <a:p>
-            <a:pPr marL="228600" indent="-228600" defTabSz="914400">
+            <a:pPr lvl="1" marL="864000" indent="-324000" defTabSz="914400">
               <a:lnSpc>
                 <a:spcPct val="90000"/>
               </a:lnSpc>
               <a:spcBef>
-                <a:spcPts val="1001"/>
+                <a:spcPts val="1134"/>
               </a:spcBef>
               <a:buClr>
                 <a:srgbClr val="ffffff"/>
               </a:buClr>
-              <a:buFont typeface="Arial"/>
-              <a:buChar char="•"/>
+              <a:buSzPct val="75000"/>
+              <a:buFont typeface="Symbol" charset="2"/>
+              <a:buChar char=""/>
             </a:pPr>
             <a:r>
               <a:rPr b="0" lang="en-US" sz="2000" spc="-1" strike="noStrike">
@@ -10549,7 +10611,7 @@
                 </a:solidFill>
                 <a:latin typeface="-apple-system"/>
               </a:rPr>
-              <a:t>implementation gif or figure</a:t>
+              <a:t>There shall</a:t>
             </a:r>
             <a:endParaRPr b="0" lang="en-US" sz="2000" spc="-1" strike="noStrike">
               <a:solidFill>
@@ -10558,38 +10620,42 @@
               <a:latin typeface="Arial"/>
             </a:endParaRPr>
           </a:p>
-          <a:p>
-            <a:pPr marL="228600" indent="-228600" defTabSz="914400">
-              <a:lnSpc>
-                <a:spcPct val="90000"/>
-              </a:lnSpc>
-              <a:spcBef>
-                <a:spcPts val="1001"/>
-              </a:spcBef>
-              <a:buClr>
-                <a:srgbClr val="ffffff"/>
-              </a:buClr>
-              <a:buFont typeface="Arial"/>
-              <a:buChar char="•"/>
-            </a:pPr>
-            <a:r>
-              <a:rPr b="0" lang="en-US" sz="2000" spc="-1" strike="noStrike">
-                <a:solidFill>
-                  <a:schemeClr val="dk1"/>
-                </a:solidFill>
-                <a:latin typeface="-apple-system"/>
-              </a:rPr>
-              <a:t>brief conclusion</a:t>
-            </a:r>
-            <a:endParaRPr b="0" lang="en-US" sz="2000" spc="-1" strike="noStrike">
-              <a:solidFill>
-                <a:srgbClr val="ffffff"/>
-              </a:solidFill>
-              <a:latin typeface="Arial"/>
-            </a:endParaRPr>
-          </a:p>
-        </p:txBody>
-      </p:sp>
+        </p:txBody>
+      </p:sp>
+      <p:pic>
+        <p:nvPicPr>
+          <p:cNvPr id="88" name="" descr="">
+            <a:hlinkClick r:id="" action="ppaction://media"/>
+          </p:cNvPr>
+          <p:cNvPicPr/>
+          <p:nvPr>
+            <a:videoFile r:link="rId1"/>
+            <p:extLst>
+              <p:ext uri="{DAA4B4D4-6D71-4841-9C94-3DE7FCFB9230}">
+                <p14:media r:link="rId2"/>
+              </p:ext>
+            </p:extLst>
+          </p:nvPr>
+        </p:nvPicPr>
+        <p:blipFill>
+          <a:blip r:embed="rId3"/>
+          <a:stretch>
+            <a:fillRect/>
+          </a:stretch>
+        </p:blipFill>
+        <p:spPr>
+          <a:xfrm>
+            <a:off x="5842800" y="365040"/>
+            <a:ext cx="5943240" cy="3342960"/>
+          </a:xfrm>
+          <a:prstGeom prst="rect">
+            <a:avLst/>
+          </a:prstGeom>
+          <a:ln w="0">
+            <a:noFill/>
+          </a:ln>
+        </p:spPr>
+      </p:pic>
     </p:spTree>
   </p:cSld>
   <mc:AlternateContent>
@@ -10629,7 +10695,7 @@
       </p:grpSpPr>
       <p:sp>
         <p:nvSpPr>
-          <p:cNvPr id="88" name="Rectangle 3">
+          <p:cNvPr id="89" name="Rectangle 3">
             <a:extLst>
               <a:ext uri="{C183D7F6-B498-43B3-948B-1728B52AA6E4}">
                 <adec:decorative xmlns:adec="http://schemas.microsoft.com/office/drawing/2017/decorative" val="1"/>
@@ -10684,7 +10750,7 @@
       </p:sp>
       <p:sp>
         <p:nvSpPr>
-          <p:cNvPr id="89" name="Freeform 5">
+          <p:cNvPr id="90" name="Freeform 5">
             <a:extLst>
               <a:ext uri="{C183D7F6-B498-43B3-948B-1728B52AA6E4}">
                 <adec:decorative xmlns:adec="http://schemas.microsoft.com/office/drawing/2017/decorative" val="1"/>
@@ -10766,7 +10832,7 @@
       </p:sp>
       <p:sp>
         <p:nvSpPr>
-          <p:cNvPr id="90" name="Freeform 6">
+          <p:cNvPr id="91" name="Freeform 6">
             <a:extLst>
               <a:ext uri="{C183D7F6-B498-43B3-948B-1728B52AA6E4}">
                 <adec:decorative xmlns:adec="http://schemas.microsoft.com/office/drawing/2017/decorative" val="1"/>
@@ -10848,7 +10914,7 @@
       </p:sp>
       <p:sp>
         <p:nvSpPr>
-          <p:cNvPr id="91" name="PlaceHolder 1"/>
+          <p:cNvPr id="92" name="PlaceHolder 1"/>
           <p:cNvSpPr>
             <a:spLocks noGrp="1"/>
           </p:cNvSpPr>
@@ -10903,7 +10969,7 @@
       </p:sp>
       <p:sp>
         <p:nvSpPr>
-          <p:cNvPr id="92" name="PlaceHolder 2"/>
+          <p:cNvPr id="93" name="PlaceHolder 2"/>
           <p:cNvSpPr>
             <a:spLocks noGrp="1"/>
           </p:cNvSpPr>
@@ -11136,7 +11202,7 @@
       </p:grpSpPr>
       <p:sp>
         <p:nvSpPr>
-          <p:cNvPr id="93" name="Rectangle 2">
+          <p:cNvPr id="94" name="Rectangle 2">
             <a:extLst>
               <a:ext uri="{C183D7F6-B498-43B3-948B-1728B52AA6E4}">
                 <adec:decorative xmlns:adec="http://schemas.microsoft.com/office/drawing/2017/decorative" val="1"/>
@@ -11191,7 +11257,7 @@
       </p:sp>
       <p:sp>
         <p:nvSpPr>
-          <p:cNvPr id="94" name="Freeform 3">
+          <p:cNvPr id="95" name="Freeform 3">
             <a:extLst>
               <a:ext uri="{C183D7F6-B498-43B3-948B-1728B52AA6E4}">
                 <adec:decorative xmlns:adec="http://schemas.microsoft.com/office/drawing/2017/decorative" val="1"/>
@@ -11273,7 +11339,7 @@
       </p:sp>
       <p:sp>
         <p:nvSpPr>
-          <p:cNvPr id="95" name="Freeform 4">
+          <p:cNvPr id="96" name="Freeform 4">
             <a:extLst>
               <a:ext uri="{C183D7F6-B498-43B3-948B-1728B52AA6E4}">
                 <adec:decorative xmlns:adec="http://schemas.microsoft.com/office/drawing/2017/decorative" val="1"/>
@@ -11355,7 +11421,7 @@
       </p:sp>
       <p:sp>
         <p:nvSpPr>
-          <p:cNvPr id="96" name="PlaceHolder 1"/>
+          <p:cNvPr id="97" name="PlaceHolder 1"/>
           <p:cNvSpPr>
             <a:spLocks noGrp="1"/>
           </p:cNvSpPr>
@@ -11410,7 +11476,7 @@
       </p:sp>
       <p:sp>
         <p:nvSpPr>
-          <p:cNvPr id="97" name="PlaceHolder 2"/>
+          <p:cNvPr id="98" name="PlaceHolder 2"/>
           <p:cNvSpPr>
             <a:spLocks noGrp="1"/>
           </p:cNvSpPr>
@@ -11643,7 +11709,7 @@
       </p:grpSpPr>
       <p:sp>
         <p:nvSpPr>
-          <p:cNvPr id="98" name="Rectangle 22">
+          <p:cNvPr id="99" name="Rectangle 22">
             <a:extLst>
               <a:ext uri="{C183D7F6-B498-43B3-948B-1728B52AA6E4}">
                 <adec:decorative xmlns:adec="http://schemas.microsoft.com/office/drawing/2017/decorative" val="1"/>
@@ -11703,7 +11769,7 @@
       </p:sp>
       <p:sp>
         <p:nvSpPr>
-          <p:cNvPr id="99" name="Freeform 13">
+          <p:cNvPr id="100" name="Freeform 13">
             <a:extLst>
               <a:ext uri="{C183D7F6-B498-43B3-948B-1728B52AA6E4}">
                 <adec:decorative xmlns:adec="http://schemas.microsoft.com/office/drawing/2017/decorative" val="1"/>
@@ -11790,7 +11856,7 @@
       </p:sp>
       <p:sp>
         <p:nvSpPr>
-          <p:cNvPr id="100" name="Freeform 11">
+          <p:cNvPr id="101" name="Freeform 11">
             <a:extLst>
               <a:ext uri="{C183D7F6-B498-43B3-948B-1728B52AA6E4}">
                 <adec:decorative xmlns:adec="http://schemas.microsoft.com/office/drawing/2017/decorative" val="1"/>
@@ -11877,7 +11943,7 @@
       </p:sp>
       <p:sp>
         <p:nvSpPr>
-          <p:cNvPr id="101" name="PlaceHolder 1"/>
+          <p:cNvPr id="102" name="PlaceHolder 1"/>
           <p:cNvSpPr>
             <a:spLocks noGrp="1"/>
           </p:cNvSpPr>
@@ -11932,7 +11998,7 @@
       </p:sp>
       <p:sp>
         <p:nvSpPr>
-          <p:cNvPr id="102" name="PlaceHolder 2"/>
+          <p:cNvPr id="103" name="PlaceHolder 2"/>
           <p:cNvSpPr>
             <a:spLocks noGrp="1"/>
           </p:cNvSpPr>

</xml_diff>

<commit_message>
added gui dialog slide
</commit_message>
<xml_diff>
--- a/presentation materials/PresentationPowerpoint.pptx
+++ b/presentation materials/PresentationPowerpoint.pptx
@@ -358,7 +358,7 @@
             <a:pPr indent="0" algn="r">
               <a:buNone/>
             </a:pPr>
-            <a:fld id="{321C0F93-A7E4-498C-8869-B325C71C0389}" type="slidenum">
+            <a:fld id="{EAF3072E-B119-438F-A73C-1367F049F475}" type="slidenum">
               <a:rPr b="0" lang="en-US" sz="1400" spc="-1" strike="noStrike">
                 <a:solidFill>
                   <a:srgbClr val="000000"/>
@@ -401,7 +401,7 @@
       </p:grpSpPr>
       <p:sp>
         <p:nvSpPr>
-          <p:cNvPr id="133" name="PlaceHolder 1"/>
+          <p:cNvPr id="135" name="PlaceHolder 1"/>
           <p:cNvSpPr>
             <a:spLocks noGrp="1"/>
           </p:cNvSpPr>
@@ -424,7 +424,7 @@
       </p:sp>
       <p:sp>
         <p:nvSpPr>
-          <p:cNvPr id="134" name="PlaceHolder 2"/>
+          <p:cNvPr id="136" name="PlaceHolder 2"/>
           <p:cNvSpPr>
             <a:spLocks noGrp="1"/>
           </p:cNvSpPr>
@@ -479,7 +479,7 @@
       </p:sp>
       <p:sp>
         <p:nvSpPr>
-          <p:cNvPr id="135" name="PlaceHolder 3"/>
+          <p:cNvPr id="137" name="PlaceHolder 3"/>
           <p:cNvSpPr>
             <a:spLocks noGrp="1"/>
           </p:cNvSpPr>
@@ -531,7 +531,7 @@
                 <a:tab algn="l" pos="0"/>
               </a:tabLst>
             </a:pPr>
-            <a:fld id="{4867627D-C412-4223-BEA6-C1E474019C7E}" type="slidenum">
+            <a:fld id="{8A6BC161-565D-4464-82E9-31BEA0A3465E}" type="slidenum">
               <a:rPr b="0" lang="en-US" sz="1200" spc="-1" strike="noStrike">
                 <a:solidFill>
                   <a:srgbClr val="000000"/>
@@ -573,7 +573,7 @@
       </p:grpSpPr>
       <p:sp>
         <p:nvSpPr>
-          <p:cNvPr id="109" name="PlaceHolder 1"/>
+          <p:cNvPr id="111" name="PlaceHolder 1"/>
           <p:cNvSpPr>
             <a:spLocks noGrp="1"/>
           </p:cNvSpPr>
@@ -596,7 +596,7 @@
       </p:sp>
       <p:sp>
         <p:nvSpPr>
-          <p:cNvPr id="110" name="PlaceHolder 2"/>
+          <p:cNvPr id="112" name="PlaceHolder 2"/>
           <p:cNvSpPr>
             <a:spLocks noGrp="1"/>
           </p:cNvSpPr>
@@ -636,7 +636,7 @@
       </p:sp>
       <p:sp>
         <p:nvSpPr>
-          <p:cNvPr id="111" name="PlaceHolder 3"/>
+          <p:cNvPr id="113" name="PlaceHolder 3"/>
           <p:cNvSpPr>
             <a:spLocks noGrp="1"/>
           </p:cNvSpPr>
@@ -688,7 +688,7 @@
                 <a:tab algn="l" pos="0"/>
               </a:tabLst>
             </a:pPr>
-            <a:fld id="{E9345B9C-9545-4E15-8799-C7111B3CFA38}" type="slidenum">
+            <a:fld id="{3BC0660B-E385-413D-AFDD-D9691323E19A}" type="slidenum">
               <a:rPr b="0" lang="en-US" sz="1200" spc="-1" strike="noStrike">
                 <a:solidFill>
                   <a:srgbClr val="000000"/>
@@ -730,7 +730,7 @@
       </p:grpSpPr>
       <p:sp>
         <p:nvSpPr>
-          <p:cNvPr id="112" name="PlaceHolder 1"/>
+          <p:cNvPr id="114" name="PlaceHolder 1"/>
           <p:cNvSpPr>
             <a:spLocks noGrp="1"/>
           </p:cNvSpPr>
@@ -753,7 +753,7 @@
       </p:sp>
       <p:sp>
         <p:nvSpPr>
-          <p:cNvPr id="113" name="PlaceHolder 2"/>
+          <p:cNvPr id="115" name="PlaceHolder 2"/>
           <p:cNvSpPr>
             <a:spLocks noGrp="1"/>
           </p:cNvSpPr>
@@ -808,7 +808,7 @@
       </p:sp>
       <p:sp>
         <p:nvSpPr>
-          <p:cNvPr id="114" name="PlaceHolder 3"/>
+          <p:cNvPr id="116" name="PlaceHolder 3"/>
           <p:cNvSpPr>
             <a:spLocks noGrp="1"/>
           </p:cNvSpPr>
@@ -860,7 +860,7 @@
                 <a:tab algn="l" pos="0"/>
               </a:tabLst>
             </a:pPr>
-            <a:fld id="{71FD9D5A-8668-431C-93A5-743C5AF54F54}" type="slidenum">
+            <a:fld id="{5AD2A47F-D947-4D39-B5E6-CD4744C7C905}" type="slidenum">
               <a:rPr b="0" lang="en-US" sz="1200" spc="-1" strike="noStrike">
                 <a:solidFill>
                   <a:srgbClr val="000000"/>
@@ -902,7 +902,7 @@
       </p:grpSpPr>
       <p:sp>
         <p:nvSpPr>
-          <p:cNvPr id="115" name="PlaceHolder 1"/>
+          <p:cNvPr id="117" name="PlaceHolder 1"/>
           <p:cNvSpPr>
             <a:spLocks noGrp="1"/>
           </p:cNvSpPr>
@@ -925,7 +925,7 @@
       </p:sp>
       <p:sp>
         <p:nvSpPr>
-          <p:cNvPr id="116" name="PlaceHolder 2"/>
+          <p:cNvPr id="118" name="PlaceHolder 2"/>
           <p:cNvSpPr>
             <a:spLocks noGrp="1"/>
           </p:cNvSpPr>
@@ -980,7 +980,7 @@
       </p:sp>
       <p:sp>
         <p:nvSpPr>
-          <p:cNvPr id="117" name="PlaceHolder 3"/>
+          <p:cNvPr id="119" name="PlaceHolder 3"/>
           <p:cNvSpPr>
             <a:spLocks noGrp="1"/>
           </p:cNvSpPr>
@@ -1032,7 +1032,7 @@
                 <a:tab algn="l" pos="0"/>
               </a:tabLst>
             </a:pPr>
-            <a:fld id="{86C0AD9D-0289-4AA0-8F9A-ED23EB9FCFF8}" type="slidenum">
+            <a:fld id="{8A1B33B1-916C-431A-99C5-CEBC2030ECD8}" type="slidenum">
               <a:rPr b="0" lang="en-US" sz="1200" spc="-1" strike="noStrike">
                 <a:solidFill>
                   <a:srgbClr val="000000"/>
@@ -1074,7 +1074,7 @@
       </p:grpSpPr>
       <p:sp>
         <p:nvSpPr>
-          <p:cNvPr id="118" name="PlaceHolder 1"/>
+          <p:cNvPr id="120" name="PlaceHolder 1"/>
           <p:cNvSpPr>
             <a:spLocks noGrp="1"/>
           </p:cNvSpPr>
@@ -1097,7 +1097,7 @@
       </p:sp>
       <p:sp>
         <p:nvSpPr>
-          <p:cNvPr id="119" name="PlaceHolder 2"/>
+          <p:cNvPr id="121" name="PlaceHolder 2"/>
           <p:cNvSpPr>
             <a:spLocks noGrp="1"/>
           </p:cNvSpPr>
@@ -1152,7 +1152,7 @@
       </p:sp>
       <p:sp>
         <p:nvSpPr>
-          <p:cNvPr id="120" name="PlaceHolder 3"/>
+          <p:cNvPr id="122" name="PlaceHolder 3"/>
           <p:cNvSpPr>
             <a:spLocks noGrp="1"/>
           </p:cNvSpPr>
@@ -1204,7 +1204,7 @@
                 <a:tab algn="l" pos="0"/>
               </a:tabLst>
             </a:pPr>
-            <a:fld id="{3C103B45-83B4-4A7E-B2F7-D757C763FA88}" type="slidenum">
+            <a:fld id="{AFC1CB0F-E697-4F3A-AFE3-21648E5C7F87}" type="slidenum">
               <a:rPr b="0" lang="en-US" sz="1200" spc="-1" strike="noStrike">
                 <a:solidFill>
                   <a:srgbClr val="000000"/>
@@ -1246,7 +1246,7 @@
       </p:grpSpPr>
       <p:sp>
         <p:nvSpPr>
-          <p:cNvPr id="121" name="PlaceHolder 1"/>
+          <p:cNvPr id="123" name="PlaceHolder 1"/>
           <p:cNvSpPr>
             <a:spLocks noGrp="1"/>
           </p:cNvSpPr>
@@ -1269,7 +1269,7 @@
       </p:sp>
       <p:sp>
         <p:nvSpPr>
-          <p:cNvPr id="122" name="PlaceHolder 2"/>
+          <p:cNvPr id="124" name="PlaceHolder 2"/>
           <p:cNvSpPr>
             <a:spLocks noGrp="1"/>
           </p:cNvSpPr>
@@ -1324,7 +1324,7 @@
       </p:sp>
       <p:sp>
         <p:nvSpPr>
-          <p:cNvPr id="123" name="PlaceHolder 3"/>
+          <p:cNvPr id="125" name="PlaceHolder 3"/>
           <p:cNvSpPr>
             <a:spLocks noGrp="1"/>
           </p:cNvSpPr>
@@ -1376,14 +1376,14 @@
                 <a:tab algn="l" pos="0"/>
               </a:tabLst>
             </a:pPr>
-            <a:fld id="{85D83534-B517-47BB-9DAF-CF5E55A21B01}" type="slidenum">
+            <a:fld id="{7CF42D5E-C373-440C-A4D1-8B3B7B447622}" type="slidenum">
               <a:rPr b="0" lang="en-US" sz="1200" spc="-1" strike="noStrike">
                 <a:solidFill>
                   <a:srgbClr val="000000"/>
                 </a:solidFill>
                 <a:latin typeface="Times New Roman"/>
               </a:rPr>
-              <a:t>10</a:t>
+              <a:t>&lt;number&gt;</a:t>
             </a:fld>
             <a:endParaRPr b="0" lang="en-US" sz="1200" spc="-1" strike="noStrike">
               <a:solidFill>
@@ -1418,7 +1418,7 @@
       </p:grpSpPr>
       <p:sp>
         <p:nvSpPr>
-          <p:cNvPr id="124" name="PlaceHolder 1"/>
+          <p:cNvPr id="126" name="PlaceHolder 1"/>
           <p:cNvSpPr>
             <a:spLocks noGrp="1"/>
           </p:cNvSpPr>
@@ -1441,7 +1441,7 @@
       </p:sp>
       <p:sp>
         <p:nvSpPr>
-          <p:cNvPr id="125" name="PlaceHolder 2"/>
+          <p:cNvPr id="127" name="PlaceHolder 2"/>
           <p:cNvSpPr>
             <a:spLocks noGrp="1"/>
           </p:cNvSpPr>
@@ -1496,7 +1496,7 @@
       </p:sp>
       <p:sp>
         <p:nvSpPr>
-          <p:cNvPr id="126" name="PlaceHolder 3"/>
+          <p:cNvPr id="128" name="PlaceHolder 3"/>
           <p:cNvSpPr>
             <a:spLocks noGrp="1"/>
           </p:cNvSpPr>
@@ -1548,14 +1548,14 @@
                 <a:tab algn="l" pos="0"/>
               </a:tabLst>
             </a:pPr>
-            <a:fld id="{81723A4F-400B-436C-95C9-958946DBE473}" type="slidenum">
+            <a:fld id="{0ADF2B49-2CA1-4A02-8CCF-DFB868F1AF8E}" type="slidenum">
               <a:rPr b="0" lang="en-US" sz="1200" spc="-1" strike="noStrike">
                 <a:solidFill>
                   <a:srgbClr val="000000"/>
                 </a:solidFill>
                 <a:latin typeface="Times New Roman"/>
               </a:rPr>
-              <a:t>10</a:t>
+              <a:t>&lt;number&gt;</a:t>
             </a:fld>
             <a:endParaRPr b="0" lang="en-US" sz="1200" spc="-1" strike="noStrike">
               <a:solidFill>
@@ -1590,7 +1590,7 @@
       </p:grpSpPr>
       <p:sp>
         <p:nvSpPr>
-          <p:cNvPr id="127" name="PlaceHolder 1"/>
+          <p:cNvPr id="129" name="PlaceHolder 1"/>
           <p:cNvSpPr>
             <a:spLocks noGrp="1"/>
           </p:cNvSpPr>
@@ -1613,7 +1613,7 @@
       </p:sp>
       <p:sp>
         <p:nvSpPr>
-          <p:cNvPr id="128" name="PlaceHolder 2"/>
+          <p:cNvPr id="130" name="PlaceHolder 2"/>
           <p:cNvSpPr>
             <a:spLocks noGrp="1"/>
           </p:cNvSpPr>
@@ -1668,7 +1668,7 @@
       </p:sp>
       <p:sp>
         <p:nvSpPr>
-          <p:cNvPr id="129" name="PlaceHolder 3"/>
+          <p:cNvPr id="131" name="PlaceHolder 3"/>
           <p:cNvSpPr>
             <a:spLocks noGrp="1"/>
           </p:cNvSpPr>
@@ -1720,7 +1720,7 @@
                 <a:tab algn="l" pos="0"/>
               </a:tabLst>
             </a:pPr>
-            <a:fld id="{E1FBA53C-3401-48B8-8D01-7AD3DF855C04}" type="slidenum">
+            <a:fld id="{BCA86F56-1E15-4012-8063-FA588C5B5F24}" type="slidenum">
               <a:rPr b="0" lang="en-US" sz="1200" spc="-1" strike="noStrike">
                 <a:solidFill>
                   <a:srgbClr val="000000"/>
@@ -1762,7 +1762,7 @@
       </p:grpSpPr>
       <p:sp>
         <p:nvSpPr>
-          <p:cNvPr id="130" name="PlaceHolder 1"/>
+          <p:cNvPr id="132" name="PlaceHolder 1"/>
           <p:cNvSpPr>
             <a:spLocks noGrp="1"/>
           </p:cNvSpPr>
@@ -1785,7 +1785,7 @@
       </p:sp>
       <p:sp>
         <p:nvSpPr>
-          <p:cNvPr id="131" name="PlaceHolder 2"/>
+          <p:cNvPr id="133" name="PlaceHolder 2"/>
           <p:cNvSpPr>
             <a:spLocks noGrp="1"/>
           </p:cNvSpPr>
@@ -1840,7 +1840,7 @@
       </p:sp>
       <p:sp>
         <p:nvSpPr>
-          <p:cNvPr id="132" name="PlaceHolder 3"/>
+          <p:cNvPr id="134" name="PlaceHolder 3"/>
           <p:cNvSpPr>
             <a:spLocks noGrp="1"/>
           </p:cNvSpPr>
@@ -1892,7 +1892,7 @@
                 <a:tab algn="l" pos="0"/>
               </a:tabLst>
             </a:pPr>
-            <a:fld id="{680BC11F-6B86-422E-8D48-0E819796F649}" type="slidenum">
+            <a:fld id="{AA8E2E55-582C-4A9B-9E35-DAF05C59B84B}" type="slidenum">
               <a:rPr b="0" lang="en-US" sz="1200" spc="-1" strike="noStrike">
                 <a:solidFill>
                   <a:srgbClr val="000000"/>
@@ -2046,7 +2046,7 @@
         <p:txBody>
           <a:bodyPr/>
           <a:p>
-            <a:fld id="{10E999CA-206B-47E4-A31C-9CDE78946E44}" type="slidenum">
+            <a:fld id="{60049664-7324-4D05-B4DD-A09E3CFE99D9}" type="slidenum">
               <a:t>&lt;#&gt;</a:t>
             </a:fld>
           </a:p>
@@ -2129,7 +2129,7 @@
         <p:txBody>
           <a:bodyPr/>
           <a:p>
-            <a:fld id="{B70F110F-4D60-43D5-8642-17EB1550BBF4}" type="slidenum">
+            <a:fld id="{30AED402-E7B2-47B4-B491-135BF9A52187}" type="slidenum">
               <a:t>&lt;#&gt;</a:t>
             </a:fld>
           </a:p>
@@ -2212,7 +2212,7 @@
         <p:txBody>
           <a:bodyPr/>
           <a:p>
-            <a:fld id="{D9B78E15-967D-46E2-BA73-771748358E67}" type="slidenum">
+            <a:fld id="{A7E54C11-493B-4BE5-9BE8-7681C4439D1E}" type="slidenum">
               <a:t>&lt;#&gt;</a:t>
             </a:fld>
           </a:p>
@@ -2295,7 +2295,7 @@
         <p:txBody>
           <a:bodyPr/>
           <a:p>
-            <a:fld id="{08CE682D-71E2-4ABC-8ADD-8994E7A888CE}" type="slidenum">
+            <a:fld id="{8774915A-E406-41C0-B544-E7F4BF68B96C}" type="slidenum">
               <a:t>&lt;#&gt;</a:t>
             </a:fld>
           </a:p>
@@ -2378,7 +2378,7 @@
         <p:txBody>
           <a:bodyPr/>
           <a:p>
-            <a:fld id="{6E027402-9821-4BA1-A02D-5806630CB395}" type="slidenum">
+            <a:fld id="{873C6283-3BEA-4F1A-868E-0C8C43072946}" type="slidenum">
               <a:t>&lt;#&gt;</a:t>
             </a:fld>
           </a:p>
@@ -2544,7 +2544,7 @@
         <p:txBody>
           <a:bodyPr/>
           <a:p>
-            <a:fld id="{1E71F6FC-45E5-4CB3-B685-C1D533F1DC42}" type="slidenum">
+            <a:fld id="{5E930410-567B-4511-92C5-383029EAEF46}" type="slidenum">
               <a:t>&lt;#&gt;</a:t>
             </a:fld>
           </a:p>
@@ -2627,7 +2627,7 @@
         <p:txBody>
           <a:bodyPr/>
           <a:p>
-            <a:fld id="{7DA89B3B-9660-40B8-9DC5-AF20AF1DF9F9}" type="slidenum">
+            <a:fld id="{D6FD7235-544F-4360-904E-0A45FF0BBED0}" type="slidenum">
               <a:t>&lt;#&gt;</a:t>
             </a:fld>
           </a:p>
@@ -2836,7 +2836,7 @@
         <p:txBody>
           <a:bodyPr/>
           <a:p>
-            <a:fld id="{8C411D97-37CF-4CC4-9117-1FE59BA9DCD3}" type="slidenum">
+            <a:fld id="{377FFDD5-68A1-4728-9EA9-D32D521B3C8C}" type="slidenum">
               <a:t>&lt;#&gt;</a:t>
             </a:fld>
           </a:p>
@@ -2919,7 +2919,7 @@
         <p:txBody>
           <a:bodyPr/>
           <a:p>
-            <a:fld id="{435D2CFC-E20D-45FB-A2A5-E29FA78788E3}" type="slidenum">
+            <a:fld id="{ABBAB018-EC1D-445F-8D57-604AA5CF7032}" type="slidenum">
               <a:t>&lt;#&gt;</a:t>
             </a:fld>
           </a:p>
@@ -3042,7 +3042,7 @@
         <p:txBody>
           <a:bodyPr/>
           <a:p>
-            <a:fld id="{B0280A16-0FB8-4D58-A37D-949AA7F97305}" type="slidenum">
+            <a:fld id="{173ECEA2-74CB-4B3C-B57B-6E2771509632}" type="slidenum">
               <a:t>&lt;#&gt;</a:t>
             </a:fld>
           </a:p>
@@ -3125,7 +3125,7 @@
         <p:txBody>
           <a:bodyPr/>
           <a:p>
-            <a:fld id="{73E4E5BD-3708-4EEA-AB7E-FBFB0DCA596A}" type="slidenum">
+            <a:fld id="{A40D0E68-7488-4A60-B6DE-08814602A1D0}" type="slidenum">
               <a:t>&lt;#&gt;</a:t>
             </a:fld>
           </a:p>
@@ -3358,7 +3358,7 @@
                 <a:tab algn="l" pos="0"/>
               </a:tabLst>
             </a:pPr>
-            <a:fld id="{3FF15C4B-DF35-4660-B07B-57C88165F3E7}" type="slidenum">
+            <a:fld id="{7DF7C1C5-A062-4775-948F-4DF97A38293C}" type="slidenum">
               <a:rPr b="0" lang="en-US" sz="1200" spc="-1" strike="noStrike">
                 <a:solidFill>
                   <a:schemeClr val="dk1">
@@ -3367,7 +3367,7 @@
                 </a:solidFill>
                 <a:latin typeface="Aptos"/>
               </a:rPr>
-              <a:t>6</a:t>
+              <a:t>7</a:t>
             </a:fld>
             <a:endParaRPr b="0" lang="en-US" sz="1200" spc="-1" strike="noStrike">
               <a:solidFill>
@@ -3484,16 +3484,7 @@
                 </a:solidFill>
                 <a:latin typeface="Arial"/>
               </a:rPr>
-              <a:t>Click to edit the outline text </a:t>
-            </a:r>
-            <a:r>
-              <a:rPr b="0" lang="en-US" sz="3200" spc="-1" strike="noStrike">
-                <a:solidFill>
-                  <a:srgbClr val="000000"/>
-                </a:solidFill>
-                <a:latin typeface="Arial"/>
-              </a:rPr>
-              <a:t>format</a:t>
+              <a:t>Click to edit the outline text format</a:t>
             </a:r>
             <a:endParaRPr b="0" lang="en-US" sz="3200" spc="-1" strike="noStrike">
               <a:solidFill>
@@ -3661,16 +3652,7 @@
                 </a:solidFill>
                 <a:latin typeface="Arial"/>
               </a:rPr>
-              <a:t>Seventh Outline </a:t>
-            </a:r>
-            <a:r>
-              <a:rPr b="0" lang="en-US" sz="2000" spc="-1" strike="noStrike">
-                <a:solidFill>
-                  <a:srgbClr val="000000"/>
-                </a:solidFill>
-                <a:latin typeface="Arial"/>
-              </a:rPr>
-              <a:t>Level</a:t>
+              <a:t>Seventh Outline Level</a:t>
             </a:r>
             <a:endParaRPr b="0" lang="en-US" sz="2000" spc="-1" strike="noStrike">
               <a:solidFill>
@@ -3842,7 +3824,7 @@
                 <a:tab algn="l" pos="0"/>
               </a:tabLst>
             </a:pPr>
-            <a:fld id="{EDE4F171-CF65-4415-946D-DDA918E1D81C}" type="slidenum">
+            <a:fld id="{4BE19A04-F53C-4BE3-A720-2074A3E8D53B}" type="slidenum">
               <a:rPr b="0" lang="en-US" sz="1200" spc="-1" strike="noStrike">
                 <a:solidFill>
                   <a:schemeClr val="dk1">
@@ -4083,7 +4065,7 @@
                 <a:tab algn="l" pos="0"/>
               </a:tabLst>
             </a:pPr>
-            <a:fld id="{99035B64-1F69-41A6-ADB7-A68C807F211C}" type="slidenum">
+            <a:fld id="{AFD0DBBB-778A-4ED0-9EE3-8AC158C231A8}" type="slidenum">
               <a:rPr b="0" lang="en-US" sz="1200" spc="-1" strike="noStrike">
                 <a:solidFill>
                   <a:schemeClr val="dk1">
@@ -4324,7 +4306,7 @@
                 <a:tab algn="l" pos="0"/>
               </a:tabLst>
             </a:pPr>
-            <a:fld id="{A02A3B1A-2E76-4297-9C70-7979D3970E65}" type="slidenum">
+            <a:fld id="{3162C502-755C-4A33-A075-4AFA72039BEF}" type="slidenum">
               <a:rPr b="0" lang="en-US" sz="1200" spc="-1" strike="noStrike">
                 <a:solidFill>
                   <a:schemeClr val="dk1">
@@ -4565,7 +4547,7 @@
                 <a:tab algn="l" pos="0"/>
               </a:tabLst>
             </a:pPr>
-            <a:fld id="{C9837534-D993-418C-B998-2643E28E7BB7}" type="slidenum">
+            <a:fld id="{05DF509A-5BC7-487E-A0EB-34A37A3F526F}" type="slidenum">
               <a:rPr b="0" lang="en-US" sz="1200" spc="-1" strike="noStrike">
                 <a:solidFill>
                   <a:schemeClr val="dk1">
@@ -5080,7 +5062,7 @@
                 <a:tab algn="l" pos="0"/>
               </a:tabLst>
             </a:pPr>
-            <a:fld id="{CF9BFF80-48F1-453D-8395-3B949A98AECC}" type="slidenum">
+            <a:fld id="{A1B6697C-0BEC-4F00-AFBA-932CB171D6A5}" type="slidenum">
               <a:rPr b="0" lang="en-US" sz="1200" spc="-1" strike="noStrike">
                 <a:solidFill>
                   <a:schemeClr val="dk1">
@@ -5321,7 +5303,7 @@
                 <a:tab algn="l" pos="0"/>
               </a:tabLst>
             </a:pPr>
-            <a:fld id="{91FDE19E-2F0A-48EB-A670-DFDC8EB84093}" type="slidenum">
+            <a:fld id="{8F4A93A1-E25A-48F1-A691-7DF5D624A2F2}" type="slidenum">
               <a:rPr b="0" lang="en-US" sz="1200" spc="-1" strike="noStrike">
                 <a:solidFill>
                   <a:schemeClr val="dk1">
@@ -6061,7 +6043,7 @@
                 <a:tab algn="l" pos="0"/>
               </a:tabLst>
             </a:pPr>
-            <a:fld id="{A51E50AB-04FD-4F0E-9A55-4CDA6F0AD649}" type="slidenum">
+            <a:fld id="{7ED1BCF5-591C-4DAD-BAA6-9E8BDAA80D0F}" type="slidenum">
               <a:rPr b="0" lang="en-US" sz="1200" spc="-1" strike="noStrike">
                 <a:solidFill>
                   <a:schemeClr val="dk1">
@@ -6302,7 +6284,7 @@
                 <a:tab algn="l" pos="0"/>
               </a:tabLst>
             </a:pPr>
-            <a:fld id="{BC00BAE2-D931-488F-B695-6FBD2852F53D}" type="slidenum">
+            <a:fld id="{82659FB9-DB7E-4F36-AB9F-04DCB8868878}" type="slidenum">
               <a:rPr b="0" lang="en-US" sz="1200" spc="-1" strike="noStrike">
                 <a:solidFill>
                   <a:schemeClr val="dk1">
@@ -6592,7 +6574,7 @@
                 <a:tab algn="l" pos="0"/>
               </a:tabLst>
             </a:pPr>
-            <a:fld id="{AAB9BA93-3482-4CBE-9535-F8A9AD512CD5}" type="slidenum">
+            <a:fld id="{9D95A6DF-4CDF-4922-81BC-402583E9CA92}" type="slidenum">
               <a:rPr b="0" lang="en-US" sz="1200" spc="-1" strike="noStrike">
                 <a:solidFill>
                   <a:schemeClr val="dk1">
@@ -6833,7 +6815,7 @@
                 <a:tab algn="l" pos="0"/>
               </a:tabLst>
             </a:pPr>
-            <a:fld id="{530881B0-2890-4F76-B6AE-D2AF47C43F87}" type="slidenum">
+            <a:fld id="{20935230-3E8D-40C8-B931-C22BB5EAF6D7}" type="slidenum">
               <a:rPr b="0" lang="en-US" sz="1200" spc="-1" strike="noStrike">
                 <a:solidFill>
                   <a:schemeClr val="dk1">
@@ -7466,7 +7448,7 @@
       </p:grpSpPr>
       <p:sp>
         <p:nvSpPr>
-          <p:cNvPr id="104" name="Rectangle 22">
+          <p:cNvPr id="106" name="Rectangle 22">
             <a:extLst>
               <a:ext uri="{C183D7F6-B498-43B3-948B-1728B52AA6E4}">
                 <adec:decorative xmlns:adec="http://schemas.microsoft.com/office/drawing/2017/decorative" val="1"/>
@@ -7526,7 +7508,7 @@
       </p:sp>
       <p:sp>
         <p:nvSpPr>
-          <p:cNvPr id="105" name="Freeform 13">
+          <p:cNvPr id="107" name="Freeform 13">
             <a:extLst>
               <a:ext uri="{C183D7F6-B498-43B3-948B-1728B52AA6E4}">
                 <adec:decorative xmlns:adec="http://schemas.microsoft.com/office/drawing/2017/decorative" val="1"/>
@@ -7613,7 +7595,7 @@
       </p:sp>
       <p:sp>
         <p:nvSpPr>
-          <p:cNvPr id="106" name="Freeform 11">
+          <p:cNvPr id="108" name="Freeform 11">
             <a:extLst>
               <a:ext uri="{C183D7F6-B498-43B3-948B-1728B52AA6E4}">
                 <adec:decorative xmlns:adec="http://schemas.microsoft.com/office/drawing/2017/decorative" val="1"/>
@@ -7700,7 +7682,7 @@
       </p:sp>
       <p:sp>
         <p:nvSpPr>
-          <p:cNvPr id="107" name="PlaceHolder 1"/>
+          <p:cNvPr id="109" name="PlaceHolder 1"/>
           <p:cNvSpPr>
             <a:spLocks noGrp="1"/>
           </p:cNvSpPr>
@@ -7755,7 +7737,7 @@
       </p:sp>
       <p:sp>
         <p:nvSpPr>
-          <p:cNvPr id="108" name="PlaceHolder 2"/>
+          <p:cNvPr id="110" name="PlaceHolder 2"/>
           <p:cNvSpPr>
             <a:spLocks noGrp="1"/>
           </p:cNvSpPr>
@@ -10611,7 +10593,121 @@
                 </a:solidFill>
                 <a:latin typeface="-apple-system"/>
               </a:rPr>
-              <a:t>There shall</a:t>
+              <a:t>There shall be coin pickups </a:t>
+            </a:r>
+            <a:endParaRPr b="0" lang="en-US" sz="2000" spc="-1" strike="noStrike">
+              <a:solidFill>
+                <a:srgbClr val="ffffff"/>
+              </a:solidFill>
+              <a:latin typeface="Arial"/>
+            </a:endParaRPr>
+          </a:p>
+          <a:p>
+            <a:pPr marL="228600" indent="-228600" defTabSz="914400">
+              <a:lnSpc>
+                <a:spcPct val="90000"/>
+              </a:lnSpc>
+              <a:spcBef>
+                <a:spcPts val="1001"/>
+              </a:spcBef>
+              <a:buClr>
+                <a:srgbClr val="ffffff"/>
+              </a:buClr>
+              <a:buFont typeface="Arial"/>
+              <a:buChar char="•"/>
+            </a:pPr>
+            <a:r>
+              <a:rPr b="0" lang="en-US" sz="2000" spc="-1" strike="noStrike">
+                <a:solidFill>
+                  <a:schemeClr val="dk1"/>
+                </a:solidFill>
+                <a:latin typeface="-apple-system"/>
+              </a:rPr>
+              <a:t>Design:</a:t>
+            </a:r>
+            <a:endParaRPr b="0" lang="en-US" sz="2000" spc="-1" strike="noStrike">
+              <a:solidFill>
+                <a:srgbClr val="ffffff"/>
+              </a:solidFill>
+              <a:latin typeface="Arial"/>
+            </a:endParaRPr>
+          </a:p>
+          <a:p>
+            <a:pPr marL="228600" indent="-228600" defTabSz="914400">
+              <a:lnSpc>
+                <a:spcPct val="90000"/>
+              </a:lnSpc>
+              <a:spcBef>
+                <a:spcPts val="1001"/>
+              </a:spcBef>
+              <a:buClr>
+                <a:srgbClr val="ffffff"/>
+              </a:buClr>
+              <a:buFont typeface="Arial"/>
+              <a:buChar char="•"/>
+            </a:pPr>
+            <a:r>
+              <a:rPr b="0" lang="en-US" sz="2000" spc="-1" strike="noStrike">
+                <a:solidFill>
+                  <a:schemeClr val="dk1"/>
+                </a:solidFill>
+                <a:latin typeface="-apple-system"/>
+              </a:rPr>
+              <a:t>Conclusion: There are two types </a:t>
+            </a:r>
+            <a:r>
+              <a:rPr b="0" lang="en-US" sz="2000" spc="-1" strike="noStrike">
+                <a:solidFill>
+                  <a:schemeClr val="dk1"/>
+                </a:solidFill>
+                <a:latin typeface="-apple-system"/>
+              </a:rPr>
+              <a:t>of health pickup: apple that </a:t>
+            </a:r>
+            <a:r>
+              <a:rPr b="0" lang="en-US" sz="2000" spc="-1" strike="noStrike">
+                <a:solidFill>
+                  <a:schemeClr val="dk1"/>
+                </a:solidFill>
+                <a:latin typeface="-apple-system"/>
+              </a:rPr>
+              <a:t>restores 1 health, and cherry </a:t>
+            </a:r>
+            <a:r>
+              <a:rPr b="0" lang="en-US" sz="2000" spc="-1" strike="noStrike">
+                <a:solidFill>
+                  <a:schemeClr val="dk1"/>
+                </a:solidFill>
+                <a:latin typeface="-apple-system"/>
+              </a:rPr>
+              <a:t>that restores all health. Coins </a:t>
+            </a:r>
+            <a:r>
+              <a:rPr b="0" lang="en-US" sz="2000" spc="-1" strike="noStrike">
+                <a:solidFill>
+                  <a:schemeClr val="dk1"/>
+                </a:solidFill>
+                <a:latin typeface="-apple-system"/>
+              </a:rPr>
+              <a:t>come in 5 different </a:t>
+            </a:r>
+            <a:r>
+              <a:rPr b="0" lang="en-US" sz="2000" spc="-1" strike="noStrike">
+                <a:solidFill>
+                  <a:schemeClr val="dk1"/>
+                </a:solidFill>
+                <a:latin typeface="-apple-system"/>
+              </a:rPr>
+              <a:t>denominations and the total </a:t>
+            </a:r>
+            <a:r>
+              <a:rPr b="0" lang="en-US" sz="2000" spc="-1" strike="noStrike">
+                <a:solidFill>
+                  <a:schemeClr val="dk1"/>
+                </a:solidFill>
+                <a:latin typeface="-apple-system"/>
+              </a:rPr>
+              <a:t>value is tracked in the HUD.  </a:t>
             </a:r>
             <a:endParaRPr b="0" lang="en-US" sz="2000" spc="-1" strike="noStrike">
               <a:solidFill>
@@ -10979,8 +11075,8 @@
         </p:nvSpPr>
         <p:spPr>
           <a:xfrm>
-            <a:off x="838080" y="2010960"/>
-            <a:ext cx="4419720" cy="4165560"/>
+            <a:off x="685800" y="1143000"/>
+            <a:ext cx="4419720" cy="5257800"/>
           </a:xfrm>
           <a:prstGeom prst="rect">
             <a:avLst/>
@@ -10992,7 +11088,7 @@
         </p:spPr>
         <p:txBody>
           <a:bodyPr lIns="91440" rIns="91440" tIns="45720" bIns="45720" anchor="t">
-            <a:normAutofit/>
+            <a:normAutofit fontScale="75000" lnSpcReduction="10000"/>
           </a:bodyPr>
           <a:p>
             <a:pPr marL="228600" indent="0" defTabSz="914400">
@@ -11004,6 +11100,105 @@
               </a:spcBef>
               <a:buNone/>
             </a:pPr>
+            <a:endParaRPr b="0" lang="en-US" sz="2000" spc="-1" strike="noStrike">
+              <a:solidFill>
+                <a:srgbClr val="ffffff"/>
+              </a:solidFill>
+              <a:latin typeface="Arial"/>
+            </a:endParaRPr>
+          </a:p>
+          <a:p>
+            <a:pPr marL="228600" indent="-228600" defTabSz="914400">
+              <a:lnSpc>
+                <a:spcPct val="90000"/>
+              </a:lnSpc>
+              <a:spcBef>
+                <a:spcPts val="1191"/>
+              </a:spcBef>
+              <a:spcAft>
+                <a:spcPts val="992"/>
+              </a:spcAft>
+              <a:buClr>
+                <a:srgbClr val="ffffff"/>
+              </a:buClr>
+              <a:buFont typeface="Arial"/>
+              <a:buChar char="•"/>
+            </a:pPr>
+            <a:r>
+              <a:rPr b="0" lang="en-US" sz="2000" spc="-1" strike="noStrike">
+                <a:solidFill>
+                  <a:schemeClr val="dk1"/>
+                </a:solidFill>
+                <a:latin typeface="-apple-system"/>
+              </a:rPr>
+              <a:t>User Story: As a player, I want to interact with characters through dialogue boxes and understand how to play the game through those interactions. </a:t>
+            </a:r>
+            <a:endParaRPr b="0" lang="en-US" sz="2000" spc="-1" strike="noStrike">
+              <a:solidFill>
+                <a:srgbClr val="ffffff"/>
+              </a:solidFill>
+              <a:latin typeface="Arial"/>
+            </a:endParaRPr>
+          </a:p>
+          <a:p>
+            <a:pPr marL="228600" indent="-228600" defTabSz="914400">
+              <a:lnSpc>
+                <a:spcPct val="90000"/>
+              </a:lnSpc>
+              <a:spcBef>
+                <a:spcPts val="1191"/>
+              </a:spcBef>
+              <a:spcAft>
+                <a:spcPts val="992"/>
+              </a:spcAft>
+              <a:buClr>
+                <a:srgbClr val="ffffff"/>
+              </a:buClr>
+              <a:buFont typeface="Arial"/>
+              <a:buChar char="•"/>
+            </a:pPr>
+            <a:r>
+              <a:rPr b="0" lang="en-US" sz="2000" spc="-1" strike="noStrike">
+                <a:solidFill>
+                  <a:schemeClr val="dk1"/>
+                </a:solidFill>
+                <a:latin typeface="-apple-system"/>
+              </a:rPr>
+              <a:t>Requirement: The characters shall have a dialogue mechanic. </a:t>
+            </a:r>
+            <a:endParaRPr b="0" lang="en-US" sz="2000" spc="-1" strike="noStrike">
+              <a:solidFill>
+                <a:srgbClr val="ffffff"/>
+              </a:solidFill>
+              <a:latin typeface="Arial"/>
+            </a:endParaRPr>
+          </a:p>
+          <a:p>
+            <a:pPr marL="228600" indent="-228600" defTabSz="914400">
+              <a:lnSpc>
+                <a:spcPct val="90000"/>
+              </a:lnSpc>
+              <a:spcBef>
+                <a:spcPts val="1191"/>
+              </a:spcBef>
+              <a:spcAft>
+                <a:spcPts val="992"/>
+              </a:spcAft>
+              <a:buClr>
+                <a:srgbClr val="ffffff"/>
+              </a:buClr>
+              <a:buFont typeface="Arial"/>
+              <a:buChar char="•"/>
+            </a:pPr>
+            <a:r>
+              <a:rPr b="0" lang="en-US" sz="2000" spc="-1" strike="noStrike">
+                <a:solidFill>
+                  <a:schemeClr val="dk1"/>
+                </a:solidFill>
+                <a:latin typeface="-apple-system"/>
+              </a:rPr>
+              <a:t>Design: When the player approaches an npc they may talk too, a chat bubble will appear above the npc's head indicating the player is able to interact with this npc. Npc's have a detection zone around them that triggers the chat bubble icon's visibility. When a player character enters the zone the visibility is set to true, when the player exits the zone, the visibility is set to false. While within the zone, if the player presses enter, the dialog for that npc will be triggered.</a:t>
+            </a:r>
             <a:endParaRPr b="0" lang="en-US" sz="2000" spc="-1" strike="noStrike">
               <a:solidFill>
                 <a:srgbClr val="ffffff"/>
@@ -11032,7 +11227,7 @@
                 </a:solidFill>
                 <a:latin typeface="-apple-system"/>
               </a:rPr>
-              <a:t>intro at least one user store</a:t>
+              <a:t>Conclusion: Dialog is implemented through the Dialogic library. The player can select options when talking to an NPC that lead to differing results</a:t>
             </a:r>
             <a:endParaRPr b="0" lang="en-US" sz="2000" spc="-1" strike="noStrike">
               <a:solidFill>
@@ -11041,128 +11236,65 @@
               <a:latin typeface="Arial"/>
             </a:endParaRPr>
           </a:p>
-          <a:p>
-            <a:pPr marL="228600" indent="-228600" defTabSz="914400">
-              <a:lnSpc>
-                <a:spcPct val="90000"/>
-              </a:lnSpc>
-              <a:spcBef>
-                <a:spcPts val="1001"/>
-              </a:spcBef>
-              <a:buClr>
-                <a:srgbClr val="ffffff"/>
-              </a:buClr>
-              <a:buFont typeface="Arial"/>
-              <a:buChar char="•"/>
-            </a:pPr>
-            <a:r>
-              <a:rPr b="0" lang="en-US" sz="2000" spc="-1" strike="noStrike">
-                <a:solidFill>
-                  <a:schemeClr val="dk1"/>
-                </a:solidFill>
-                <a:latin typeface="-apple-system"/>
-              </a:rPr>
-              <a:t>one requirement</a:t>
-            </a:r>
-            <a:endParaRPr b="0" lang="en-US" sz="2000" spc="-1" strike="noStrike">
-              <a:solidFill>
-                <a:srgbClr val="ffffff"/>
-              </a:solidFill>
-              <a:latin typeface="Arial"/>
-            </a:endParaRPr>
-          </a:p>
-          <a:p>
-            <a:pPr marL="228600" indent="-228600" defTabSz="914400">
-              <a:lnSpc>
-                <a:spcPct val="90000"/>
-              </a:lnSpc>
-              <a:spcBef>
-                <a:spcPts val="1001"/>
-              </a:spcBef>
-              <a:buClr>
-                <a:srgbClr val="ffffff"/>
-              </a:buClr>
-              <a:buFont typeface="Arial"/>
-              <a:buChar char="•"/>
-            </a:pPr>
-            <a:r>
-              <a:rPr b="0" lang="en-US" sz="2000" spc="-1" strike="noStrike">
-                <a:solidFill>
-                  <a:schemeClr val="dk1"/>
-                </a:solidFill>
-                <a:latin typeface="-apple-system"/>
-              </a:rPr>
-              <a:t>one design</a:t>
-            </a:r>
-            <a:endParaRPr b="0" lang="en-US" sz="2000" spc="-1" strike="noStrike">
-              <a:solidFill>
-                <a:srgbClr val="ffffff"/>
-              </a:solidFill>
-              <a:latin typeface="Arial"/>
-            </a:endParaRPr>
-          </a:p>
-          <a:p>
-            <a:pPr marL="228600" indent="-228600" defTabSz="914400">
-              <a:lnSpc>
-                <a:spcPct val="90000"/>
-              </a:lnSpc>
-              <a:spcBef>
-                <a:spcPts val="1001"/>
-              </a:spcBef>
-              <a:buClr>
-                <a:srgbClr val="ffffff"/>
-              </a:buClr>
-              <a:buFont typeface="Arial"/>
-              <a:buChar char="•"/>
-            </a:pPr>
-            <a:r>
-              <a:rPr b="0" lang="en-US" sz="2000" spc="-1" strike="noStrike">
-                <a:solidFill>
-                  <a:schemeClr val="dk1"/>
-                </a:solidFill>
-                <a:latin typeface="-apple-system"/>
-              </a:rPr>
-              <a:t>implementation gif or figure</a:t>
-            </a:r>
-            <a:endParaRPr b="0" lang="en-US" sz="2000" spc="-1" strike="noStrike">
-              <a:solidFill>
-                <a:srgbClr val="ffffff"/>
-              </a:solidFill>
-              <a:latin typeface="Arial"/>
-            </a:endParaRPr>
-          </a:p>
-          <a:p>
-            <a:pPr marL="228600" indent="-228600" defTabSz="914400">
-              <a:lnSpc>
-                <a:spcPct val="90000"/>
-              </a:lnSpc>
-              <a:spcBef>
-                <a:spcPts val="1001"/>
-              </a:spcBef>
-              <a:buClr>
-                <a:srgbClr val="ffffff"/>
-              </a:buClr>
-              <a:buFont typeface="Arial"/>
-              <a:buChar char="•"/>
-            </a:pPr>
-            <a:r>
-              <a:rPr b="0" lang="en-US" sz="2000" spc="-1" strike="noStrike">
-                <a:solidFill>
-                  <a:schemeClr val="dk1"/>
-                </a:solidFill>
-                <a:latin typeface="-apple-system"/>
-              </a:rPr>
-              <a:t>brief conclusion</a:t>
-            </a:r>
-            <a:endParaRPr b="0" lang="en-US" sz="2000" spc="-1" strike="noStrike">
-              <a:solidFill>
-                <a:srgbClr val="ffffff"/>
-              </a:solidFill>
-              <a:latin typeface="Arial"/>
-            </a:endParaRPr>
-          </a:p>
-        </p:txBody>
-      </p:sp>
+        </p:txBody>
+      </p:sp>
+      <p:pic>
+        <p:nvPicPr>
+          <p:cNvPr id="94" name="" descr="">
+            <a:hlinkClick r:id="" action="ppaction://media"/>
+          </p:cNvPr>
+          <p:cNvPicPr/>
+          <p:nvPr>
+            <a:videoFile r:link="rId1"/>
+            <p:extLst>
+              <p:ext uri="{DAA4B4D4-6D71-4841-9C94-3DE7FCFB9230}">
+                <p14:media r:link="rId2"/>
+              </p:ext>
+            </p:extLst>
+          </p:nvPr>
+        </p:nvPicPr>
+        <p:blipFill>
+          <a:blip r:embed="rId3"/>
+          <a:stretch>
+            <a:fillRect/>
+          </a:stretch>
+        </p:blipFill>
+        <p:spPr>
+          <a:xfrm>
+            <a:off x="5715000" y="228600"/>
+            <a:ext cx="5943240" cy="3342960"/>
+          </a:xfrm>
+          <a:prstGeom prst="rect">
+            <a:avLst/>
+          </a:prstGeom>
+          <a:ln w="0">
+            <a:noFill/>
+          </a:ln>
+        </p:spPr>
+      </p:pic>
+      <p:pic>
+        <p:nvPicPr>
+          <p:cNvPr id="95" name="" descr=""/>
+          <p:cNvPicPr/>
+          <p:nvPr/>
+        </p:nvPicPr>
+        <p:blipFill>
+          <a:blip r:embed="rId4"/>
+          <a:stretch/>
+        </p:blipFill>
+        <p:spPr>
+          <a:xfrm>
+            <a:off x="6629400" y="3657600"/>
+            <a:ext cx="4218480" cy="2812320"/>
+          </a:xfrm>
+          <a:prstGeom prst="rect">
+            <a:avLst/>
+          </a:prstGeom>
+          <a:ln w="0">
+            <a:noFill/>
+          </a:ln>
+        </p:spPr>
+      </p:pic>
     </p:spTree>
   </p:cSld>
   <mc:AlternateContent>
@@ -11202,7 +11334,7 @@
       </p:grpSpPr>
       <p:sp>
         <p:nvSpPr>
-          <p:cNvPr id="94" name="Rectangle 2">
+          <p:cNvPr id="96" name="Rectangle 2">
             <a:extLst>
               <a:ext uri="{C183D7F6-B498-43B3-948B-1728B52AA6E4}">
                 <adec:decorative xmlns:adec="http://schemas.microsoft.com/office/drawing/2017/decorative" val="1"/>
@@ -11257,7 +11389,7 @@
       </p:sp>
       <p:sp>
         <p:nvSpPr>
-          <p:cNvPr id="95" name="Freeform 3">
+          <p:cNvPr id="97" name="Freeform 3">
             <a:extLst>
               <a:ext uri="{C183D7F6-B498-43B3-948B-1728B52AA6E4}">
                 <adec:decorative xmlns:adec="http://schemas.microsoft.com/office/drawing/2017/decorative" val="1"/>
@@ -11339,7 +11471,7 @@
       </p:sp>
       <p:sp>
         <p:nvSpPr>
-          <p:cNvPr id="96" name="Freeform 4">
+          <p:cNvPr id="98" name="Freeform 4">
             <a:extLst>
               <a:ext uri="{C183D7F6-B498-43B3-948B-1728B52AA6E4}">
                 <adec:decorative xmlns:adec="http://schemas.microsoft.com/office/drawing/2017/decorative" val="1"/>
@@ -11421,7 +11553,7 @@
       </p:sp>
       <p:sp>
         <p:nvSpPr>
-          <p:cNvPr id="97" name="PlaceHolder 1"/>
+          <p:cNvPr id="99" name="PlaceHolder 1"/>
           <p:cNvSpPr>
             <a:spLocks noGrp="1"/>
           </p:cNvSpPr>
@@ -11476,7 +11608,7 @@
       </p:sp>
       <p:sp>
         <p:nvSpPr>
-          <p:cNvPr id="98" name="PlaceHolder 2"/>
+          <p:cNvPr id="100" name="PlaceHolder 2"/>
           <p:cNvSpPr>
             <a:spLocks noGrp="1"/>
           </p:cNvSpPr>
@@ -11709,7 +11841,7 @@
       </p:grpSpPr>
       <p:sp>
         <p:nvSpPr>
-          <p:cNvPr id="99" name="Rectangle 22">
+          <p:cNvPr id="101" name="Rectangle 22">
             <a:extLst>
               <a:ext uri="{C183D7F6-B498-43B3-948B-1728B52AA6E4}">
                 <adec:decorative xmlns:adec="http://schemas.microsoft.com/office/drawing/2017/decorative" val="1"/>
@@ -11769,7 +11901,7 @@
       </p:sp>
       <p:sp>
         <p:nvSpPr>
-          <p:cNvPr id="100" name="Freeform 13">
+          <p:cNvPr id="102" name="Freeform 13">
             <a:extLst>
               <a:ext uri="{C183D7F6-B498-43B3-948B-1728B52AA6E4}">
                 <adec:decorative xmlns:adec="http://schemas.microsoft.com/office/drawing/2017/decorative" val="1"/>
@@ -11856,7 +11988,7 @@
       </p:sp>
       <p:sp>
         <p:nvSpPr>
-          <p:cNvPr id="101" name="Freeform 11">
+          <p:cNvPr id="103" name="Freeform 11">
             <a:extLst>
               <a:ext uri="{C183D7F6-B498-43B3-948B-1728B52AA6E4}">
                 <adec:decorative xmlns:adec="http://schemas.microsoft.com/office/drawing/2017/decorative" val="1"/>
@@ -11943,7 +12075,7 @@
       </p:sp>
       <p:sp>
         <p:nvSpPr>
-          <p:cNvPr id="102" name="PlaceHolder 1"/>
+          <p:cNvPr id="104" name="PlaceHolder 1"/>
           <p:cNvSpPr>
             <a:spLocks noGrp="1"/>
           </p:cNvSpPr>
@@ -11998,7 +12130,7 @@
       </p:sp>
       <p:sp>
         <p:nvSpPr>
-          <p:cNvPr id="103" name="PlaceHolder 2"/>
+          <p:cNvPr id="105" name="PlaceHolder 2"/>
           <p:cNvSpPr>
             <a:spLocks noGrp="1"/>
           </p:cNvSpPr>

</xml_diff>